<commit_message>
Subindo o safado do deepDive fujão
</commit_message>
<xml_diff>
--- a/Documentação/DeepDive/Inovacao-DeepDive.pptx
+++ b/Documentação/DeepDive/Inovacao-DeepDive.pptx
@@ -1,29 +1,29 @@
 
 <file path=ppt/presentation.xml><?xml version="1.0" encoding="utf-8"?>
-<p:presentation xmlns:a="http://schemas.openxmlformats.org/drawingml/2006/main" xmlns:r="http://schemas.openxmlformats.org/officeDocument/2006/relationships" xmlns:mc="http://schemas.openxmlformats.org/markup-compatibility/2006" xmlns:mv="urn:schemas-microsoft-com:mac:vml" xmlns:p="http://schemas.openxmlformats.org/presentationml/2006/main" xmlns:c="http://schemas.openxmlformats.org/drawingml/2006/chart" xmlns:dgm="http://schemas.openxmlformats.org/drawingml/2006/diagram" xmlns:o="urn:schemas-microsoft-com:office:office" xmlns:v="urn:schemas-microsoft-com:vml" xmlns:pvml="urn:schemas-microsoft-com:office:powerpoint" xmlns:com="http://schemas.openxmlformats.org/drawingml/2006/compatibility" xmlns:p14="http://schemas.microsoft.com/office/powerpoint/2010/main" xmlns:p15="http://schemas.microsoft.com/office/powerpoint/2012/main" xmlns:ahyp="http://schemas.microsoft.com/office/drawing/2018/hyperlinkcolor" autoCompressPictures="0" embedTrueTypeFonts="1" strictFirstAndLastChars="0" saveSubsetFonts="1">
+<p:presentation xmlns:a="http://schemas.openxmlformats.org/drawingml/2006/main" xmlns:r="http://schemas.openxmlformats.org/officeDocument/2006/relationships" xmlns:p="http://schemas.openxmlformats.org/presentationml/2006/main" strictFirstAndLastChars="0" embedTrueTypeFonts="1" saveSubsetFonts="1" autoCompressPictures="0">
   <p:sldMasterIdLst>
-    <p:sldMasterId id="2147483659" r:id="rId4"/>
+    <p:sldMasterId id="2147483659" r:id="rId1"/>
   </p:sldMasterIdLst>
   <p:notesMasterIdLst>
-    <p:notesMasterId r:id="rId5"/>
+    <p:notesMasterId r:id="rId4"/>
   </p:notesMasterIdLst>
   <p:sldIdLst>
-    <p:sldId id="256" r:id="rId6"/>
-    <p:sldId id="257" r:id="rId7"/>
+    <p:sldId id="256" r:id="rId2"/>
+    <p:sldId id="257" r:id="rId3"/>
   </p:sldIdLst>
-  <p:sldSz cy="5143500" cx="9144000"/>
+  <p:sldSz cx="9144000" cy="5143500" type="screen16x9"/>
   <p:notesSz cx="6858000" cy="9144000"/>
   <p:embeddedFontLst>
     <p:embeddedFont>
-      <p:font typeface="Roboto"/>
-      <p:regular r:id="rId8"/>
-      <p:bold r:id="rId9"/>
-      <p:italic r:id="rId10"/>
-      <p:boldItalic r:id="rId11"/>
+      <p:font typeface="Roboto" pitchFamily="2" charset="0"/>
+      <p:regular r:id="rId5"/>
+      <p:bold r:id="rId6"/>
+      <p:italic r:id="rId7"/>
+      <p:boldItalic r:id="rId8"/>
     </p:embeddedFont>
   </p:embeddedFontLst>
   <p:defaultTextStyle>
-    <a:defPPr lvl="0" marR="0" rtl="0" algn="l">
+    <a:defPPr marR="0" lvl="0" algn="l" rtl="0">
       <a:lnSpc>
         <a:spcPct val="100000"/>
       </a:lnSpc>
@@ -34,7 +34,7 @@
         <a:spcPts val="0"/>
       </a:spcAft>
     </a:defPPr>
-    <a:lvl1pPr lvl="0" marR="0" rtl="0" algn="l">
+    <a:lvl1pPr marR="0" lvl="0" algn="l" rtl="0">
       <a:lnSpc>
         <a:spcPct val="100000"/>
       </a:lnSpc>
@@ -48,7 +48,7 @@
         <a:srgbClr val="000000"/>
       </a:buClr>
       <a:buFont typeface="Arial"/>
-      <a:defRPr b="0" i="0" sz="1400" u="none" cap="none" strike="noStrike">
+      <a:defRPr sz="1400" b="0" i="0" u="none" strike="noStrike" cap="none">
         <a:solidFill>
           <a:srgbClr val="000000"/>
         </a:solidFill>
@@ -58,7 +58,7 @@
         <a:sym typeface="Arial"/>
       </a:defRPr>
     </a:lvl1pPr>
-    <a:lvl2pPr lvl="1" marR="0" rtl="0" algn="l">
+    <a:lvl2pPr marR="0" lvl="1" algn="l" rtl="0">
       <a:lnSpc>
         <a:spcPct val="100000"/>
       </a:lnSpc>
@@ -72,7 +72,7 @@
         <a:srgbClr val="000000"/>
       </a:buClr>
       <a:buFont typeface="Arial"/>
-      <a:defRPr b="0" i="0" sz="1400" u="none" cap="none" strike="noStrike">
+      <a:defRPr sz="1400" b="0" i="0" u="none" strike="noStrike" cap="none">
         <a:solidFill>
           <a:srgbClr val="000000"/>
         </a:solidFill>
@@ -82,7 +82,7 @@
         <a:sym typeface="Arial"/>
       </a:defRPr>
     </a:lvl2pPr>
-    <a:lvl3pPr lvl="2" marR="0" rtl="0" algn="l">
+    <a:lvl3pPr marR="0" lvl="2" algn="l" rtl="0">
       <a:lnSpc>
         <a:spcPct val="100000"/>
       </a:lnSpc>
@@ -96,7 +96,7 @@
         <a:srgbClr val="000000"/>
       </a:buClr>
       <a:buFont typeface="Arial"/>
-      <a:defRPr b="0" i="0" sz="1400" u="none" cap="none" strike="noStrike">
+      <a:defRPr sz="1400" b="0" i="0" u="none" strike="noStrike" cap="none">
         <a:solidFill>
           <a:srgbClr val="000000"/>
         </a:solidFill>
@@ -106,7 +106,7 @@
         <a:sym typeface="Arial"/>
       </a:defRPr>
     </a:lvl3pPr>
-    <a:lvl4pPr lvl="3" marR="0" rtl="0" algn="l">
+    <a:lvl4pPr marR="0" lvl="3" algn="l" rtl="0">
       <a:lnSpc>
         <a:spcPct val="100000"/>
       </a:lnSpc>
@@ -120,7 +120,7 @@
         <a:srgbClr val="000000"/>
       </a:buClr>
       <a:buFont typeface="Arial"/>
-      <a:defRPr b="0" i="0" sz="1400" u="none" cap="none" strike="noStrike">
+      <a:defRPr sz="1400" b="0" i="0" u="none" strike="noStrike" cap="none">
         <a:solidFill>
           <a:srgbClr val="000000"/>
         </a:solidFill>
@@ -130,7 +130,7 @@
         <a:sym typeface="Arial"/>
       </a:defRPr>
     </a:lvl4pPr>
-    <a:lvl5pPr lvl="4" marR="0" rtl="0" algn="l">
+    <a:lvl5pPr marR="0" lvl="4" algn="l" rtl="0">
       <a:lnSpc>
         <a:spcPct val="100000"/>
       </a:lnSpc>
@@ -144,7 +144,7 @@
         <a:srgbClr val="000000"/>
       </a:buClr>
       <a:buFont typeface="Arial"/>
-      <a:defRPr b="0" i="0" sz="1400" u="none" cap="none" strike="noStrike">
+      <a:defRPr sz="1400" b="0" i="0" u="none" strike="noStrike" cap="none">
         <a:solidFill>
           <a:srgbClr val="000000"/>
         </a:solidFill>
@@ -154,7 +154,7 @@
         <a:sym typeface="Arial"/>
       </a:defRPr>
     </a:lvl5pPr>
-    <a:lvl6pPr lvl="5" marR="0" rtl="0" algn="l">
+    <a:lvl6pPr marR="0" lvl="5" algn="l" rtl="0">
       <a:lnSpc>
         <a:spcPct val="100000"/>
       </a:lnSpc>
@@ -168,7 +168,7 @@
         <a:srgbClr val="000000"/>
       </a:buClr>
       <a:buFont typeface="Arial"/>
-      <a:defRPr b="0" i="0" sz="1400" u="none" cap="none" strike="noStrike">
+      <a:defRPr sz="1400" b="0" i="0" u="none" strike="noStrike" cap="none">
         <a:solidFill>
           <a:srgbClr val="000000"/>
         </a:solidFill>
@@ -178,7 +178,7 @@
         <a:sym typeface="Arial"/>
       </a:defRPr>
     </a:lvl6pPr>
-    <a:lvl7pPr lvl="6" marR="0" rtl="0" algn="l">
+    <a:lvl7pPr marR="0" lvl="6" algn="l" rtl="0">
       <a:lnSpc>
         <a:spcPct val="100000"/>
       </a:lnSpc>
@@ -192,7 +192,7 @@
         <a:srgbClr val="000000"/>
       </a:buClr>
       <a:buFont typeface="Arial"/>
-      <a:defRPr b="0" i="0" sz="1400" u="none" cap="none" strike="noStrike">
+      <a:defRPr sz="1400" b="0" i="0" u="none" strike="noStrike" cap="none">
         <a:solidFill>
           <a:srgbClr val="000000"/>
         </a:solidFill>
@@ -202,7 +202,7 @@
         <a:sym typeface="Arial"/>
       </a:defRPr>
     </a:lvl7pPr>
-    <a:lvl8pPr lvl="7" marR="0" rtl="0" algn="l">
+    <a:lvl8pPr marR="0" lvl="7" algn="l" rtl="0">
       <a:lnSpc>
         <a:spcPct val="100000"/>
       </a:lnSpc>
@@ -216,7 +216,7 @@
         <a:srgbClr val="000000"/>
       </a:buClr>
       <a:buFont typeface="Arial"/>
-      <a:defRPr b="0" i="0" sz="1400" u="none" cap="none" strike="noStrike">
+      <a:defRPr sz="1400" b="0" i="0" u="none" strike="noStrike" cap="none">
         <a:solidFill>
           <a:srgbClr val="000000"/>
         </a:solidFill>
@@ -226,7 +226,7 @@
         <a:sym typeface="Arial"/>
       </a:defRPr>
     </a:lvl8pPr>
-    <a:lvl9pPr lvl="8" marR="0" rtl="0" algn="l">
+    <a:lvl9pPr marR="0" lvl="8" algn="l" rtl="0">
       <a:lnSpc>
         <a:spcPct val="100000"/>
       </a:lnSpc>
@@ -240,7 +240,7 @@
         <a:srgbClr val="000000"/>
       </a:buClr>
       <a:buFont typeface="Arial"/>
-      <a:defRPr b="0" i="0" sz="1400" u="none" cap="none" strike="noStrike">
+      <a:defRPr sz="1400" b="0" i="0" u="none" strike="noStrike" cap="none">
         <a:solidFill>
           <a:srgbClr val="000000"/>
         </a:solidFill>
@@ -253,7 +253,7 @@
   </p:defaultTextStyle>
   <p:extLst>
     <p:ext uri="{EFAFB233-063F-42B5-8137-9DF3F51BA10A}">
-      <p15:sldGuideLst>
+      <p15:sldGuideLst xmlns:p15="http://schemas.microsoft.com/office/powerpoint/2012/main">
         <p15:guide id="1" orient="horz" pos="1620">
           <p15:clr>
             <a:srgbClr val="A4A3A4"/>
@@ -271,11 +271,16 @@
 </file>
 
 <file path=ppt/notesMasters/notesMaster1.xml><?xml version="1.0" encoding="utf-8"?>
-<p:notesMaster xmlns:a="http://schemas.openxmlformats.org/drawingml/2006/main" xmlns:r="http://schemas.openxmlformats.org/officeDocument/2006/relationships" xmlns:mc="http://schemas.openxmlformats.org/markup-compatibility/2006" xmlns:mv="urn:schemas-microsoft-com:mac:vml" xmlns:p="http://schemas.openxmlformats.org/presentationml/2006/main" xmlns:c="http://schemas.openxmlformats.org/drawingml/2006/chart" xmlns:dgm="http://schemas.openxmlformats.org/drawingml/2006/diagram" xmlns:o="urn:schemas-microsoft-com:office:office" xmlns:v="urn:schemas-microsoft-com:vml" xmlns:pvml="urn:schemas-microsoft-com:office:powerpoint" xmlns:com="http://schemas.openxmlformats.org/drawingml/2006/compatibility" xmlns:p14="http://schemas.microsoft.com/office/powerpoint/2010/main" xmlns:p15="http://schemas.microsoft.com/office/powerpoint/2012/main" xmlns:ahyp="http://schemas.microsoft.com/office/drawing/2018/hyperlinkcolor">
+<p:notesMaster xmlns:a="http://schemas.openxmlformats.org/drawingml/2006/main" xmlns:r="http://schemas.openxmlformats.org/officeDocument/2006/relationships" xmlns:p="http://schemas.openxmlformats.org/presentationml/2006/main">
   <p:cSld>
+    <p:bg>
+      <p:bgRef idx="1001">
+        <a:schemeClr val="bg1"/>
+      </p:bgRef>
+    </p:bg>
     <p:spTree>
       <p:nvGrpSpPr>
-        <p:cNvPr id="2" name="Shape 2"/>
+        <p:cNvPr id="1" name="Shape 2"/>
         <p:cNvGrpSpPr/>
         <p:nvPr/>
       </p:nvGrpSpPr>
@@ -290,9 +295,11 @@
       <p:sp>
         <p:nvSpPr>
           <p:cNvPr id="3" name="Google Shape;3;n"/>
-          <p:cNvSpPr/>
+          <p:cNvSpPr>
+            <a:spLocks noGrp="1" noRot="1" noChangeAspect="1"/>
+          </p:cNvSpPr>
           <p:nvPr>
-            <p:ph idx="2" type="sldImg"/>
+            <p:ph type="sldImg" idx="2"/>
           </p:nvPr>
         </p:nvSpPr>
         <p:spPr>
@@ -301,9 +308,13 @@
             <a:ext cx="6096075" cy="3429000"/>
           </a:xfrm>
           <a:custGeom>
-            <a:rect b="b" l="l" r="r" t="t"/>
+            <a:avLst/>
+            <a:gdLst/>
+            <a:ahLst/>
+            <a:cxnLst/>
+            <a:rect l="l" t="t" r="r" b="b"/>
             <a:pathLst>
-              <a:path extrusionOk="0" h="120000" w="120000">
+              <a:path w="120000" h="120000" extrusionOk="0">
                 <a:moveTo>
                   <a:pt x="0" y="0"/>
                 </a:moveTo>
@@ -321,23 +332,25 @@
             </a:pathLst>
           </a:custGeom>
           <a:noFill/>
-          <a:ln cap="flat" cmpd="sng" w="9525">
+          <a:ln w="9525" cap="flat" cmpd="sng">
             <a:solidFill>
               <a:srgbClr val="000000"/>
             </a:solidFill>
             <a:prstDash val="solid"/>
             <a:round/>
-            <a:headEnd len="sm" w="sm" type="none"/>
-            <a:tailEnd len="sm" w="sm" type="none"/>
+            <a:headEnd type="none" w="sm" len="sm"/>
+            <a:tailEnd type="none" w="sm" len="sm"/>
           </a:ln>
         </p:spPr>
       </p:sp>
       <p:sp>
         <p:nvSpPr>
           <p:cNvPr id="4" name="Google Shape;4;n"/>
-          <p:cNvSpPr txBox="1"/>
+          <p:cNvSpPr txBox="1">
+            <a:spLocks noGrp="1"/>
+          </p:cNvSpPr>
           <p:nvPr>
-            <p:ph idx="1" type="body"/>
+            <p:ph type="body" idx="1"/>
           </p:nvPr>
         </p:nvSpPr>
         <p:spPr>
@@ -354,11 +367,11 @@
           </a:ln>
         </p:spPr>
         <p:txBody>
-          <a:bodyPr anchorCtr="0" anchor="t" bIns="91425" lIns="91425" spcFirstLastPara="1" rIns="91425" wrap="square" tIns="91425">
+          <a:bodyPr spcFirstLastPara="1" wrap="square" lIns="91425" tIns="91425" rIns="91425" bIns="91425" anchor="t" anchorCtr="0">
             <a:noAutofit/>
           </a:bodyPr>
           <a:lstStyle>
-            <a:lvl1pPr indent="-298450" lvl="0" marL="457200">
+            <a:lvl1pPr marL="457200" lvl="0" indent="-298450">
               <a:spcBef>
                 <a:spcPts val="0"/>
               </a:spcBef>
@@ -369,7 +382,7 @@
               <a:buChar char="●"/>
               <a:defRPr sz="1100"/>
             </a:lvl1pPr>
-            <a:lvl2pPr indent="-298450" lvl="1" marL="914400">
+            <a:lvl2pPr marL="914400" lvl="1" indent="-298450">
               <a:spcBef>
                 <a:spcPts val="0"/>
               </a:spcBef>
@@ -380,7 +393,7 @@
               <a:buChar char="○"/>
               <a:defRPr sz="1100"/>
             </a:lvl2pPr>
-            <a:lvl3pPr indent="-298450" lvl="2" marL="1371600">
+            <a:lvl3pPr marL="1371600" lvl="2" indent="-298450">
               <a:spcBef>
                 <a:spcPts val="0"/>
               </a:spcBef>
@@ -391,7 +404,7 @@
               <a:buChar char="■"/>
               <a:defRPr sz="1100"/>
             </a:lvl3pPr>
-            <a:lvl4pPr indent="-298450" lvl="3" marL="1828800">
+            <a:lvl4pPr marL="1828800" lvl="3" indent="-298450">
               <a:spcBef>
                 <a:spcPts val="0"/>
               </a:spcBef>
@@ -402,7 +415,7 @@
               <a:buChar char="●"/>
               <a:defRPr sz="1100"/>
             </a:lvl4pPr>
-            <a:lvl5pPr indent="-298450" lvl="4" marL="2286000">
+            <a:lvl5pPr marL="2286000" lvl="4" indent="-298450">
               <a:spcBef>
                 <a:spcPts val="0"/>
               </a:spcBef>
@@ -413,7 +426,7 @@
               <a:buChar char="○"/>
               <a:defRPr sz="1100"/>
             </a:lvl5pPr>
-            <a:lvl6pPr indent="-298450" lvl="5" marL="2743200">
+            <a:lvl6pPr marL="2743200" lvl="5" indent="-298450">
               <a:spcBef>
                 <a:spcPts val="0"/>
               </a:spcBef>
@@ -424,7 +437,7 @@
               <a:buChar char="■"/>
               <a:defRPr sz="1100"/>
             </a:lvl6pPr>
-            <a:lvl7pPr indent="-298450" lvl="6" marL="3200400">
+            <a:lvl7pPr marL="3200400" lvl="6" indent="-298450">
               <a:spcBef>
                 <a:spcPts val="0"/>
               </a:spcBef>
@@ -435,7 +448,7 @@
               <a:buChar char="●"/>
               <a:defRPr sz="1100"/>
             </a:lvl7pPr>
-            <a:lvl8pPr indent="-298450" lvl="7" marL="3657600">
+            <a:lvl8pPr marL="3657600" lvl="7" indent="-298450">
               <a:spcBef>
                 <a:spcPts val="0"/>
               </a:spcBef>
@@ -446,7 +459,7 @@
               <a:buChar char="○"/>
               <a:defRPr sz="1100"/>
             </a:lvl8pPr>
-            <a:lvl9pPr indent="-298450" lvl="8" marL="4114800">
+            <a:lvl9pPr marL="4114800" lvl="8" indent="-298450">
               <a:spcBef>
                 <a:spcPts val="0"/>
               </a:spcBef>
@@ -458,14 +471,16 @@
               <a:defRPr sz="1100"/>
             </a:lvl9pPr>
           </a:lstStyle>
-          <a:p/>
+          <a:p>
+            <a:endParaRPr/>
+          </a:p>
         </p:txBody>
       </p:sp>
     </p:spTree>
   </p:cSld>
-  <p:clrMap accent1="accent1" accent2="accent2" accent3="accent3" accent4="accent4" accent5="accent5" accent6="accent6" bg1="lt1" bg2="dk2" tx1="dk1" tx2="lt2" folHlink="folHlink" hlink="hlink"/>
+  <p:clrMap bg1="lt1" tx1="dk1" bg2="dk2" tx2="lt2" accent1="accent1" accent2="accent2" accent3="accent3" accent4="accent4" accent5="accent5" accent6="accent6" hlink="hlink" folHlink="folHlink"/>
   <p:notesStyle>
-    <a:defPPr lvl="0" marR="0" rtl="0" algn="l">
+    <a:defPPr marR="0" lvl="0" algn="l" rtl="0">
       <a:lnSpc>
         <a:spcPct val="100000"/>
       </a:lnSpc>
@@ -476,7 +491,7 @@
         <a:spcPts val="0"/>
       </a:spcAft>
     </a:defPPr>
-    <a:lvl1pPr lvl="0" marR="0" rtl="0" algn="l">
+    <a:lvl1pPr marR="0" lvl="0" algn="l" rtl="0">
       <a:lnSpc>
         <a:spcPct val="100000"/>
       </a:lnSpc>
@@ -490,7 +505,7 @@
         <a:srgbClr val="000000"/>
       </a:buClr>
       <a:buFont typeface="Arial"/>
-      <a:defRPr b="0" i="0" sz="1400" u="none" cap="none" strike="noStrike">
+      <a:defRPr sz="1400" b="0" i="0" u="none" strike="noStrike" cap="none">
         <a:solidFill>
           <a:srgbClr val="000000"/>
         </a:solidFill>
@@ -500,7 +515,7 @@
         <a:sym typeface="Arial"/>
       </a:defRPr>
     </a:lvl1pPr>
-    <a:lvl2pPr lvl="1" marR="0" rtl="0" algn="l">
+    <a:lvl2pPr marR="0" lvl="1" algn="l" rtl="0">
       <a:lnSpc>
         <a:spcPct val="100000"/>
       </a:lnSpc>
@@ -514,7 +529,7 @@
         <a:srgbClr val="000000"/>
       </a:buClr>
       <a:buFont typeface="Arial"/>
-      <a:defRPr b="0" i="0" sz="1400" u="none" cap="none" strike="noStrike">
+      <a:defRPr sz="1400" b="0" i="0" u="none" strike="noStrike" cap="none">
         <a:solidFill>
           <a:srgbClr val="000000"/>
         </a:solidFill>
@@ -524,7 +539,7 @@
         <a:sym typeface="Arial"/>
       </a:defRPr>
     </a:lvl2pPr>
-    <a:lvl3pPr lvl="2" marR="0" rtl="0" algn="l">
+    <a:lvl3pPr marR="0" lvl="2" algn="l" rtl="0">
       <a:lnSpc>
         <a:spcPct val="100000"/>
       </a:lnSpc>
@@ -538,7 +553,7 @@
         <a:srgbClr val="000000"/>
       </a:buClr>
       <a:buFont typeface="Arial"/>
-      <a:defRPr b="0" i="0" sz="1400" u="none" cap="none" strike="noStrike">
+      <a:defRPr sz="1400" b="0" i="0" u="none" strike="noStrike" cap="none">
         <a:solidFill>
           <a:srgbClr val="000000"/>
         </a:solidFill>
@@ -548,7 +563,7 @@
         <a:sym typeface="Arial"/>
       </a:defRPr>
     </a:lvl3pPr>
-    <a:lvl4pPr lvl="3" marR="0" rtl="0" algn="l">
+    <a:lvl4pPr marR="0" lvl="3" algn="l" rtl="0">
       <a:lnSpc>
         <a:spcPct val="100000"/>
       </a:lnSpc>
@@ -562,7 +577,7 @@
         <a:srgbClr val="000000"/>
       </a:buClr>
       <a:buFont typeface="Arial"/>
-      <a:defRPr b="0" i="0" sz="1400" u="none" cap="none" strike="noStrike">
+      <a:defRPr sz="1400" b="0" i="0" u="none" strike="noStrike" cap="none">
         <a:solidFill>
           <a:srgbClr val="000000"/>
         </a:solidFill>
@@ -572,7 +587,7 @@
         <a:sym typeface="Arial"/>
       </a:defRPr>
     </a:lvl4pPr>
-    <a:lvl5pPr lvl="4" marR="0" rtl="0" algn="l">
+    <a:lvl5pPr marR="0" lvl="4" algn="l" rtl="0">
       <a:lnSpc>
         <a:spcPct val="100000"/>
       </a:lnSpc>
@@ -586,7 +601,7 @@
         <a:srgbClr val="000000"/>
       </a:buClr>
       <a:buFont typeface="Arial"/>
-      <a:defRPr b="0" i="0" sz="1400" u="none" cap="none" strike="noStrike">
+      <a:defRPr sz="1400" b="0" i="0" u="none" strike="noStrike" cap="none">
         <a:solidFill>
           <a:srgbClr val="000000"/>
         </a:solidFill>
@@ -596,7 +611,7 @@
         <a:sym typeface="Arial"/>
       </a:defRPr>
     </a:lvl5pPr>
-    <a:lvl6pPr lvl="5" marR="0" rtl="0" algn="l">
+    <a:lvl6pPr marR="0" lvl="5" algn="l" rtl="0">
       <a:lnSpc>
         <a:spcPct val="100000"/>
       </a:lnSpc>
@@ -610,7 +625,7 @@
         <a:srgbClr val="000000"/>
       </a:buClr>
       <a:buFont typeface="Arial"/>
-      <a:defRPr b="0" i="0" sz="1400" u="none" cap="none" strike="noStrike">
+      <a:defRPr sz="1400" b="0" i="0" u="none" strike="noStrike" cap="none">
         <a:solidFill>
           <a:srgbClr val="000000"/>
         </a:solidFill>
@@ -620,7 +635,7 @@
         <a:sym typeface="Arial"/>
       </a:defRPr>
     </a:lvl6pPr>
-    <a:lvl7pPr lvl="6" marR="0" rtl="0" algn="l">
+    <a:lvl7pPr marR="0" lvl="6" algn="l" rtl="0">
       <a:lnSpc>
         <a:spcPct val="100000"/>
       </a:lnSpc>
@@ -634,7 +649,7 @@
         <a:srgbClr val="000000"/>
       </a:buClr>
       <a:buFont typeface="Arial"/>
-      <a:defRPr b="0" i="0" sz="1400" u="none" cap="none" strike="noStrike">
+      <a:defRPr sz="1400" b="0" i="0" u="none" strike="noStrike" cap="none">
         <a:solidFill>
           <a:srgbClr val="000000"/>
         </a:solidFill>
@@ -644,7 +659,7 @@
         <a:sym typeface="Arial"/>
       </a:defRPr>
     </a:lvl7pPr>
-    <a:lvl8pPr lvl="7" marR="0" rtl="0" algn="l">
+    <a:lvl8pPr marR="0" lvl="7" algn="l" rtl="0">
       <a:lnSpc>
         <a:spcPct val="100000"/>
       </a:lnSpc>
@@ -658,7 +673,7 @@
         <a:srgbClr val="000000"/>
       </a:buClr>
       <a:buFont typeface="Arial"/>
-      <a:defRPr b="0" i="0" sz="1400" u="none" cap="none" strike="noStrike">
+      <a:defRPr sz="1400" b="0" i="0" u="none" strike="noStrike" cap="none">
         <a:solidFill>
           <a:srgbClr val="000000"/>
         </a:solidFill>
@@ -668,7 +683,7 @@
         <a:sym typeface="Arial"/>
       </a:defRPr>
     </a:lvl8pPr>
-    <a:lvl9pPr lvl="8" marR="0" rtl="0" algn="l">
+    <a:lvl9pPr marR="0" lvl="8" algn="l" rtl="0">
       <a:lnSpc>
         <a:spcPct val="100000"/>
       </a:lnSpc>
@@ -682,7 +697,7 @@
         <a:srgbClr val="000000"/>
       </a:buClr>
       <a:buFont typeface="Arial"/>
-      <a:defRPr b="0" i="0" sz="1400" u="none" cap="none" strike="noStrike">
+      <a:defRPr sz="1400" b="0" i="0" u="none" strike="noStrike" cap="none">
         <a:solidFill>
           <a:srgbClr val="000000"/>
         </a:solidFill>
@@ -697,11 +712,11 @@
 </file>
 
 <file path=ppt/notesSlides/notesSlide1.xml><?xml version="1.0" encoding="utf-8"?>
-<p:notes xmlns:a="http://schemas.openxmlformats.org/drawingml/2006/main" xmlns:r="http://schemas.openxmlformats.org/officeDocument/2006/relationships" xmlns:mc="http://schemas.openxmlformats.org/markup-compatibility/2006" xmlns:mv="urn:schemas-microsoft-com:mac:vml" xmlns:p="http://schemas.openxmlformats.org/presentationml/2006/main" xmlns:c="http://schemas.openxmlformats.org/drawingml/2006/chart" xmlns:dgm="http://schemas.openxmlformats.org/drawingml/2006/diagram" xmlns:o="urn:schemas-microsoft-com:office:office" xmlns:v="urn:schemas-microsoft-com:vml" xmlns:pvml="urn:schemas-microsoft-com:office:powerpoint" xmlns:com="http://schemas.openxmlformats.org/drawingml/2006/compatibility" xmlns:p14="http://schemas.microsoft.com/office/powerpoint/2010/main" xmlns:p15="http://schemas.microsoft.com/office/powerpoint/2012/main" xmlns:ahyp="http://schemas.microsoft.com/office/drawing/2018/hyperlinkcolor" showMasterPhAnim="0" showMasterSp="0">
+<p:notes xmlns:a="http://schemas.openxmlformats.org/drawingml/2006/main" xmlns:r="http://schemas.openxmlformats.org/officeDocument/2006/relationships" xmlns:p="http://schemas.openxmlformats.org/presentationml/2006/main" showMasterSp="0" showMasterPhAnim="0">
   <p:cSld>
     <p:spTree>
       <p:nvGrpSpPr>
-        <p:cNvPr id="50" name="Shape 50"/>
+        <p:cNvPr id="1" name="Shape 50"/>
         <p:cNvGrpSpPr/>
         <p:nvPr/>
       </p:nvGrpSpPr>
@@ -716,20 +731,26 @@
       <p:sp>
         <p:nvSpPr>
           <p:cNvPr id="51" name="Google Shape;51;p:notes"/>
-          <p:cNvSpPr/>
+          <p:cNvSpPr>
+            <a:spLocks noGrp="1" noRot="1" noChangeAspect="1"/>
+          </p:cNvSpPr>
           <p:nvPr>
-            <p:ph idx="2" type="sldImg"/>
+            <p:ph type="sldImg" idx="2"/>
           </p:nvPr>
         </p:nvSpPr>
         <p:spPr>
           <a:xfrm>
-            <a:off x="381300" y="685800"/>
-            <a:ext cx="6096075" cy="3429000"/>
+            <a:off x="381000" y="685800"/>
+            <a:ext cx="6096000" cy="3429000"/>
           </a:xfrm>
           <a:custGeom>
-            <a:rect b="b" l="l" r="r" t="t"/>
+            <a:avLst/>
+            <a:gdLst/>
+            <a:ahLst/>
+            <a:cxnLst/>
+            <a:rect l="l" t="t" r="r" b="b"/>
             <a:pathLst>
-              <a:path extrusionOk="0" h="120000" w="120000">
+              <a:path w="120000" h="120000" extrusionOk="0">
                 <a:moveTo>
                   <a:pt x="0" y="0"/>
                 </a:moveTo>
@@ -751,9 +772,11 @@
       <p:sp>
         <p:nvSpPr>
           <p:cNvPr id="52" name="Google Shape;52;p:notes"/>
-          <p:cNvSpPr txBox="1"/>
+          <p:cNvSpPr txBox="1">
+            <a:spLocks noGrp="1"/>
+          </p:cNvSpPr>
           <p:nvPr>
-            <p:ph idx="1" type="body"/>
+            <p:ph type="body" idx="1"/>
           </p:nvPr>
         </p:nvSpPr>
         <p:spPr>
@@ -766,12 +789,12 @@
           </a:prstGeom>
         </p:spPr>
         <p:txBody>
-          <a:bodyPr anchorCtr="0" anchor="t" bIns="91425" lIns="91425" spcFirstLastPara="1" rIns="91425" wrap="square" tIns="91425">
+          <a:bodyPr spcFirstLastPara="1" wrap="square" lIns="91425" tIns="91425" rIns="91425" bIns="91425" anchor="t" anchorCtr="0">
             <a:noAutofit/>
           </a:bodyPr>
           <a:lstStyle/>
           <a:p>
-            <a:pPr indent="0" lvl="0" marL="0" rtl="0" algn="l">
+            <a:pPr marL="0" lvl="0" indent="0" algn="l" rtl="0">
               <a:spcBef>
                 <a:spcPts val="0"/>
               </a:spcBef>
@@ -780,9 +803,6 @@
               </a:spcAft>
               <a:buNone/>
             </a:pPr>
-            <a:r>
-              <a:t/>
-            </a:r>
             <a:endParaRPr/>
           </a:p>
         </p:txBody>
@@ -796,11 +816,11 @@
 </file>
 
 <file path=ppt/notesSlides/notesSlide2.xml><?xml version="1.0" encoding="utf-8"?>
-<p:notes xmlns:a="http://schemas.openxmlformats.org/drawingml/2006/main" xmlns:r="http://schemas.openxmlformats.org/officeDocument/2006/relationships" xmlns:mc="http://schemas.openxmlformats.org/markup-compatibility/2006" xmlns:mv="urn:schemas-microsoft-com:mac:vml" xmlns:p="http://schemas.openxmlformats.org/presentationml/2006/main" xmlns:c="http://schemas.openxmlformats.org/drawingml/2006/chart" xmlns:dgm="http://schemas.openxmlformats.org/drawingml/2006/diagram" xmlns:o="urn:schemas-microsoft-com:office:office" xmlns:v="urn:schemas-microsoft-com:vml" xmlns:pvml="urn:schemas-microsoft-com:office:powerpoint" xmlns:com="http://schemas.openxmlformats.org/drawingml/2006/compatibility" xmlns:p14="http://schemas.microsoft.com/office/powerpoint/2010/main" xmlns:p15="http://schemas.microsoft.com/office/powerpoint/2012/main" xmlns:ahyp="http://schemas.microsoft.com/office/drawing/2018/hyperlinkcolor" showMasterPhAnim="0" showMasterSp="0">
+<p:notes xmlns:a="http://schemas.openxmlformats.org/drawingml/2006/main" xmlns:r="http://schemas.openxmlformats.org/officeDocument/2006/relationships" xmlns:p="http://schemas.openxmlformats.org/presentationml/2006/main" showMasterSp="0" showMasterPhAnim="0">
   <p:cSld>
     <p:spTree>
       <p:nvGrpSpPr>
-        <p:cNvPr id="87" name="Shape 87"/>
+        <p:cNvPr id="1" name="Shape 87"/>
         <p:cNvGrpSpPr/>
         <p:nvPr/>
       </p:nvGrpSpPr>
@@ -815,20 +835,26 @@
       <p:sp>
         <p:nvSpPr>
           <p:cNvPr id="88" name="Google Shape;88;ga89e5bffec_0_449:notes"/>
-          <p:cNvSpPr/>
+          <p:cNvSpPr>
+            <a:spLocks noGrp="1" noRot="1" noChangeAspect="1"/>
+          </p:cNvSpPr>
           <p:nvPr>
-            <p:ph idx="2" type="sldImg"/>
+            <p:ph type="sldImg" idx="2"/>
           </p:nvPr>
         </p:nvSpPr>
         <p:spPr>
           <a:xfrm>
-            <a:off x="381300" y="685800"/>
+            <a:off x="381000" y="685800"/>
             <a:ext cx="6096000" cy="3429000"/>
           </a:xfrm>
           <a:custGeom>
-            <a:rect b="b" l="l" r="r" t="t"/>
+            <a:avLst/>
+            <a:gdLst/>
+            <a:ahLst/>
+            <a:cxnLst/>
+            <a:rect l="l" t="t" r="r" b="b"/>
             <a:pathLst>
-              <a:path extrusionOk="0" h="120000" w="120000">
+              <a:path w="120000" h="120000" extrusionOk="0">
                 <a:moveTo>
                   <a:pt x="0" y="0"/>
                 </a:moveTo>
@@ -850,9 +876,11 @@
       <p:sp>
         <p:nvSpPr>
           <p:cNvPr id="89" name="Google Shape;89;ga89e5bffec_0_449:notes"/>
-          <p:cNvSpPr txBox="1"/>
+          <p:cNvSpPr txBox="1">
+            <a:spLocks noGrp="1"/>
+          </p:cNvSpPr>
           <p:nvPr>
-            <p:ph idx="1" type="body"/>
+            <p:ph type="body" idx="1"/>
           </p:nvPr>
         </p:nvSpPr>
         <p:spPr>
@@ -865,12 +893,12 @@
           </a:prstGeom>
         </p:spPr>
         <p:txBody>
-          <a:bodyPr anchorCtr="0" anchor="t" bIns="91425" lIns="91425" spcFirstLastPara="1" rIns="91425" wrap="square" tIns="91425">
+          <a:bodyPr spcFirstLastPara="1" wrap="square" lIns="91425" tIns="91425" rIns="91425" bIns="91425" anchor="t" anchorCtr="0">
             <a:noAutofit/>
           </a:bodyPr>
           <a:lstStyle/>
           <a:p>
-            <a:pPr indent="0" lvl="0" marL="0" rtl="0" algn="l">
+            <a:pPr marL="0" lvl="0" indent="0" algn="l" rtl="0">
               <a:spcBef>
                 <a:spcPts val="0"/>
               </a:spcBef>
@@ -879,9 +907,6 @@
               </a:spcAft>
               <a:buNone/>
             </a:pPr>
-            <a:r>
-              <a:t/>
-            </a:r>
             <a:endParaRPr/>
           </a:p>
         </p:txBody>
@@ -895,11 +920,11 @@
 </file>
 
 <file path=ppt/slideLayouts/slideLayout1.xml><?xml version="1.0" encoding="utf-8"?>
-<p:sldLayout xmlns:a="http://schemas.openxmlformats.org/drawingml/2006/main" xmlns:r="http://schemas.openxmlformats.org/officeDocument/2006/relationships" xmlns:mc="http://schemas.openxmlformats.org/markup-compatibility/2006" xmlns:mv="urn:schemas-microsoft-com:mac:vml" xmlns:p="http://schemas.openxmlformats.org/presentationml/2006/main" xmlns:c="http://schemas.openxmlformats.org/drawingml/2006/chart" xmlns:dgm="http://schemas.openxmlformats.org/drawingml/2006/diagram" xmlns:o="urn:schemas-microsoft-com:office:office" xmlns:v="urn:schemas-microsoft-com:vml" xmlns:pvml="urn:schemas-microsoft-com:office:powerpoint" xmlns:com="http://schemas.openxmlformats.org/drawingml/2006/compatibility" xmlns:p14="http://schemas.microsoft.com/office/powerpoint/2010/main" xmlns:p15="http://schemas.microsoft.com/office/powerpoint/2012/main" xmlns:ahyp="http://schemas.microsoft.com/office/drawing/2018/hyperlinkcolor" matchingName="Title slide" type="title">
+<p:sldLayout xmlns:a="http://schemas.openxmlformats.org/drawingml/2006/main" xmlns:r="http://schemas.openxmlformats.org/officeDocument/2006/relationships" xmlns:p="http://schemas.openxmlformats.org/presentationml/2006/main" matchingName="Title slide" type="title">
   <p:cSld name="TITLE">
     <p:spTree>
       <p:nvGrpSpPr>
-        <p:cNvPr id="9" name="Shape 9"/>
+        <p:cNvPr id="1" name="Shape 9"/>
         <p:cNvGrpSpPr/>
         <p:nvPr/>
       </p:nvGrpSpPr>
@@ -914,7 +939,9 @@
       <p:sp>
         <p:nvSpPr>
           <p:cNvPr id="10" name="Google Shape;10;p2"/>
-          <p:cNvSpPr txBox="1"/>
+          <p:cNvSpPr txBox="1">
+            <a:spLocks noGrp="1"/>
+          </p:cNvSpPr>
           <p:nvPr>
             <p:ph type="ctrTitle"/>
           </p:nvPr>
@@ -929,7 +956,7 @@
           </a:prstGeom>
         </p:spPr>
         <p:txBody>
-          <a:bodyPr anchorCtr="0" anchor="b" bIns="91425" lIns="91425" spcFirstLastPara="1" rIns="91425" wrap="square" tIns="91425">
+          <a:bodyPr spcFirstLastPara="1" wrap="square" lIns="91425" tIns="91425" rIns="91425" bIns="91425" anchor="b" anchorCtr="0">
             <a:noAutofit/>
           </a:bodyPr>
           <a:lstStyle>
@@ -1033,15 +1060,19 @@
               <a:defRPr sz="5200"/>
             </a:lvl9pPr>
           </a:lstStyle>
-          <a:p/>
+          <a:p>
+            <a:endParaRPr/>
+          </a:p>
         </p:txBody>
       </p:sp>
       <p:sp>
         <p:nvSpPr>
           <p:cNvPr id="11" name="Google Shape;11;p2"/>
-          <p:cNvSpPr txBox="1"/>
+          <p:cNvSpPr txBox="1">
+            <a:spLocks noGrp="1"/>
+          </p:cNvSpPr>
           <p:nvPr>
-            <p:ph idx="1" type="subTitle"/>
+            <p:ph type="subTitle" idx="1"/>
           </p:nvPr>
         </p:nvSpPr>
         <p:spPr>
@@ -1054,7 +1085,7 @@
           </a:prstGeom>
         </p:spPr>
         <p:txBody>
-          <a:bodyPr anchorCtr="0" anchor="t" bIns="91425" lIns="91425" spcFirstLastPara="1" rIns="91425" wrap="square" tIns="91425">
+          <a:bodyPr spcFirstLastPara="1" wrap="square" lIns="91425" tIns="91425" rIns="91425" bIns="91425" anchor="t" anchorCtr="0">
             <a:noAutofit/>
           </a:bodyPr>
           <a:lstStyle>
@@ -1185,15 +1216,19 @@
               <a:defRPr sz="2800"/>
             </a:lvl9pPr>
           </a:lstStyle>
-          <a:p/>
+          <a:p>
+            <a:endParaRPr/>
+          </a:p>
         </p:txBody>
       </p:sp>
       <p:sp>
         <p:nvSpPr>
           <p:cNvPr id="12" name="Google Shape;12;p2"/>
-          <p:cNvSpPr txBox="1"/>
+          <p:cNvSpPr txBox="1">
+            <a:spLocks noGrp="1"/>
+          </p:cNvSpPr>
           <p:nvPr>
-            <p:ph idx="12" type="sldNum"/>
+            <p:ph type="sldNum" idx="12"/>
           </p:nvPr>
         </p:nvSpPr>
         <p:spPr>
@@ -1206,7 +1241,7 @@
           </a:prstGeom>
         </p:spPr>
         <p:txBody>
-          <a:bodyPr anchorCtr="0" anchor="ctr" bIns="91425" lIns="91425" spcFirstLastPara="1" rIns="91425" wrap="square" tIns="91425">
+          <a:bodyPr spcFirstLastPara="1" wrap="square" lIns="91425" tIns="91425" rIns="91425" bIns="91425" anchor="ctr" anchorCtr="0">
             <a:noAutofit/>
           </a:bodyPr>
           <a:lstStyle>
@@ -1248,7 +1283,7 @@
             </a:lvl9pPr>
           </a:lstStyle>
           <a:p>
-            <a:pPr indent="0" lvl="0" marL="0" rtl="0" algn="r">
+            <a:pPr marL="0" lvl="0" indent="0" algn="r" rtl="0">
               <a:spcBef>
                 <a:spcPts val="0"/>
               </a:spcBef>
@@ -1259,7 +1294,7 @@
             </a:pPr>
             <a:fld id="{00000000-1234-1234-1234-123412341234}" type="slidenum">
               <a:rPr lang="pt-BR"/>
-              <a:t>‹#›</a:t>
+              <a:t>‹nº›</a:t>
             </a:fld>
             <a:endParaRPr/>
           </a:p>
@@ -1274,11 +1309,11 @@
 </file>
 
 <file path=ppt/slideLayouts/slideLayout10.xml><?xml version="1.0" encoding="utf-8"?>
-<p:sldLayout xmlns:a="http://schemas.openxmlformats.org/drawingml/2006/main" xmlns:r="http://schemas.openxmlformats.org/officeDocument/2006/relationships" xmlns:mc="http://schemas.openxmlformats.org/markup-compatibility/2006" xmlns:mv="urn:schemas-microsoft-com:mac:vml" xmlns:p="http://schemas.openxmlformats.org/presentationml/2006/main" xmlns:c="http://schemas.openxmlformats.org/drawingml/2006/chart" xmlns:dgm="http://schemas.openxmlformats.org/drawingml/2006/diagram" xmlns:o="urn:schemas-microsoft-com:office:office" xmlns:v="urn:schemas-microsoft-com:vml" xmlns:pvml="urn:schemas-microsoft-com:office:powerpoint" xmlns:com="http://schemas.openxmlformats.org/drawingml/2006/compatibility" xmlns:p14="http://schemas.microsoft.com/office/powerpoint/2010/main" xmlns:p15="http://schemas.microsoft.com/office/powerpoint/2012/main" xmlns:ahyp="http://schemas.microsoft.com/office/drawing/2018/hyperlinkcolor" matchingName="Big number">
+<p:sldLayout xmlns:a="http://schemas.openxmlformats.org/drawingml/2006/main" xmlns:r="http://schemas.openxmlformats.org/officeDocument/2006/relationships" xmlns:p="http://schemas.openxmlformats.org/presentationml/2006/main" matchingName="Big number">
   <p:cSld name="BIG_NUMBER">
     <p:spTree>
       <p:nvGrpSpPr>
-        <p:cNvPr id="44" name="Shape 44"/>
+        <p:cNvPr id="1" name="Shape 44"/>
         <p:cNvGrpSpPr/>
         <p:nvPr/>
       </p:nvGrpSpPr>
@@ -1293,9 +1328,11 @@
       <p:sp>
         <p:nvSpPr>
           <p:cNvPr id="45" name="Google Shape;45;p11"/>
-          <p:cNvSpPr txBox="1"/>
+          <p:cNvSpPr txBox="1">
+            <a:spLocks noGrp="1"/>
+          </p:cNvSpPr>
           <p:nvPr>
-            <p:ph hasCustomPrompt="1" type="title"/>
+            <p:ph type="title" hasCustomPrompt="1"/>
           </p:nvPr>
         </p:nvSpPr>
         <p:spPr>
@@ -1308,7 +1345,7 @@
           </a:prstGeom>
         </p:spPr>
         <p:txBody>
-          <a:bodyPr anchorCtr="0" anchor="b" bIns="91425" lIns="91425" spcFirstLastPara="1" rIns="91425" wrap="square" tIns="91425">
+          <a:bodyPr spcFirstLastPara="1" wrap="square" lIns="91425" tIns="91425" rIns="91425" bIns="91425" anchor="b" anchorCtr="0">
             <a:noAutofit/>
           </a:bodyPr>
           <a:lstStyle>
@@ -1422,9 +1459,11 @@
       <p:sp>
         <p:nvSpPr>
           <p:cNvPr id="46" name="Google Shape;46;p11"/>
-          <p:cNvSpPr txBox="1"/>
+          <p:cNvSpPr txBox="1">
+            <a:spLocks noGrp="1"/>
+          </p:cNvSpPr>
           <p:nvPr>
-            <p:ph idx="1" type="body"/>
+            <p:ph type="body" idx="1"/>
           </p:nvPr>
         </p:nvSpPr>
         <p:spPr>
@@ -1437,11 +1476,11 @@
           </a:prstGeom>
         </p:spPr>
         <p:txBody>
-          <a:bodyPr anchorCtr="0" anchor="t" bIns="91425" lIns="91425" spcFirstLastPara="1" rIns="91425" wrap="square" tIns="91425">
+          <a:bodyPr spcFirstLastPara="1" wrap="square" lIns="91425" tIns="91425" rIns="91425" bIns="91425" anchor="t" anchorCtr="0">
             <a:noAutofit/>
           </a:bodyPr>
           <a:lstStyle>
-            <a:lvl1pPr indent="-342900" lvl="0" marL="457200" algn="ctr">
+            <a:lvl1pPr marL="457200" lvl="0" indent="-342900" algn="ctr">
               <a:spcBef>
                 <a:spcPts val="0"/>
               </a:spcBef>
@@ -1452,7 +1491,7 @@
               <a:buChar char="●"/>
               <a:defRPr/>
             </a:lvl1pPr>
-            <a:lvl2pPr indent="-317500" lvl="1" marL="914400" algn="ctr">
+            <a:lvl2pPr marL="914400" lvl="1" indent="-317500" algn="ctr">
               <a:spcBef>
                 <a:spcPts val="1600"/>
               </a:spcBef>
@@ -1463,7 +1502,7 @@
               <a:buChar char="○"/>
               <a:defRPr/>
             </a:lvl2pPr>
-            <a:lvl3pPr indent="-317500" lvl="2" marL="1371600" algn="ctr">
+            <a:lvl3pPr marL="1371600" lvl="2" indent="-317500" algn="ctr">
               <a:spcBef>
                 <a:spcPts val="1600"/>
               </a:spcBef>
@@ -1474,7 +1513,7 @@
               <a:buChar char="■"/>
               <a:defRPr/>
             </a:lvl3pPr>
-            <a:lvl4pPr indent="-317500" lvl="3" marL="1828800" algn="ctr">
+            <a:lvl4pPr marL="1828800" lvl="3" indent="-317500" algn="ctr">
               <a:spcBef>
                 <a:spcPts val="1600"/>
               </a:spcBef>
@@ -1485,7 +1524,7 @@
               <a:buChar char="●"/>
               <a:defRPr/>
             </a:lvl4pPr>
-            <a:lvl5pPr indent="-317500" lvl="4" marL="2286000" algn="ctr">
+            <a:lvl5pPr marL="2286000" lvl="4" indent="-317500" algn="ctr">
               <a:spcBef>
                 <a:spcPts val="1600"/>
               </a:spcBef>
@@ -1496,7 +1535,7 @@
               <a:buChar char="○"/>
               <a:defRPr/>
             </a:lvl5pPr>
-            <a:lvl6pPr indent="-317500" lvl="5" marL="2743200" algn="ctr">
+            <a:lvl6pPr marL="2743200" lvl="5" indent="-317500" algn="ctr">
               <a:spcBef>
                 <a:spcPts val="1600"/>
               </a:spcBef>
@@ -1507,7 +1546,7 @@
               <a:buChar char="■"/>
               <a:defRPr/>
             </a:lvl6pPr>
-            <a:lvl7pPr indent="-317500" lvl="6" marL="3200400" algn="ctr">
+            <a:lvl7pPr marL="3200400" lvl="6" indent="-317500" algn="ctr">
               <a:spcBef>
                 <a:spcPts val="1600"/>
               </a:spcBef>
@@ -1518,7 +1557,7 @@
               <a:buChar char="●"/>
               <a:defRPr/>
             </a:lvl7pPr>
-            <a:lvl8pPr indent="-317500" lvl="7" marL="3657600" algn="ctr">
+            <a:lvl8pPr marL="3657600" lvl="7" indent="-317500" algn="ctr">
               <a:spcBef>
                 <a:spcPts val="1600"/>
               </a:spcBef>
@@ -1529,7 +1568,7 @@
               <a:buChar char="○"/>
               <a:defRPr/>
             </a:lvl8pPr>
-            <a:lvl9pPr indent="-317500" lvl="8" marL="4114800" algn="ctr">
+            <a:lvl9pPr marL="4114800" lvl="8" indent="-317500" algn="ctr">
               <a:spcBef>
                 <a:spcPts val="1600"/>
               </a:spcBef>
@@ -1541,15 +1580,19 @@
               <a:defRPr/>
             </a:lvl9pPr>
           </a:lstStyle>
-          <a:p/>
+          <a:p>
+            <a:endParaRPr/>
+          </a:p>
         </p:txBody>
       </p:sp>
       <p:sp>
         <p:nvSpPr>
           <p:cNvPr id="47" name="Google Shape;47;p11"/>
-          <p:cNvSpPr txBox="1"/>
+          <p:cNvSpPr txBox="1">
+            <a:spLocks noGrp="1"/>
+          </p:cNvSpPr>
           <p:nvPr>
-            <p:ph idx="12" type="sldNum"/>
+            <p:ph type="sldNum" idx="12"/>
           </p:nvPr>
         </p:nvSpPr>
         <p:spPr>
@@ -1562,7 +1605,7 @@
           </a:prstGeom>
         </p:spPr>
         <p:txBody>
-          <a:bodyPr anchorCtr="0" anchor="ctr" bIns="91425" lIns="91425" spcFirstLastPara="1" rIns="91425" wrap="square" tIns="91425">
+          <a:bodyPr spcFirstLastPara="1" wrap="square" lIns="91425" tIns="91425" rIns="91425" bIns="91425" anchor="ctr" anchorCtr="0">
             <a:noAutofit/>
           </a:bodyPr>
           <a:lstStyle>
@@ -1604,7 +1647,7 @@
             </a:lvl9pPr>
           </a:lstStyle>
           <a:p>
-            <a:pPr indent="0" lvl="0" marL="0" rtl="0" algn="r">
+            <a:pPr marL="0" lvl="0" indent="0" algn="r" rtl="0">
               <a:spcBef>
                 <a:spcPts val="0"/>
               </a:spcBef>
@@ -1615,7 +1658,7 @@
             </a:pPr>
             <a:fld id="{00000000-1234-1234-1234-123412341234}" type="slidenum">
               <a:rPr lang="pt-BR"/>
-              <a:t>‹#›</a:t>
+              <a:t>‹nº›</a:t>
             </a:fld>
             <a:endParaRPr/>
           </a:p>
@@ -1630,11 +1673,11 @@
 </file>
 
 <file path=ppt/slideLayouts/slideLayout11.xml><?xml version="1.0" encoding="utf-8"?>
-<p:sldLayout xmlns:a="http://schemas.openxmlformats.org/drawingml/2006/main" xmlns:r="http://schemas.openxmlformats.org/officeDocument/2006/relationships" xmlns:mc="http://schemas.openxmlformats.org/markup-compatibility/2006" xmlns:mv="urn:schemas-microsoft-com:mac:vml" xmlns:p="http://schemas.openxmlformats.org/presentationml/2006/main" xmlns:c="http://schemas.openxmlformats.org/drawingml/2006/chart" xmlns:dgm="http://schemas.openxmlformats.org/drawingml/2006/diagram" xmlns:o="urn:schemas-microsoft-com:office:office" xmlns:v="urn:schemas-microsoft-com:vml" xmlns:pvml="urn:schemas-microsoft-com:office:powerpoint" xmlns:com="http://schemas.openxmlformats.org/drawingml/2006/compatibility" xmlns:p14="http://schemas.microsoft.com/office/powerpoint/2010/main" xmlns:p15="http://schemas.microsoft.com/office/powerpoint/2012/main" xmlns:ahyp="http://schemas.microsoft.com/office/drawing/2018/hyperlinkcolor" matchingName="Blank" type="blank">
+<p:sldLayout xmlns:a="http://schemas.openxmlformats.org/drawingml/2006/main" xmlns:r="http://schemas.openxmlformats.org/officeDocument/2006/relationships" xmlns:p="http://schemas.openxmlformats.org/presentationml/2006/main" matchingName="Blank" type="blank">
   <p:cSld name="BLANK">
     <p:spTree>
       <p:nvGrpSpPr>
-        <p:cNvPr id="48" name="Shape 48"/>
+        <p:cNvPr id="1" name="Shape 48"/>
         <p:cNvGrpSpPr/>
         <p:nvPr/>
       </p:nvGrpSpPr>
@@ -1649,9 +1692,11 @@
       <p:sp>
         <p:nvSpPr>
           <p:cNvPr id="49" name="Google Shape;49;p12"/>
-          <p:cNvSpPr txBox="1"/>
+          <p:cNvSpPr txBox="1">
+            <a:spLocks noGrp="1"/>
+          </p:cNvSpPr>
           <p:nvPr>
-            <p:ph idx="12" type="sldNum"/>
+            <p:ph type="sldNum" idx="12"/>
           </p:nvPr>
         </p:nvSpPr>
         <p:spPr>
@@ -1664,7 +1709,7 @@
           </a:prstGeom>
         </p:spPr>
         <p:txBody>
-          <a:bodyPr anchorCtr="0" anchor="ctr" bIns="91425" lIns="91425" spcFirstLastPara="1" rIns="91425" wrap="square" tIns="91425">
+          <a:bodyPr spcFirstLastPara="1" wrap="square" lIns="91425" tIns="91425" rIns="91425" bIns="91425" anchor="ctr" anchorCtr="0">
             <a:noAutofit/>
           </a:bodyPr>
           <a:lstStyle>
@@ -1706,7 +1751,7 @@
             </a:lvl9pPr>
           </a:lstStyle>
           <a:p>
-            <a:pPr indent="0" lvl="0" marL="0" rtl="0" algn="r">
+            <a:pPr marL="0" lvl="0" indent="0" algn="r" rtl="0">
               <a:spcBef>
                 <a:spcPts val="0"/>
               </a:spcBef>
@@ -1717,7 +1762,7 @@
             </a:pPr>
             <a:fld id="{00000000-1234-1234-1234-123412341234}" type="slidenum">
               <a:rPr lang="pt-BR"/>
-              <a:t>‹#›</a:t>
+              <a:t>‹nº›</a:t>
             </a:fld>
             <a:endParaRPr/>
           </a:p>
@@ -1732,11 +1777,11 @@
 </file>
 
 <file path=ppt/slideLayouts/slideLayout2.xml><?xml version="1.0" encoding="utf-8"?>
-<p:sldLayout xmlns:a="http://schemas.openxmlformats.org/drawingml/2006/main" xmlns:r="http://schemas.openxmlformats.org/officeDocument/2006/relationships" xmlns:mc="http://schemas.openxmlformats.org/markup-compatibility/2006" xmlns:mv="urn:schemas-microsoft-com:mac:vml" xmlns:p="http://schemas.openxmlformats.org/presentationml/2006/main" xmlns:c="http://schemas.openxmlformats.org/drawingml/2006/chart" xmlns:dgm="http://schemas.openxmlformats.org/drawingml/2006/diagram" xmlns:o="urn:schemas-microsoft-com:office:office" xmlns:v="urn:schemas-microsoft-com:vml" xmlns:pvml="urn:schemas-microsoft-com:office:powerpoint" xmlns:com="http://schemas.openxmlformats.org/drawingml/2006/compatibility" xmlns:p14="http://schemas.microsoft.com/office/powerpoint/2010/main" xmlns:p15="http://schemas.microsoft.com/office/powerpoint/2012/main" xmlns:ahyp="http://schemas.microsoft.com/office/drawing/2018/hyperlinkcolor" matchingName="Section header" type="secHead">
+<p:sldLayout xmlns:a="http://schemas.openxmlformats.org/drawingml/2006/main" xmlns:r="http://schemas.openxmlformats.org/officeDocument/2006/relationships" xmlns:p="http://schemas.openxmlformats.org/presentationml/2006/main" matchingName="Section header" type="secHead">
   <p:cSld name="SECTION_HEADER">
     <p:spTree>
       <p:nvGrpSpPr>
-        <p:cNvPr id="13" name="Shape 13"/>
+        <p:cNvPr id="1" name="Shape 13"/>
         <p:cNvGrpSpPr/>
         <p:nvPr/>
       </p:nvGrpSpPr>
@@ -1751,7 +1796,9 @@
       <p:sp>
         <p:nvSpPr>
           <p:cNvPr id="14" name="Google Shape;14;p3"/>
-          <p:cNvSpPr txBox="1"/>
+          <p:cNvSpPr txBox="1">
+            <a:spLocks noGrp="1"/>
+          </p:cNvSpPr>
           <p:nvPr>
             <p:ph type="title"/>
           </p:nvPr>
@@ -1766,7 +1813,7 @@
           </a:prstGeom>
         </p:spPr>
         <p:txBody>
-          <a:bodyPr anchorCtr="0" anchor="ctr" bIns="91425" lIns="91425" spcFirstLastPara="1" rIns="91425" wrap="square" tIns="91425">
+          <a:bodyPr spcFirstLastPara="1" wrap="square" lIns="91425" tIns="91425" rIns="91425" bIns="91425" anchor="ctr" anchorCtr="0">
             <a:noAutofit/>
           </a:bodyPr>
           <a:lstStyle>
@@ -1870,15 +1917,19 @@
               <a:defRPr sz="3600"/>
             </a:lvl9pPr>
           </a:lstStyle>
-          <a:p/>
+          <a:p>
+            <a:endParaRPr/>
+          </a:p>
         </p:txBody>
       </p:sp>
       <p:sp>
         <p:nvSpPr>
           <p:cNvPr id="15" name="Google Shape;15;p3"/>
-          <p:cNvSpPr txBox="1"/>
+          <p:cNvSpPr txBox="1">
+            <a:spLocks noGrp="1"/>
+          </p:cNvSpPr>
           <p:nvPr>
-            <p:ph idx="12" type="sldNum"/>
+            <p:ph type="sldNum" idx="12"/>
           </p:nvPr>
         </p:nvSpPr>
         <p:spPr>
@@ -1891,7 +1942,7 @@
           </a:prstGeom>
         </p:spPr>
         <p:txBody>
-          <a:bodyPr anchorCtr="0" anchor="ctr" bIns="91425" lIns="91425" spcFirstLastPara="1" rIns="91425" wrap="square" tIns="91425">
+          <a:bodyPr spcFirstLastPara="1" wrap="square" lIns="91425" tIns="91425" rIns="91425" bIns="91425" anchor="ctr" anchorCtr="0">
             <a:noAutofit/>
           </a:bodyPr>
           <a:lstStyle>
@@ -1933,7 +1984,7 @@
             </a:lvl9pPr>
           </a:lstStyle>
           <a:p>
-            <a:pPr indent="0" lvl="0" marL="0" rtl="0" algn="r">
+            <a:pPr marL="0" lvl="0" indent="0" algn="r" rtl="0">
               <a:spcBef>
                 <a:spcPts val="0"/>
               </a:spcBef>
@@ -1944,7 +1995,7 @@
             </a:pPr>
             <a:fld id="{00000000-1234-1234-1234-123412341234}" type="slidenum">
               <a:rPr lang="pt-BR"/>
-              <a:t>‹#›</a:t>
+              <a:t>‹nº›</a:t>
             </a:fld>
             <a:endParaRPr/>
           </a:p>
@@ -1959,11 +2010,11 @@
 </file>
 
 <file path=ppt/slideLayouts/slideLayout3.xml><?xml version="1.0" encoding="utf-8"?>
-<p:sldLayout xmlns:a="http://schemas.openxmlformats.org/drawingml/2006/main" xmlns:r="http://schemas.openxmlformats.org/officeDocument/2006/relationships" xmlns:mc="http://schemas.openxmlformats.org/markup-compatibility/2006" xmlns:mv="urn:schemas-microsoft-com:mac:vml" xmlns:p="http://schemas.openxmlformats.org/presentationml/2006/main" xmlns:c="http://schemas.openxmlformats.org/drawingml/2006/chart" xmlns:dgm="http://schemas.openxmlformats.org/drawingml/2006/diagram" xmlns:o="urn:schemas-microsoft-com:office:office" xmlns:v="urn:schemas-microsoft-com:vml" xmlns:pvml="urn:schemas-microsoft-com:office:powerpoint" xmlns:com="http://schemas.openxmlformats.org/drawingml/2006/compatibility" xmlns:p14="http://schemas.microsoft.com/office/powerpoint/2010/main" xmlns:p15="http://schemas.microsoft.com/office/powerpoint/2012/main" xmlns:ahyp="http://schemas.microsoft.com/office/drawing/2018/hyperlinkcolor" matchingName="Title and body" type="tx">
+<p:sldLayout xmlns:a="http://schemas.openxmlformats.org/drawingml/2006/main" xmlns:r="http://schemas.openxmlformats.org/officeDocument/2006/relationships" xmlns:p="http://schemas.openxmlformats.org/presentationml/2006/main" matchingName="Title and body" type="tx">
   <p:cSld name="TITLE_AND_BODY">
     <p:spTree>
       <p:nvGrpSpPr>
-        <p:cNvPr id="16" name="Shape 16"/>
+        <p:cNvPr id="1" name="Shape 16"/>
         <p:cNvGrpSpPr/>
         <p:nvPr/>
       </p:nvGrpSpPr>
@@ -1978,7 +2029,9 @@
       <p:sp>
         <p:nvSpPr>
           <p:cNvPr id="17" name="Google Shape;17;p4"/>
-          <p:cNvSpPr txBox="1"/>
+          <p:cNvSpPr txBox="1">
+            <a:spLocks noGrp="1"/>
+          </p:cNvSpPr>
           <p:nvPr>
             <p:ph type="title"/>
           </p:nvPr>
@@ -1993,7 +2046,7 @@
           </a:prstGeom>
         </p:spPr>
         <p:txBody>
-          <a:bodyPr anchorCtr="0" anchor="t" bIns="91425" lIns="91425" spcFirstLastPara="1" rIns="91425" wrap="square" tIns="91425">
+          <a:bodyPr spcFirstLastPara="1" wrap="square" lIns="91425" tIns="91425" rIns="91425" bIns="91425" anchor="t" anchorCtr="0">
             <a:noAutofit/>
           </a:bodyPr>
           <a:lstStyle>
@@ -2097,15 +2150,19 @@
               <a:defRPr/>
             </a:lvl9pPr>
           </a:lstStyle>
-          <a:p/>
+          <a:p>
+            <a:endParaRPr/>
+          </a:p>
         </p:txBody>
       </p:sp>
       <p:sp>
         <p:nvSpPr>
           <p:cNvPr id="18" name="Google Shape;18;p4"/>
-          <p:cNvSpPr txBox="1"/>
+          <p:cNvSpPr txBox="1">
+            <a:spLocks noGrp="1"/>
+          </p:cNvSpPr>
           <p:nvPr>
-            <p:ph idx="1" type="body"/>
+            <p:ph type="body" idx="1"/>
           </p:nvPr>
         </p:nvSpPr>
         <p:spPr>
@@ -2118,11 +2175,11 @@
           </a:prstGeom>
         </p:spPr>
         <p:txBody>
-          <a:bodyPr anchorCtr="0" anchor="t" bIns="91425" lIns="91425" spcFirstLastPara="1" rIns="91425" wrap="square" tIns="91425">
+          <a:bodyPr spcFirstLastPara="1" wrap="square" lIns="91425" tIns="91425" rIns="91425" bIns="91425" anchor="t" anchorCtr="0">
             <a:noAutofit/>
           </a:bodyPr>
           <a:lstStyle>
-            <a:lvl1pPr indent="-342900" lvl="0" marL="457200">
+            <a:lvl1pPr marL="457200" lvl="0" indent="-342900">
               <a:spcBef>
                 <a:spcPts val="0"/>
               </a:spcBef>
@@ -2133,7 +2190,7 @@
               <a:buChar char="●"/>
               <a:defRPr/>
             </a:lvl1pPr>
-            <a:lvl2pPr indent="-317500" lvl="1" marL="914400">
+            <a:lvl2pPr marL="914400" lvl="1" indent="-317500">
               <a:spcBef>
                 <a:spcPts val="1600"/>
               </a:spcBef>
@@ -2144,7 +2201,7 @@
               <a:buChar char="○"/>
               <a:defRPr/>
             </a:lvl2pPr>
-            <a:lvl3pPr indent="-317500" lvl="2" marL="1371600">
+            <a:lvl3pPr marL="1371600" lvl="2" indent="-317500">
               <a:spcBef>
                 <a:spcPts val="1600"/>
               </a:spcBef>
@@ -2155,7 +2212,7 @@
               <a:buChar char="■"/>
               <a:defRPr/>
             </a:lvl3pPr>
-            <a:lvl4pPr indent="-317500" lvl="3" marL="1828800">
+            <a:lvl4pPr marL="1828800" lvl="3" indent="-317500">
               <a:spcBef>
                 <a:spcPts val="1600"/>
               </a:spcBef>
@@ -2166,7 +2223,7 @@
               <a:buChar char="●"/>
               <a:defRPr/>
             </a:lvl4pPr>
-            <a:lvl5pPr indent="-317500" lvl="4" marL="2286000">
+            <a:lvl5pPr marL="2286000" lvl="4" indent="-317500">
               <a:spcBef>
                 <a:spcPts val="1600"/>
               </a:spcBef>
@@ -2177,7 +2234,7 @@
               <a:buChar char="○"/>
               <a:defRPr/>
             </a:lvl5pPr>
-            <a:lvl6pPr indent="-317500" lvl="5" marL="2743200">
+            <a:lvl6pPr marL="2743200" lvl="5" indent="-317500">
               <a:spcBef>
                 <a:spcPts val="1600"/>
               </a:spcBef>
@@ -2188,7 +2245,7 @@
               <a:buChar char="■"/>
               <a:defRPr/>
             </a:lvl6pPr>
-            <a:lvl7pPr indent="-317500" lvl="6" marL="3200400">
+            <a:lvl7pPr marL="3200400" lvl="6" indent="-317500">
               <a:spcBef>
                 <a:spcPts val="1600"/>
               </a:spcBef>
@@ -2199,7 +2256,7 @@
               <a:buChar char="●"/>
               <a:defRPr/>
             </a:lvl7pPr>
-            <a:lvl8pPr indent="-317500" lvl="7" marL="3657600">
+            <a:lvl8pPr marL="3657600" lvl="7" indent="-317500">
               <a:spcBef>
                 <a:spcPts val="1600"/>
               </a:spcBef>
@@ -2210,7 +2267,7 @@
               <a:buChar char="○"/>
               <a:defRPr/>
             </a:lvl8pPr>
-            <a:lvl9pPr indent="-317500" lvl="8" marL="4114800">
+            <a:lvl9pPr marL="4114800" lvl="8" indent="-317500">
               <a:spcBef>
                 <a:spcPts val="1600"/>
               </a:spcBef>
@@ -2222,15 +2279,19 @@
               <a:defRPr/>
             </a:lvl9pPr>
           </a:lstStyle>
-          <a:p/>
+          <a:p>
+            <a:endParaRPr/>
+          </a:p>
         </p:txBody>
       </p:sp>
       <p:sp>
         <p:nvSpPr>
           <p:cNvPr id="19" name="Google Shape;19;p4"/>
-          <p:cNvSpPr txBox="1"/>
+          <p:cNvSpPr txBox="1">
+            <a:spLocks noGrp="1"/>
+          </p:cNvSpPr>
           <p:nvPr>
-            <p:ph idx="12" type="sldNum"/>
+            <p:ph type="sldNum" idx="12"/>
           </p:nvPr>
         </p:nvSpPr>
         <p:spPr>
@@ -2243,7 +2304,7 @@
           </a:prstGeom>
         </p:spPr>
         <p:txBody>
-          <a:bodyPr anchorCtr="0" anchor="ctr" bIns="91425" lIns="91425" spcFirstLastPara="1" rIns="91425" wrap="square" tIns="91425">
+          <a:bodyPr spcFirstLastPara="1" wrap="square" lIns="91425" tIns="91425" rIns="91425" bIns="91425" anchor="ctr" anchorCtr="0">
             <a:noAutofit/>
           </a:bodyPr>
           <a:lstStyle>
@@ -2285,7 +2346,7 @@
             </a:lvl9pPr>
           </a:lstStyle>
           <a:p>
-            <a:pPr indent="0" lvl="0" marL="0" rtl="0" algn="r">
+            <a:pPr marL="0" lvl="0" indent="0" algn="r" rtl="0">
               <a:spcBef>
                 <a:spcPts val="0"/>
               </a:spcBef>
@@ -2296,7 +2357,7 @@
             </a:pPr>
             <a:fld id="{00000000-1234-1234-1234-123412341234}" type="slidenum">
               <a:rPr lang="pt-BR"/>
-              <a:t>‹#›</a:t>
+              <a:t>‹nº›</a:t>
             </a:fld>
             <a:endParaRPr/>
           </a:p>
@@ -2311,11 +2372,11 @@
 </file>
 
 <file path=ppt/slideLayouts/slideLayout4.xml><?xml version="1.0" encoding="utf-8"?>
-<p:sldLayout xmlns:a="http://schemas.openxmlformats.org/drawingml/2006/main" xmlns:r="http://schemas.openxmlformats.org/officeDocument/2006/relationships" xmlns:mc="http://schemas.openxmlformats.org/markup-compatibility/2006" xmlns:mv="urn:schemas-microsoft-com:mac:vml" xmlns:p="http://schemas.openxmlformats.org/presentationml/2006/main" xmlns:c="http://schemas.openxmlformats.org/drawingml/2006/chart" xmlns:dgm="http://schemas.openxmlformats.org/drawingml/2006/diagram" xmlns:o="urn:schemas-microsoft-com:office:office" xmlns:v="urn:schemas-microsoft-com:vml" xmlns:pvml="urn:schemas-microsoft-com:office:powerpoint" xmlns:com="http://schemas.openxmlformats.org/drawingml/2006/compatibility" xmlns:p14="http://schemas.microsoft.com/office/powerpoint/2010/main" xmlns:p15="http://schemas.microsoft.com/office/powerpoint/2012/main" xmlns:ahyp="http://schemas.microsoft.com/office/drawing/2018/hyperlinkcolor" matchingName="Title and two columns" type="twoColTx">
+<p:sldLayout xmlns:a="http://schemas.openxmlformats.org/drawingml/2006/main" xmlns:r="http://schemas.openxmlformats.org/officeDocument/2006/relationships" xmlns:p="http://schemas.openxmlformats.org/presentationml/2006/main" matchingName="Title and two columns" type="twoColTx">
   <p:cSld name="TITLE_AND_TWO_COLUMNS">
     <p:spTree>
       <p:nvGrpSpPr>
-        <p:cNvPr id="20" name="Shape 20"/>
+        <p:cNvPr id="1" name="Shape 20"/>
         <p:cNvGrpSpPr/>
         <p:nvPr/>
       </p:nvGrpSpPr>
@@ -2330,7 +2391,9 @@
       <p:sp>
         <p:nvSpPr>
           <p:cNvPr id="21" name="Google Shape;21;p5"/>
-          <p:cNvSpPr txBox="1"/>
+          <p:cNvSpPr txBox="1">
+            <a:spLocks noGrp="1"/>
+          </p:cNvSpPr>
           <p:nvPr>
             <p:ph type="title"/>
           </p:nvPr>
@@ -2345,7 +2408,7 @@
           </a:prstGeom>
         </p:spPr>
         <p:txBody>
-          <a:bodyPr anchorCtr="0" anchor="t" bIns="91425" lIns="91425" spcFirstLastPara="1" rIns="91425" wrap="square" tIns="91425">
+          <a:bodyPr spcFirstLastPara="1" wrap="square" lIns="91425" tIns="91425" rIns="91425" bIns="91425" anchor="t" anchorCtr="0">
             <a:noAutofit/>
           </a:bodyPr>
           <a:lstStyle>
@@ -2449,15 +2512,19 @@
               <a:defRPr/>
             </a:lvl9pPr>
           </a:lstStyle>
-          <a:p/>
+          <a:p>
+            <a:endParaRPr/>
+          </a:p>
         </p:txBody>
       </p:sp>
       <p:sp>
         <p:nvSpPr>
           <p:cNvPr id="22" name="Google Shape;22;p5"/>
-          <p:cNvSpPr txBox="1"/>
+          <p:cNvSpPr txBox="1">
+            <a:spLocks noGrp="1"/>
+          </p:cNvSpPr>
           <p:nvPr>
-            <p:ph idx="1" type="body"/>
+            <p:ph type="body" idx="1"/>
           </p:nvPr>
         </p:nvSpPr>
         <p:spPr>
@@ -2470,11 +2537,11 @@
           </a:prstGeom>
         </p:spPr>
         <p:txBody>
-          <a:bodyPr anchorCtr="0" anchor="t" bIns="91425" lIns="91425" spcFirstLastPara="1" rIns="91425" wrap="square" tIns="91425">
+          <a:bodyPr spcFirstLastPara="1" wrap="square" lIns="91425" tIns="91425" rIns="91425" bIns="91425" anchor="t" anchorCtr="0">
             <a:noAutofit/>
           </a:bodyPr>
           <a:lstStyle>
-            <a:lvl1pPr indent="-317500" lvl="0" marL="457200">
+            <a:lvl1pPr marL="457200" lvl="0" indent="-317500">
               <a:spcBef>
                 <a:spcPts val="0"/>
               </a:spcBef>
@@ -2485,7 +2552,7 @@
               <a:buChar char="●"/>
               <a:defRPr sz="1400"/>
             </a:lvl1pPr>
-            <a:lvl2pPr indent="-304800" lvl="1" marL="914400">
+            <a:lvl2pPr marL="914400" lvl="1" indent="-304800">
               <a:spcBef>
                 <a:spcPts val="1600"/>
               </a:spcBef>
@@ -2496,7 +2563,7 @@
               <a:buChar char="○"/>
               <a:defRPr sz="1200"/>
             </a:lvl2pPr>
-            <a:lvl3pPr indent="-304800" lvl="2" marL="1371600">
+            <a:lvl3pPr marL="1371600" lvl="2" indent="-304800">
               <a:spcBef>
                 <a:spcPts val="1600"/>
               </a:spcBef>
@@ -2507,7 +2574,7 @@
               <a:buChar char="■"/>
               <a:defRPr sz="1200"/>
             </a:lvl3pPr>
-            <a:lvl4pPr indent="-304800" lvl="3" marL="1828800">
+            <a:lvl4pPr marL="1828800" lvl="3" indent="-304800">
               <a:spcBef>
                 <a:spcPts val="1600"/>
               </a:spcBef>
@@ -2518,7 +2585,7 @@
               <a:buChar char="●"/>
               <a:defRPr sz="1200"/>
             </a:lvl4pPr>
-            <a:lvl5pPr indent="-304800" lvl="4" marL="2286000">
+            <a:lvl5pPr marL="2286000" lvl="4" indent="-304800">
               <a:spcBef>
                 <a:spcPts val="1600"/>
               </a:spcBef>
@@ -2529,7 +2596,7 @@
               <a:buChar char="○"/>
               <a:defRPr sz="1200"/>
             </a:lvl5pPr>
-            <a:lvl6pPr indent="-304800" lvl="5" marL="2743200">
+            <a:lvl6pPr marL="2743200" lvl="5" indent="-304800">
               <a:spcBef>
                 <a:spcPts val="1600"/>
               </a:spcBef>
@@ -2540,7 +2607,7 @@
               <a:buChar char="■"/>
               <a:defRPr sz="1200"/>
             </a:lvl6pPr>
-            <a:lvl7pPr indent="-304800" lvl="6" marL="3200400">
+            <a:lvl7pPr marL="3200400" lvl="6" indent="-304800">
               <a:spcBef>
                 <a:spcPts val="1600"/>
               </a:spcBef>
@@ -2551,7 +2618,7 @@
               <a:buChar char="●"/>
               <a:defRPr sz="1200"/>
             </a:lvl7pPr>
-            <a:lvl8pPr indent="-304800" lvl="7" marL="3657600">
+            <a:lvl8pPr marL="3657600" lvl="7" indent="-304800">
               <a:spcBef>
                 <a:spcPts val="1600"/>
               </a:spcBef>
@@ -2562,7 +2629,7 @@
               <a:buChar char="○"/>
               <a:defRPr sz="1200"/>
             </a:lvl8pPr>
-            <a:lvl9pPr indent="-304800" lvl="8" marL="4114800">
+            <a:lvl9pPr marL="4114800" lvl="8" indent="-304800">
               <a:spcBef>
                 <a:spcPts val="1600"/>
               </a:spcBef>
@@ -2574,15 +2641,19 @@
               <a:defRPr sz="1200"/>
             </a:lvl9pPr>
           </a:lstStyle>
-          <a:p/>
+          <a:p>
+            <a:endParaRPr/>
+          </a:p>
         </p:txBody>
       </p:sp>
       <p:sp>
         <p:nvSpPr>
           <p:cNvPr id="23" name="Google Shape;23;p5"/>
-          <p:cNvSpPr txBox="1"/>
+          <p:cNvSpPr txBox="1">
+            <a:spLocks noGrp="1"/>
+          </p:cNvSpPr>
           <p:nvPr>
-            <p:ph idx="2" type="body"/>
+            <p:ph type="body" idx="2"/>
           </p:nvPr>
         </p:nvSpPr>
         <p:spPr>
@@ -2595,11 +2666,11 @@
           </a:prstGeom>
         </p:spPr>
         <p:txBody>
-          <a:bodyPr anchorCtr="0" anchor="t" bIns="91425" lIns="91425" spcFirstLastPara="1" rIns="91425" wrap="square" tIns="91425">
+          <a:bodyPr spcFirstLastPara="1" wrap="square" lIns="91425" tIns="91425" rIns="91425" bIns="91425" anchor="t" anchorCtr="0">
             <a:noAutofit/>
           </a:bodyPr>
           <a:lstStyle>
-            <a:lvl1pPr indent="-317500" lvl="0" marL="457200">
+            <a:lvl1pPr marL="457200" lvl="0" indent="-317500">
               <a:spcBef>
                 <a:spcPts val="0"/>
               </a:spcBef>
@@ -2610,7 +2681,7 @@
               <a:buChar char="●"/>
               <a:defRPr sz="1400"/>
             </a:lvl1pPr>
-            <a:lvl2pPr indent="-304800" lvl="1" marL="914400">
+            <a:lvl2pPr marL="914400" lvl="1" indent="-304800">
               <a:spcBef>
                 <a:spcPts val="1600"/>
               </a:spcBef>
@@ -2621,7 +2692,7 @@
               <a:buChar char="○"/>
               <a:defRPr sz="1200"/>
             </a:lvl2pPr>
-            <a:lvl3pPr indent="-304800" lvl="2" marL="1371600">
+            <a:lvl3pPr marL="1371600" lvl="2" indent="-304800">
               <a:spcBef>
                 <a:spcPts val="1600"/>
               </a:spcBef>
@@ -2632,7 +2703,7 @@
               <a:buChar char="■"/>
               <a:defRPr sz="1200"/>
             </a:lvl3pPr>
-            <a:lvl4pPr indent="-304800" lvl="3" marL="1828800">
+            <a:lvl4pPr marL="1828800" lvl="3" indent="-304800">
               <a:spcBef>
                 <a:spcPts val="1600"/>
               </a:spcBef>
@@ -2643,7 +2714,7 @@
               <a:buChar char="●"/>
               <a:defRPr sz="1200"/>
             </a:lvl4pPr>
-            <a:lvl5pPr indent="-304800" lvl="4" marL="2286000">
+            <a:lvl5pPr marL="2286000" lvl="4" indent="-304800">
               <a:spcBef>
                 <a:spcPts val="1600"/>
               </a:spcBef>
@@ -2654,7 +2725,7 @@
               <a:buChar char="○"/>
               <a:defRPr sz="1200"/>
             </a:lvl5pPr>
-            <a:lvl6pPr indent="-304800" lvl="5" marL="2743200">
+            <a:lvl6pPr marL="2743200" lvl="5" indent="-304800">
               <a:spcBef>
                 <a:spcPts val="1600"/>
               </a:spcBef>
@@ -2665,7 +2736,7 @@
               <a:buChar char="■"/>
               <a:defRPr sz="1200"/>
             </a:lvl6pPr>
-            <a:lvl7pPr indent="-304800" lvl="6" marL="3200400">
+            <a:lvl7pPr marL="3200400" lvl="6" indent="-304800">
               <a:spcBef>
                 <a:spcPts val="1600"/>
               </a:spcBef>
@@ -2676,7 +2747,7 @@
               <a:buChar char="●"/>
               <a:defRPr sz="1200"/>
             </a:lvl7pPr>
-            <a:lvl8pPr indent="-304800" lvl="7" marL="3657600">
+            <a:lvl8pPr marL="3657600" lvl="7" indent="-304800">
               <a:spcBef>
                 <a:spcPts val="1600"/>
               </a:spcBef>
@@ -2687,7 +2758,7 @@
               <a:buChar char="○"/>
               <a:defRPr sz="1200"/>
             </a:lvl8pPr>
-            <a:lvl9pPr indent="-304800" lvl="8" marL="4114800">
+            <a:lvl9pPr marL="4114800" lvl="8" indent="-304800">
               <a:spcBef>
                 <a:spcPts val="1600"/>
               </a:spcBef>
@@ -2699,15 +2770,19 @@
               <a:defRPr sz="1200"/>
             </a:lvl9pPr>
           </a:lstStyle>
-          <a:p/>
+          <a:p>
+            <a:endParaRPr/>
+          </a:p>
         </p:txBody>
       </p:sp>
       <p:sp>
         <p:nvSpPr>
           <p:cNvPr id="24" name="Google Shape;24;p5"/>
-          <p:cNvSpPr txBox="1"/>
+          <p:cNvSpPr txBox="1">
+            <a:spLocks noGrp="1"/>
+          </p:cNvSpPr>
           <p:nvPr>
-            <p:ph idx="12" type="sldNum"/>
+            <p:ph type="sldNum" idx="12"/>
           </p:nvPr>
         </p:nvSpPr>
         <p:spPr>
@@ -2720,7 +2795,7 @@
           </a:prstGeom>
         </p:spPr>
         <p:txBody>
-          <a:bodyPr anchorCtr="0" anchor="ctr" bIns="91425" lIns="91425" spcFirstLastPara="1" rIns="91425" wrap="square" tIns="91425">
+          <a:bodyPr spcFirstLastPara="1" wrap="square" lIns="91425" tIns="91425" rIns="91425" bIns="91425" anchor="ctr" anchorCtr="0">
             <a:noAutofit/>
           </a:bodyPr>
           <a:lstStyle>
@@ -2762,7 +2837,7 @@
             </a:lvl9pPr>
           </a:lstStyle>
           <a:p>
-            <a:pPr indent="0" lvl="0" marL="0" rtl="0" algn="r">
+            <a:pPr marL="0" lvl="0" indent="0" algn="r" rtl="0">
               <a:spcBef>
                 <a:spcPts val="0"/>
               </a:spcBef>
@@ -2773,7 +2848,7 @@
             </a:pPr>
             <a:fld id="{00000000-1234-1234-1234-123412341234}" type="slidenum">
               <a:rPr lang="pt-BR"/>
-              <a:t>‹#›</a:t>
+              <a:t>‹nº›</a:t>
             </a:fld>
             <a:endParaRPr/>
           </a:p>
@@ -2788,11 +2863,11 @@
 </file>
 
 <file path=ppt/slideLayouts/slideLayout5.xml><?xml version="1.0" encoding="utf-8"?>
-<p:sldLayout xmlns:a="http://schemas.openxmlformats.org/drawingml/2006/main" xmlns:r="http://schemas.openxmlformats.org/officeDocument/2006/relationships" xmlns:mc="http://schemas.openxmlformats.org/markup-compatibility/2006" xmlns:mv="urn:schemas-microsoft-com:mac:vml" xmlns:p="http://schemas.openxmlformats.org/presentationml/2006/main" xmlns:c="http://schemas.openxmlformats.org/drawingml/2006/chart" xmlns:dgm="http://schemas.openxmlformats.org/drawingml/2006/diagram" xmlns:o="urn:schemas-microsoft-com:office:office" xmlns:v="urn:schemas-microsoft-com:vml" xmlns:pvml="urn:schemas-microsoft-com:office:powerpoint" xmlns:com="http://schemas.openxmlformats.org/drawingml/2006/compatibility" xmlns:p14="http://schemas.microsoft.com/office/powerpoint/2010/main" xmlns:p15="http://schemas.microsoft.com/office/powerpoint/2012/main" xmlns:ahyp="http://schemas.microsoft.com/office/drawing/2018/hyperlinkcolor" matchingName="Title only" type="titleOnly">
+<p:sldLayout xmlns:a="http://schemas.openxmlformats.org/drawingml/2006/main" xmlns:r="http://schemas.openxmlformats.org/officeDocument/2006/relationships" xmlns:p="http://schemas.openxmlformats.org/presentationml/2006/main" matchingName="Title only" type="titleOnly">
   <p:cSld name="TITLE_ONLY">
     <p:spTree>
       <p:nvGrpSpPr>
-        <p:cNvPr id="25" name="Shape 25"/>
+        <p:cNvPr id="1" name="Shape 25"/>
         <p:cNvGrpSpPr/>
         <p:nvPr/>
       </p:nvGrpSpPr>
@@ -2807,7 +2882,9 @@
       <p:sp>
         <p:nvSpPr>
           <p:cNvPr id="26" name="Google Shape;26;p6"/>
-          <p:cNvSpPr txBox="1"/>
+          <p:cNvSpPr txBox="1">
+            <a:spLocks noGrp="1"/>
+          </p:cNvSpPr>
           <p:nvPr>
             <p:ph type="title"/>
           </p:nvPr>
@@ -2822,7 +2899,7 @@
           </a:prstGeom>
         </p:spPr>
         <p:txBody>
-          <a:bodyPr anchorCtr="0" anchor="t" bIns="91425" lIns="91425" spcFirstLastPara="1" rIns="91425" wrap="square" tIns="91425">
+          <a:bodyPr spcFirstLastPara="1" wrap="square" lIns="91425" tIns="91425" rIns="91425" bIns="91425" anchor="t" anchorCtr="0">
             <a:noAutofit/>
           </a:bodyPr>
           <a:lstStyle>
@@ -2926,15 +3003,19 @@
               <a:defRPr/>
             </a:lvl9pPr>
           </a:lstStyle>
-          <a:p/>
+          <a:p>
+            <a:endParaRPr/>
+          </a:p>
         </p:txBody>
       </p:sp>
       <p:sp>
         <p:nvSpPr>
           <p:cNvPr id="27" name="Google Shape;27;p6"/>
-          <p:cNvSpPr txBox="1"/>
+          <p:cNvSpPr txBox="1">
+            <a:spLocks noGrp="1"/>
+          </p:cNvSpPr>
           <p:nvPr>
-            <p:ph idx="12" type="sldNum"/>
+            <p:ph type="sldNum" idx="12"/>
           </p:nvPr>
         </p:nvSpPr>
         <p:spPr>
@@ -2947,7 +3028,7 @@
           </a:prstGeom>
         </p:spPr>
         <p:txBody>
-          <a:bodyPr anchorCtr="0" anchor="ctr" bIns="91425" lIns="91425" spcFirstLastPara="1" rIns="91425" wrap="square" tIns="91425">
+          <a:bodyPr spcFirstLastPara="1" wrap="square" lIns="91425" tIns="91425" rIns="91425" bIns="91425" anchor="ctr" anchorCtr="0">
             <a:noAutofit/>
           </a:bodyPr>
           <a:lstStyle>
@@ -2989,7 +3070,7 @@
             </a:lvl9pPr>
           </a:lstStyle>
           <a:p>
-            <a:pPr indent="0" lvl="0" marL="0" rtl="0" algn="r">
+            <a:pPr marL="0" lvl="0" indent="0" algn="r" rtl="0">
               <a:spcBef>
                 <a:spcPts val="0"/>
               </a:spcBef>
@@ -3000,7 +3081,7 @@
             </a:pPr>
             <a:fld id="{00000000-1234-1234-1234-123412341234}" type="slidenum">
               <a:rPr lang="pt-BR"/>
-              <a:t>‹#›</a:t>
+              <a:t>‹nº›</a:t>
             </a:fld>
             <a:endParaRPr/>
           </a:p>
@@ -3015,11 +3096,11 @@
 </file>
 
 <file path=ppt/slideLayouts/slideLayout6.xml><?xml version="1.0" encoding="utf-8"?>
-<p:sldLayout xmlns:a="http://schemas.openxmlformats.org/drawingml/2006/main" xmlns:r="http://schemas.openxmlformats.org/officeDocument/2006/relationships" xmlns:mc="http://schemas.openxmlformats.org/markup-compatibility/2006" xmlns:mv="urn:schemas-microsoft-com:mac:vml" xmlns:p="http://schemas.openxmlformats.org/presentationml/2006/main" xmlns:c="http://schemas.openxmlformats.org/drawingml/2006/chart" xmlns:dgm="http://schemas.openxmlformats.org/drawingml/2006/diagram" xmlns:o="urn:schemas-microsoft-com:office:office" xmlns:v="urn:schemas-microsoft-com:vml" xmlns:pvml="urn:schemas-microsoft-com:office:powerpoint" xmlns:com="http://schemas.openxmlformats.org/drawingml/2006/compatibility" xmlns:p14="http://schemas.microsoft.com/office/powerpoint/2010/main" xmlns:p15="http://schemas.microsoft.com/office/powerpoint/2012/main" xmlns:ahyp="http://schemas.microsoft.com/office/drawing/2018/hyperlinkcolor" matchingName="One column text">
+<p:sldLayout xmlns:a="http://schemas.openxmlformats.org/drawingml/2006/main" xmlns:r="http://schemas.openxmlformats.org/officeDocument/2006/relationships" xmlns:p="http://schemas.openxmlformats.org/presentationml/2006/main" matchingName="One column text">
   <p:cSld name="ONE_COLUMN_TEXT">
     <p:spTree>
       <p:nvGrpSpPr>
-        <p:cNvPr id="28" name="Shape 28"/>
+        <p:cNvPr id="1" name="Shape 28"/>
         <p:cNvGrpSpPr/>
         <p:nvPr/>
       </p:nvGrpSpPr>
@@ -3034,7 +3115,9 @@
       <p:sp>
         <p:nvSpPr>
           <p:cNvPr id="29" name="Google Shape;29;p7"/>
-          <p:cNvSpPr txBox="1"/>
+          <p:cNvSpPr txBox="1">
+            <a:spLocks noGrp="1"/>
+          </p:cNvSpPr>
           <p:nvPr>
             <p:ph type="title"/>
           </p:nvPr>
@@ -3049,7 +3132,7 @@
           </a:prstGeom>
         </p:spPr>
         <p:txBody>
-          <a:bodyPr anchorCtr="0" anchor="b" bIns="91425" lIns="91425" spcFirstLastPara="1" rIns="91425" wrap="square" tIns="91425">
+          <a:bodyPr spcFirstLastPara="1" wrap="square" lIns="91425" tIns="91425" rIns="91425" bIns="91425" anchor="b" anchorCtr="0">
             <a:noAutofit/>
           </a:bodyPr>
           <a:lstStyle>
@@ -3153,15 +3236,19 @@
               <a:defRPr sz="2400"/>
             </a:lvl9pPr>
           </a:lstStyle>
-          <a:p/>
+          <a:p>
+            <a:endParaRPr/>
+          </a:p>
         </p:txBody>
       </p:sp>
       <p:sp>
         <p:nvSpPr>
           <p:cNvPr id="30" name="Google Shape;30;p7"/>
-          <p:cNvSpPr txBox="1"/>
+          <p:cNvSpPr txBox="1">
+            <a:spLocks noGrp="1"/>
+          </p:cNvSpPr>
           <p:nvPr>
-            <p:ph idx="1" type="body"/>
+            <p:ph type="body" idx="1"/>
           </p:nvPr>
         </p:nvSpPr>
         <p:spPr>
@@ -3174,11 +3261,11 @@
           </a:prstGeom>
         </p:spPr>
         <p:txBody>
-          <a:bodyPr anchorCtr="0" anchor="t" bIns="91425" lIns="91425" spcFirstLastPara="1" rIns="91425" wrap="square" tIns="91425">
+          <a:bodyPr spcFirstLastPara="1" wrap="square" lIns="91425" tIns="91425" rIns="91425" bIns="91425" anchor="t" anchorCtr="0">
             <a:noAutofit/>
           </a:bodyPr>
           <a:lstStyle>
-            <a:lvl1pPr indent="-304800" lvl="0" marL="457200">
+            <a:lvl1pPr marL="457200" lvl="0" indent="-304800">
               <a:spcBef>
                 <a:spcPts val="0"/>
               </a:spcBef>
@@ -3189,7 +3276,7 @@
               <a:buChar char="●"/>
               <a:defRPr sz="1200"/>
             </a:lvl1pPr>
-            <a:lvl2pPr indent="-304800" lvl="1" marL="914400">
+            <a:lvl2pPr marL="914400" lvl="1" indent="-304800">
               <a:spcBef>
                 <a:spcPts val="1600"/>
               </a:spcBef>
@@ -3200,7 +3287,7 @@
               <a:buChar char="○"/>
               <a:defRPr sz="1200"/>
             </a:lvl2pPr>
-            <a:lvl3pPr indent="-304800" lvl="2" marL="1371600">
+            <a:lvl3pPr marL="1371600" lvl="2" indent="-304800">
               <a:spcBef>
                 <a:spcPts val="1600"/>
               </a:spcBef>
@@ -3211,7 +3298,7 @@
               <a:buChar char="■"/>
               <a:defRPr sz="1200"/>
             </a:lvl3pPr>
-            <a:lvl4pPr indent="-304800" lvl="3" marL="1828800">
+            <a:lvl4pPr marL="1828800" lvl="3" indent="-304800">
               <a:spcBef>
                 <a:spcPts val="1600"/>
               </a:spcBef>
@@ -3222,7 +3309,7 @@
               <a:buChar char="●"/>
               <a:defRPr sz="1200"/>
             </a:lvl4pPr>
-            <a:lvl5pPr indent="-304800" lvl="4" marL="2286000">
+            <a:lvl5pPr marL="2286000" lvl="4" indent="-304800">
               <a:spcBef>
                 <a:spcPts val="1600"/>
               </a:spcBef>
@@ -3233,7 +3320,7 @@
               <a:buChar char="○"/>
               <a:defRPr sz="1200"/>
             </a:lvl5pPr>
-            <a:lvl6pPr indent="-304800" lvl="5" marL="2743200">
+            <a:lvl6pPr marL="2743200" lvl="5" indent="-304800">
               <a:spcBef>
                 <a:spcPts val="1600"/>
               </a:spcBef>
@@ -3244,7 +3331,7 @@
               <a:buChar char="■"/>
               <a:defRPr sz="1200"/>
             </a:lvl6pPr>
-            <a:lvl7pPr indent="-304800" lvl="6" marL="3200400">
+            <a:lvl7pPr marL="3200400" lvl="6" indent="-304800">
               <a:spcBef>
                 <a:spcPts val="1600"/>
               </a:spcBef>
@@ -3255,7 +3342,7 @@
               <a:buChar char="●"/>
               <a:defRPr sz="1200"/>
             </a:lvl7pPr>
-            <a:lvl8pPr indent="-304800" lvl="7" marL="3657600">
+            <a:lvl8pPr marL="3657600" lvl="7" indent="-304800">
               <a:spcBef>
                 <a:spcPts val="1600"/>
               </a:spcBef>
@@ -3266,7 +3353,7 @@
               <a:buChar char="○"/>
               <a:defRPr sz="1200"/>
             </a:lvl8pPr>
-            <a:lvl9pPr indent="-304800" lvl="8" marL="4114800">
+            <a:lvl9pPr marL="4114800" lvl="8" indent="-304800">
               <a:spcBef>
                 <a:spcPts val="1600"/>
               </a:spcBef>
@@ -3278,15 +3365,19 @@
               <a:defRPr sz="1200"/>
             </a:lvl9pPr>
           </a:lstStyle>
-          <a:p/>
+          <a:p>
+            <a:endParaRPr/>
+          </a:p>
         </p:txBody>
       </p:sp>
       <p:sp>
         <p:nvSpPr>
           <p:cNvPr id="31" name="Google Shape;31;p7"/>
-          <p:cNvSpPr txBox="1"/>
+          <p:cNvSpPr txBox="1">
+            <a:spLocks noGrp="1"/>
+          </p:cNvSpPr>
           <p:nvPr>
-            <p:ph idx="12" type="sldNum"/>
+            <p:ph type="sldNum" idx="12"/>
           </p:nvPr>
         </p:nvSpPr>
         <p:spPr>
@@ -3299,7 +3390,7 @@
           </a:prstGeom>
         </p:spPr>
         <p:txBody>
-          <a:bodyPr anchorCtr="0" anchor="ctr" bIns="91425" lIns="91425" spcFirstLastPara="1" rIns="91425" wrap="square" tIns="91425">
+          <a:bodyPr spcFirstLastPara="1" wrap="square" lIns="91425" tIns="91425" rIns="91425" bIns="91425" anchor="ctr" anchorCtr="0">
             <a:noAutofit/>
           </a:bodyPr>
           <a:lstStyle>
@@ -3341,7 +3432,7 @@
             </a:lvl9pPr>
           </a:lstStyle>
           <a:p>
-            <a:pPr indent="0" lvl="0" marL="0" rtl="0" algn="r">
+            <a:pPr marL="0" lvl="0" indent="0" algn="r" rtl="0">
               <a:spcBef>
                 <a:spcPts val="0"/>
               </a:spcBef>
@@ -3352,7 +3443,7 @@
             </a:pPr>
             <a:fld id="{00000000-1234-1234-1234-123412341234}" type="slidenum">
               <a:rPr lang="pt-BR"/>
-              <a:t>‹#›</a:t>
+              <a:t>‹nº›</a:t>
             </a:fld>
             <a:endParaRPr/>
           </a:p>
@@ -3367,11 +3458,11 @@
 </file>
 
 <file path=ppt/slideLayouts/slideLayout7.xml><?xml version="1.0" encoding="utf-8"?>
-<p:sldLayout xmlns:a="http://schemas.openxmlformats.org/drawingml/2006/main" xmlns:r="http://schemas.openxmlformats.org/officeDocument/2006/relationships" xmlns:mc="http://schemas.openxmlformats.org/markup-compatibility/2006" xmlns:mv="urn:schemas-microsoft-com:mac:vml" xmlns:p="http://schemas.openxmlformats.org/presentationml/2006/main" xmlns:c="http://schemas.openxmlformats.org/drawingml/2006/chart" xmlns:dgm="http://schemas.openxmlformats.org/drawingml/2006/diagram" xmlns:o="urn:schemas-microsoft-com:office:office" xmlns:v="urn:schemas-microsoft-com:vml" xmlns:pvml="urn:schemas-microsoft-com:office:powerpoint" xmlns:com="http://schemas.openxmlformats.org/drawingml/2006/compatibility" xmlns:p14="http://schemas.microsoft.com/office/powerpoint/2010/main" xmlns:p15="http://schemas.microsoft.com/office/powerpoint/2012/main" xmlns:ahyp="http://schemas.microsoft.com/office/drawing/2018/hyperlinkcolor" matchingName="Main point">
+<p:sldLayout xmlns:a="http://schemas.openxmlformats.org/drawingml/2006/main" xmlns:r="http://schemas.openxmlformats.org/officeDocument/2006/relationships" xmlns:p="http://schemas.openxmlformats.org/presentationml/2006/main" matchingName="Main point">
   <p:cSld name="MAIN_POINT">
     <p:spTree>
       <p:nvGrpSpPr>
-        <p:cNvPr id="32" name="Shape 32"/>
+        <p:cNvPr id="1" name="Shape 32"/>
         <p:cNvGrpSpPr/>
         <p:nvPr/>
       </p:nvGrpSpPr>
@@ -3386,7 +3477,9 @@
       <p:sp>
         <p:nvSpPr>
           <p:cNvPr id="33" name="Google Shape;33;p8"/>
-          <p:cNvSpPr txBox="1"/>
+          <p:cNvSpPr txBox="1">
+            <a:spLocks noGrp="1"/>
+          </p:cNvSpPr>
           <p:nvPr>
             <p:ph type="title"/>
           </p:nvPr>
@@ -3401,7 +3494,7 @@
           </a:prstGeom>
         </p:spPr>
         <p:txBody>
-          <a:bodyPr anchorCtr="0" anchor="ctr" bIns="91425" lIns="91425" spcFirstLastPara="1" rIns="91425" wrap="square" tIns="91425">
+          <a:bodyPr spcFirstLastPara="1" wrap="square" lIns="91425" tIns="91425" rIns="91425" bIns="91425" anchor="ctr" anchorCtr="0">
             <a:noAutofit/>
           </a:bodyPr>
           <a:lstStyle>
@@ -3505,15 +3598,19 @@
               <a:defRPr sz="4800"/>
             </a:lvl9pPr>
           </a:lstStyle>
-          <a:p/>
+          <a:p>
+            <a:endParaRPr/>
+          </a:p>
         </p:txBody>
       </p:sp>
       <p:sp>
         <p:nvSpPr>
           <p:cNvPr id="34" name="Google Shape;34;p8"/>
-          <p:cNvSpPr txBox="1"/>
+          <p:cNvSpPr txBox="1">
+            <a:spLocks noGrp="1"/>
+          </p:cNvSpPr>
           <p:nvPr>
-            <p:ph idx="12" type="sldNum"/>
+            <p:ph type="sldNum" idx="12"/>
           </p:nvPr>
         </p:nvSpPr>
         <p:spPr>
@@ -3526,7 +3623,7 @@
           </a:prstGeom>
         </p:spPr>
         <p:txBody>
-          <a:bodyPr anchorCtr="0" anchor="ctr" bIns="91425" lIns="91425" spcFirstLastPara="1" rIns="91425" wrap="square" tIns="91425">
+          <a:bodyPr spcFirstLastPara="1" wrap="square" lIns="91425" tIns="91425" rIns="91425" bIns="91425" anchor="ctr" anchorCtr="0">
             <a:noAutofit/>
           </a:bodyPr>
           <a:lstStyle>
@@ -3568,7 +3665,7 @@
             </a:lvl9pPr>
           </a:lstStyle>
           <a:p>
-            <a:pPr indent="0" lvl="0" marL="0" rtl="0" algn="r">
+            <a:pPr marL="0" lvl="0" indent="0" algn="r" rtl="0">
               <a:spcBef>
                 <a:spcPts val="0"/>
               </a:spcBef>
@@ -3579,7 +3676,7 @@
             </a:pPr>
             <a:fld id="{00000000-1234-1234-1234-123412341234}" type="slidenum">
               <a:rPr lang="pt-BR"/>
-              <a:t>‹#›</a:t>
+              <a:t>‹nº›</a:t>
             </a:fld>
             <a:endParaRPr/>
           </a:p>
@@ -3594,11 +3691,11 @@
 </file>
 
 <file path=ppt/slideLayouts/slideLayout8.xml><?xml version="1.0" encoding="utf-8"?>
-<p:sldLayout xmlns:a="http://schemas.openxmlformats.org/drawingml/2006/main" xmlns:r="http://schemas.openxmlformats.org/officeDocument/2006/relationships" xmlns:mc="http://schemas.openxmlformats.org/markup-compatibility/2006" xmlns:mv="urn:schemas-microsoft-com:mac:vml" xmlns:p="http://schemas.openxmlformats.org/presentationml/2006/main" xmlns:c="http://schemas.openxmlformats.org/drawingml/2006/chart" xmlns:dgm="http://schemas.openxmlformats.org/drawingml/2006/diagram" xmlns:o="urn:schemas-microsoft-com:office:office" xmlns:v="urn:schemas-microsoft-com:vml" xmlns:pvml="urn:schemas-microsoft-com:office:powerpoint" xmlns:com="http://schemas.openxmlformats.org/drawingml/2006/compatibility" xmlns:p14="http://schemas.microsoft.com/office/powerpoint/2010/main" xmlns:p15="http://schemas.microsoft.com/office/powerpoint/2012/main" xmlns:ahyp="http://schemas.microsoft.com/office/drawing/2018/hyperlinkcolor" matchingName="Section title and description">
+<p:sldLayout xmlns:a="http://schemas.openxmlformats.org/drawingml/2006/main" xmlns:r="http://schemas.openxmlformats.org/officeDocument/2006/relationships" xmlns:p="http://schemas.openxmlformats.org/presentationml/2006/main" matchingName="Section title and description">
   <p:cSld name="SECTION_TITLE_AND_DESCRIPTION">
     <p:spTree>
       <p:nvGrpSpPr>
-        <p:cNvPr id="35" name="Shape 35"/>
+        <p:cNvPr id="1" name="Shape 35"/>
         <p:cNvGrpSpPr/>
         <p:nvPr/>
       </p:nvGrpSpPr>
@@ -3632,12 +3729,12 @@
           </a:ln>
         </p:spPr>
         <p:txBody>
-          <a:bodyPr anchorCtr="0" anchor="ctr" bIns="91425" lIns="91425" spcFirstLastPara="1" rIns="91425" wrap="square" tIns="91425">
+          <a:bodyPr spcFirstLastPara="1" wrap="square" lIns="91425" tIns="91425" rIns="91425" bIns="91425" anchor="ctr" anchorCtr="0">
             <a:noAutofit/>
           </a:bodyPr>
           <a:lstStyle/>
           <a:p>
-            <a:pPr indent="0" lvl="0" marL="0" rtl="0" algn="l">
+            <a:pPr marL="0" lvl="0" indent="0" algn="l" rtl="0">
               <a:spcBef>
                 <a:spcPts val="0"/>
               </a:spcBef>
@@ -3646,9 +3743,6 @@
               </a:spcAft>
               <a:buNone/>
             </a:pPr>
-            <a:r>
-              <a:t/>
-            </a:r>
             <a:endParaRPr/>
           </a:p>
         </p:txBody>
@@ -3656,7 +3750,9 @@
       <p:sp>
         <p:nvSpPr>
           <p:cNvPr id="37" name="Google Shape;37;p9"/>
-          <p:cNvSpPr txBox="1"/>
+          <p:cNvSpPr txBox="1">
+            <a:spLocks noGrp="1"/>
+          </p:cNvSpPr>
           <p:nvPr>
             <p:ph type="title"/>
           </p:nvPr>
@@ -3671,7 +3767,7 @@
           </a:prstGeom>
         </p:spPr>
         <p:txBody>
-          <a:bodyPr anchorCtr="0" anchor="b" bIns="91425" lIns="91425" spcFirstLastPara="1" rIns="91425" wrap="square" tIns="91425">
+          <a:bodyPr spcFirstLastPara="1" wrap="square" lIns="91425" tIns="91425" rIns="91425" bIns="91425" anchor="b" anchorCtr="0">
             <a:noAutofit/>
           </a:bodyPr>
           <a:lstStyle>
@@ -3775,15 +3871,19 @@
               <a:defRPr sz="4200"/>
             </a:lvl9pPr>
           </a:lstStyle>
-          <a:p/>
+          <a:p>
+            <a:endParaRPr/>
+          </a:p>
         </p:txBody>
       </p:sp>
       <p:sp>
         <p:nvSpPr>
           <p:cNvPr id="38" name="Google Shape;38;p9"/>
-          <p:cNvSpPr txBox="1"/>
+          <p:cNvSpPr txBox="1">
+            <a:spLocks noGrp="1"/>
+          </p:cNvSpPr>
           <p:nvPr>
-            <p:ph idx="1" type="subTitle"/>
+            <p:ph type="subTitle" idx="1"/>
           </p:nvPr>
         </p:nvSpPr>
         <p:spPr>
@@ -3796,7 +3896,7 @@
           </a:prstGeom>
         </p:spPr>
         <p:txBody>
-          <a:bodyPr anchorCtr="0" anchor="t" bIns="91425" lIns="91425" spcFirstLastPara="1" rIns="91425" wrap="square" tIns="91425">
+          <a:bodyPr spcFirstLastPara="1" wrap="square" lIns="91425" tIns="91425" rIns="91425" bIns="91425" anchor="t" anchorCtr="0">
             <a:noAutofit/>
           </a:bodyPr>
           <a:lstStyle>
@@ -3927,15 +4027,19 @@
               <a:defRPr sz="2100"/>
             </a:lvl9pPr>
           </a:lstStyle>
-          <a:p/>
+          <a:p>
+            <a:endParaRPr/>
+          </a:p>
         </p:txBody>
       </p:sp>
       <p:sp>
         <p:nvSpPr>
           <p:cNvPr id="39" name="Google Shape;39;p9"/>
-          <p:cNvSpPr txBox="1"/>
+          <p:cNvSpPr txBox="1">
+            <a:spLocks noGrp="1"/>
+          </p:cNvSpPr>
           <p:nvPr>
-            <p:ph idx="2" type="body"/>
+            <p:ph type="body" idx="2"/>
           </p:nvPr>
         </p:nvSpPr>
         <p:spPr>
@@ -3948,11 +4052,11 @@
           </a:prstGeom>
         </p:spPr>
         <p:txBody>
-          <a:bodyPr anchorCtr="0" anchor="ctr" bIns="91425" lIns="91425" spcFirstLastPara="1" rIns="91425" wrap="square" tIns="91425">
+          <a:bodyPr spcFirstLastPara="1" wrap="square" lIns="91425" tIns="91425" rIns="91425" bIns="91425" anchor="ctr" anchorCtr="0">
             <a:noAutofit/>
           </a:bodyPr>
           <a:lstStyle>
-            <a:lvl1pPr indent="-342900" lvl="0" marL="457200">
+            <a:lvl1pPr marL="457200" lvl="0" indent="-342900">
               <a:spcBef>
                 <a:spcPts val="0"/>
               </a:spcBef>
@@ -3963,7 +4067,7 @@
               <a:buChar char="●"/>
               <a:defRPr/>
             </a:lvl1pPr>
-            <a:lvl2pPr indent="-317500" lvl="1" marL="914400">
+            <a:lvl2pPr marL="914400" lvl="1" indent="-317500">
               <a:spcBef>
                 <a:spcPts val="1600"/>
               </a:spcBef>
@@ -3974,7 +4078,7 @@
               <a:buChar char="○"/>
               <a:defRPr/>
             </a:lvl2pPr>
-            <a:lvl3pPr indent="-317500" lvl="2" marL="1371600">
+            <a:lvl3pPr marL="1371600" lvl="2" indent="-317500">
               <a:spcBef>
                 <a:spcPts val="1600"/>
               </a:spcBef>
@@ -3985,7 +4089,7 @@
               <a:buChar char="■"/>
               <a:defRPr/>
             </a:lvl3pPr>
-            <a:lvl4pPr indent="-317500" lvl="3" marL="1828800">
+            <a:lvl4pPr marL="1828800" lvl="3" indent="-317500">
               <a:spcBef>
                 <a:spcPts val="1600"/>
               </a:spcBef>
@@ -3996,7 +4100,7 @@
               <a:buChar char="●"/>
               <a:defRPr/>
             </a:lvl4pPr>
-            <a:lvl5pPr indent="-317500" lvl="4" marL="2286000">
+            <a:lvl5pPr marL="2286000" lvl="4" indent="-317500">
               <a:spcBef>
                 <a:spcPts val="1600"/>
               </a:spcBef>
@@ -4007,7 +4111,7 @@
               <a:buChar char="○"/>
               <a:defRPr/>
             </a:lvl5pPr>
-            <a:lvl6pPr indent="-317500" lvl="5" marL="2743200">
+            <a:lvl6pPr marL="2743200" lvl="5" indent="-317500">
               <a:spcBef>
                 <a:spcPts val="1600"/>
               </a:spcBef>
@@ -4018,7 +4122,7 @@
               <a:buChar char="■"/>
               <a:defRPr/>
             </a:lvl6pPr>
-            <a:lvl7pPr indent="-317500" lvl="6" marL="3200400">
+            <a:lvl7pPr marL="3200400" lvl="6" indent="-317500">
               <a:spcBef>
                 <a:spcPts val="1600"/>
               </a:spcBef>
@@ -4029,7 +4133,7 @@
               <a:buChar char="●"/>
               <a:defRPr/>
             </a:lvl7pPr>
-            <a:lvl8pPr indent="-317500" lvl="7" marL="3657600">
+            <a:lvl8pPr marL="3657600" lvl="7" indent="-317500">
               <a:spcBef>
                 <a:spcPts val="1600"/>
               </a:spcBef>
@@ -4040,7 +4144,7 @@
               <a:buChar char="○"/>
               <a:defRPr/>
             </a:lvl8pPr>
-            <a:lvl9pPr indent="-317500" lvl="8" marL="4114800">
+            <a:lvl9pPr marL="4114800" lvl="8" indent="-317500">
               <a:spcBef>
                 <a:spcPts val="1600"/>
               </a:spcBef>
@@ -4052,15 +4156,19 @@
               <a:defRPr/>
             </a:lvl9pPr>
           </a:lstStyle>
-          <a:p/>
+          <a:p>
+            <a:endParaRPr/>
+          </a:p>
         </p:txBody>
       </p:sp>
       <p:sp>
         <p:nvSpPr>
           <p:cNvPr id="40" name="Google Shape;40;p9"/>
-          <p:cNvSpPr txBox="1"/>
+          <p:cNvSpPr txBox="1">
+            <a:spLocks noGrp="1"/>
+          </p:cNvSpPr>
           <p:nvPr>
-            <p:ph idx="12" type="sldNum"/>
+            <p:ph type="sldNum" idx="12"/>
           </p:nvPr>
         </p:nvSpPr>
         <p:spPr>
@@ -4073,7 +4181,7 @@
           </a:prstGeom>
         </p:spPr>
         <p:txBody>
-          <a:bodyPr anchorCtr="0" anchor="ctr" bIns="91425" lIns="91425" spcFirstLastPara="1" rIns="91425" wrap="square" tIns="91425">
+          <a:bodyPr spcFirstLastPara="1" wrap="square" lIns="91425" tIns="91425" rIns="91425" bIns="91425" anchor="ctr" anchorCtr="0">
             <a:noAutofit/>
           </a:bodyPr>
           <a:lstStyle>
@@ -4115,7 +4223,7 @@
             </a:lvl9pPr>
           </a:lstStyle>
           <a:p>
-            <a:pPr indent="0" lvl="0" marL="0" rtl="0" algn="r">
+            <a:pPr marL="0" lvl="0" indent="0" algn="r" rtl="0">
               <a:spcBef>
                 <a:spcPts val="0"/>
               </a:spcBef>
@@ -4126,7 +4234,7 @@
             </a:pPr>
             <a:fld id="{00000000-1234-1234-1234-123412341234}" type="slidenum">
               <a:rPr lang="pt-BR"/>
-              <a:t>‹#›</a:t>
+              <a:t>‹nº›</a:t>
             </a:fld>
             <a:endParaRPr/>
           </a:p>
@@ -4141,11 +4249,11 @@
 </file>
 
 <file path=ppt/slideLayouts/slideLayout9.xml><?xml version="1.0" encoding="utf-8"?>
-<p:sldLayout xmlns:a="http://schemas.openxmlformats.org/drawingml/2006/main" xmlns:r="http://schemas.openxmlformats.org/officeDocument/2006/relationships" xmlns:mc="http://schemas.openxmlformats.org/markup-compatibility/2006" xmlns:mv="urn:schemas-microsoft-com:mac:vml" xmlns:p="http://schemas.openxmlformats.org/presentationml/2006/main" xmlns:c="http://schemas.openxmlformats.org/drawingml/2006/chart" xmlns:dgm="http://schemas.openxmlformats.org/drawingml/2006/diagram" xmlns:o="urn:schemas-microsoft-com:office:office" xmlns:v="urn:schemas-microsoft-com:vml" xmlns:pvml="urn:schemas-microsoft-com:office:powerpoint" xmlns:com="http://schemas.openxmlformats.org/drawingml/2006/compatibility" xmlns:p14="http://schemas.microsoft.com/office/powerpoint/2010/main" xmlns:p15="http://schemas.microsoft.com/office/powerpoint/2012/main" xmlns:ahyp="http://schemas.microsoft.com/office/drawing/2018/hyperlinkcolor" matchingName="Caption">
+<p:sldLayout xmlns:a="http://schemas.openxmlformats.org/drawingml/2006/main" xmlns:r="http://schemas.openxmlformats.org/officeDocument/2006/relationships" xmlns:p="http://schemas.openxmlformats.org/presentationml/2006/main" matchingName="Caption">
   <p:cSld name="CAPTION_ONLY">
     <p:spTree>
       <p:nvGrpSpPr>
-        <p:cNvPr id="41" name="Shape 41"/>
+        <p:cNvPr id="1" name="Shape 41"/>
         <p:cNvGrpSpPr/>
         <p:nvPr/>
       </p:nvGrpSpPr>
@@ -4160,9 +4268,11 @@
       <p:sp>
         <p:nvSpPr>
           <p:cNvPr id="42" name="Google Shape;42;p10"/>
-          <p:cNvSpPr txBox="1"/>
+          <p:cNvSpPr txBox="1">
+            <a:spLocks noGrp="1"/>
+          </p:cNvSpPr>
           <p:nvPr>
-            <p:ph idx="1" type="body"/>
+            <p:ph type="body" idx="1"/>
           </p:nvPr>
         </p:nvSpPr>
         <p:spPr>
@@ -4175,11 +4285,11 @@
           </a:prstGeom>
         </p:spPr>
         <p:txBody>
-          <a:bodyPr anchorCtr="0" anchor="ctr" bIns="91425" lIns="91425" spcFirstLastPara="1" rIns="91425" wrap="square" tIns="91425">
+          <a:bodyPr spcFirstLastPara="1" wrap="square" lIns="91425" tIns="91425" rIns="91425" bIns="91425" anchor="ctr" anchorCtr="0">
             <a:noAutofit/>
           </a:bodyPr>
           <a:lstStyle>
-            <a:lvl1pPr indent="-228600" lvl="0" marL="457200">
+            <a:lvl1pPr marL="457200" lvl="0" indent="-228600">
               <a:lnSpc>
                 <a:spcPct val="100000"/>
               </a:lnSpc>
@@ -4194,15 +4304,19 @@
               <a:defRPr/>
             </a:lvl1pPr>
           </a:lstStyle>
-          <a:p/>
+          <a:p>
+            <a:endParaRPr/>
+          </a:p>
         </p:txBody>
       </p:sp>
       <p:sp>
         <p:nvSpPr>
           <p:cNvPr id="43" name="Google Shape;43;p10"/>
-          <p:cNvSpPr txBox="1"/>
+          <p:cNvSpPr txBox="1">
+            <a:spLocks noGrp="1"/>
+          </p:cNvSpPr>
           <p:nvPr>
-            <p:ph idx="12" type="sldNum"/>
+            <p:ph type="sldNum" idx="12"/>
           </p:nvPr>
         </p:nvSpPr>
         <p:spPr>
@@ -4215,7 +4329,7 @@
           </a:prstGeom>
         </p:spPr>
         <p:txBody>
-          <a:bodyPr anchorCtr="0" anchor="ctr" bIns="91425" lIns="91425" spcFirstLastPara="1" rIns="91425" wrap="square" tIns="91425">
+          <a:bodyPr spcFirstLastPara="1" wrap="square" lIns="91425" tIns="91425" rIns="91425" bIns="91425" anchor="ctr" anchorCtr="0">
             <a:noAutofit/>
           </a:bodyPr>
           <a:lstStyle>
@@ -4257,7 +4371,7 @@
             </a:lvl9pPr>
           </a:lstStyle>
           <a:p>
-            <a:pPr indent="0" lvl="0" marL="0" rtl="0" algn="r">
+            <a:pPr marL="0" lvl="0" indent="0" algn="r" rtl="0">
               <a:spcBef>
                 <a:spcPts val="0"/>
               </a:spcBef>
@@ -4268,7 +4382,7 @@
             </a:pPr>
             <a:fld id="{00000000-1234-1234-1234-123412341234}" type="slidenum">
               <a:rPr lang="pt-BR"/>
-              <a:t>‹#›</a:t>
+              <a:t>‹nº›</a:t>
             </a:fld>
             <a:endParaRPr/>
           </a:p>
@@ -4283,18 +4397,19 @@
 </file>
 
 <file path=ppt/slideMasters/slideMaster1.xml><?xml version="1.0" encoding="utf-8"?>
-<p:sldMaster xmlns:a="http://schemas.openxmlformats.org/drawingml/2006/main" xmlns:r="http://schemas.openxmlformats.org/officeDocument/2006/relationships" xmlns:mc="http://schemas.openxmlformats.org/markup-compatibility/2006" xmlns:mv="urn:schemas-microsoft-com:mac:vml" xmlns:p="http://schemas.openxmlformats.org/presentationml/2006/main" xmlns:c="http://schemas.openxmlformats.org/drawingml/2006/chart" xmlns:dgm="http://schemas.openxmlformats.org/drawingml/2006/diagram" xmlns:o="urn:schemas-microsoft-com:office:office" xmlns:v="urn:schemas-microsoft-com:vml" xmlns:pvml="urn:schemas-microsoft-com:office:powerpoint" xmlns:com="http://schemas.openxmlformats.org/drawingml/2006/compatibility" xmlns:p14="http://schemas.microsoft.com/office/powerpoint/2010/main" xmlns:p15="http://schemas.microsoft.com/office/powerpoint/2012/main" xmlns:ahyp="http://schemas.microsoft.com/office/drawing/2018/hyperlinkcolor">
+<p:sldMaster xmlns:a="http://schemas.openxmlformats.org/drawingml/2006/main" xmlns:r="http://schemas.openxmlformats.org/officeDocument/2006/relationships" xmlns:p="http://schemas.openxmlformats.org/presentationml/2006/main">
   <p:cSld name="simple-light-2">
     <p:bg>
       <p:bgPr>
         <a:solidFill>
           <a:schemeClr val="lt1"/>
         </a:solidFill>
+        <a:effectLst/>
       </p:bgPr>
     </p:bg>
     <p:spTree>
       <p:nvGrpSpPr>
-        <p:cNvPr id="5" name="Shape 5"/>
+        <p:cNvPr id="1" name="Shape 5"/>
         <p:cNvGrpSpPr/>
         <p:nvPr/>
       </p:nvGrpSpPr>
@@ -4309,7 +4424,9 @@
       <p:sp>
         <p:nvSpPr>
           <p:cNvPr id="6" name="Google Shape;6;p1"/>
-          <p:cNvSpPr txBox="1"/>
+          <p:cNvSpPr txBox="1">
+            <a:spLocks noGrp="1"/>
+          </p:cNvSpPr>
           <p:nvPr>
             <p:ph type="title"/>
           </p:nvPr>
@@ -4328,7 +4445,7 @@
           </a:ln>
         </p:spPr>
         <p:txBody>
-          <a:bodyPr anchorCtr="0" anchor="t" bIns="91425" lIns="91425" spcFirstLastPara="1" rIns="91425" wrap="square" tIns="91425">
+          <a:bodyPr spcFirstLastPara="1" wrap="square" lIns="91425" tIns="91425" rIns="91425" bIns="91425" anchor="t" anchorCtr="0">
             <a:noAutofit/>
           </a:bodyPr>
           <a:lstStyle>
@@ -4495,15 +4612,19 @@
               </a:defRPr>
             </a:lvl9pPr>
           </a:lstStyle>
-          <a:p/>
+          <a:p>
+            <a:endParaRPr/>
+          </a:p>
         </p:txBody>
       </p:sp>
       <p:sp>
         <p:nvSpPr>
           <p:cNvPr id="7" name="Google Shape;7;p1"/>
-          <p:cNvSpPr txBox="1"/>
+          <p:cNvSpPr txBox="1">
+            <a:spLocks noGrp="1"/>
+          </p:cNvSpPr>
           <p:nvPr>
-            <p:ph idx="1" type="body"/>
+            <p:ph type="body" idx="1"/>
           </p:nvPr>
         </p:nvSpPr>
         <p:spPr>
@@ -4520,11 +4641,11 @@
           </a:ln>
         </p:spPr>
         <p:txBody>
-          <a:bodyPr anchorCtr="0" anchor="t" bIns="91425" lIns="91425" spcFirstLastPara="1" rIns="91425" wrap="square" tIns="91425">
+          <a:bodyPr spcFirstLastPara="1" wrap="square" lIns="91425" tIns="91425" rIns="91425" bIns="91425" anchor="t" anchorCtr="0">
             <a:noAutofit/>
           </a:bodyPr>
           <a:lstStyle>
-            <a:lvl1pPr indent="-342900" lvl="0" marL="457200">
+            <a:lvl1pPr marL="457200" lvl="0" indent="-342900">
               <a:lnSpc>
                 <a:spcPct val="115000"/>
               </a:lnSpc>
@@ -4545,7 +4666,7 @@
                 </a:solidFill>
               </a:defRPr>
             </a:lvl1pPr>
-            <a:lvl2pPr indent="-317500" lvl="1" marL="914400">
+            <a:lvl2pPr marL="914400" lvl="1" indent="-317500">
               <a:lnSpc>
                 <a:spcPct val="115000"/>
               </a:lnSpc>
@@ -4566,7 +4687,7 @@
                 </a:solidFill>
               </a:defRPr>
             </a:lvl2pPr>
-            <a:lvl3pPr indent="-317500" lvl="2" marL="1371600">
+            <a:lvl3pPr marL="1371600" lvl="2" indent="-317500">
               <a:lnSpc>
                 <a:spcPct val="115000"/>
               </a:lnSpc>
@@ -4587,7 +4708,7 @@
                 </a:solidFill>
               </a:defRPr>
             </a:lvl3pPr>
-            <a:lvl4pPr indent="-317500" lvl="3" marL="1828800">
+            <a:lvl4pPr marL="1828800" lvl="3" indent="-317500">
               <a:lnSpc>
                 <a:spcPct val="115000"/>
               </a:lnSpc>
@@ -4608,7 +4729,7 @@
                 </a:solidFill>
               </a:defRPr>
             </a:lvl4pPr>
-            <a:lvl5pPr indent="-317500" lvl="4" marL="2286000">
+            <a:lvl5pPr marL="2286000" lvl="4" indent="-317500">
               <a:lnSpc>
                 <a:spcPct val="115000"/>
               </a:lnSpc>
@@ -4629,7 +4750,7 @@
                 </a:solidFill>
               </a:defRPr>
             </a:lvl5pPr>
-            <a:lvl6pPr indent="-317500" lvl="5" marL="2743200">
+            <a:lvl6pPr marL="2743200" lvl="5" indent="-317500">
               <a:lnSpc>
                 <a:spcPct val="115000"/>
               </a:lnSpc>
@@ -4650,7 +4771,7 @@
                 </a:solidFill>
               </a:defRPr>
             </a:lvl6pPr>
-            <a:lvl7pPr indent="-317500" lvl="6" marL="3200400">
+            <a:lvl7pPr marL="3200400" lvl="6" indent="-317500">
               <a:lnSpc>
                 <a:spcPct val="115000"/>
               </a:lnSpc>
@@ -4671,7 +4792,7 @@
                 </a:solidFill>
               </a:defRPr>
             </a:lvl7pPr>
-            <a:lvl8pPr indent="-317500" lvl="7" marL="3657600">
+            <a:lvl8pPr marL="3657600" lvl="7" indent="-317500">
               <a:lnSpc>
                 <a:spcPct val="115000"/>
               </a:lnSpc>
@@ -4692,7 +4813,7 @@
                 </a:solidFill>
               </a:defRPr>
             </a:lvl8pPr>
-            <a:lvl9pPr indent="-317500" lvl="8" marL="4114800">
+            <a:lvl9pPr marL="4114800" lvl="8" indent="-317500">
               <a:lnSpc>
                 <a:spcPct val="115000"/>
               </a:lnSpc>
@@ -4714,15 +4835,19 @@
               </a:defRPr>
             </a:lvl9pPr>
           </a:lstStyle>
-          <a:p/>
+          <a:p>
+            <a:endParaRPr/>
+          </a:p>
         </p:txBody>
       </p:sp>
       <p:sp>
         <p:nvSpPr>
           <p:cNvPr id="8" name="Google Shape;8;p1"/>
-          <p:cNvSpPr txBox="1"/>
+          <p:cNvSpPr txBox="1">
+            <a:spLocks noGrp="1"/>
+          </p:cNvSpPr>
           <p:nvPr>
-            <p:ph idx="12" type="sldNum"/>
+            <p:ph type="sldNum" idx="12"/>
           </p:nvPr>
         </p:nvSpPr>
         <p:spPr>
@@ -4739,7 +4864,7 @@
           </a:ln>
         </p:spPr>
         <p:txBody>
-          <a:bodyPr anchorCtr="0" anchor="ctr" bIns="91425" lIns="91425" spcFirstLastPara="1" rIns="91425" wrap="square" tIns="91425">
+          <a:bodyPr spcFirstLastPara="1" wrap="square" lIns="91425" tIns="91425" rIns="91425" bIns="91425" anchor="ctr" anchorCtr="0">
             <a:noAutofit/>
           </a:bodyPr>
           <a:lstStyle>
@@ -4817,7 +4942,7 @@
             </a:lvl9pPr>
           </a:lstStyle>
           <a:p>
-            <a:pPr indent="0" lvl="0" marL="0" rtl="0" algn="r">
+            <a:pPr marL="0" lvl="0" indent="0" algn="r" rtl="0">
               <a:spcBef>
                 <a:spcPts val="0"/>
               </a:spcBef>
@@ -4828,7 +4953,7 @@
             </a:pPr>
             <a:fld id="{00000000-1234-1234-1234-123412341234}" type="slidenum">
               <a:rPr lang="pt-BR"/>
-              <a:t>‹#›</a:t>
+              <a:t>‹nº›</a:t>
             </a:fld>
             <a:endParaRPr/>
           </a:p>
@@ -4836,7 +4961,7 @@
       </p:sp>
     </p:spTree>
   </p:cSld>
-  <p:clrMap accent1="accent1" accent2="accent2" accent3="accent3" accent4="accent4" accent5="accent5" accent6="accent6" bg1="lt1" bg2="dk2" tx1="dk1" tx2="lt2" folHlink="folHlink" hlink="hlink"/>
+  <p:clrMap bg1="lt1" tx1="dk1" bg2="dk2" tx2="lt2" accent1="accent1" accent2="accent2" accent3="accent3" accent4="accent4" accent5="accent5" accent6="accent6" hlink="hlink" folHlink="folHlink"/>
   <p:sldLayoutIdLst>
     <p:sldLayoutId id="2147483648" r:id="rId1"/>
     <p:sldLayoutId id="2147483649" r:id="rId2"/>
@@ -4850,10 +4975,10 @@
     <p:sldLayoutId id="2147483657" r:id="rId10"/>
     <p:sldLayoutId id="2147483658" r:id="rId11"/>
   </p:sldLayoutIdLst>
-  <p:hf dt="0" ftr="0" hdr="0" sldNum="0"/>
+  <p:hf sldNum="0" hdr="0" ftr="0" dt="0"/>
   <p:txStyles>
     <p:titleStyle>
-      <a:defPPr lvl="0" marR="0" rtl="0" algn="l">
+      <a:defPPr marR="0" lvl="0" algn="l" rtl="0">
         <a:lnSpc>
           <a:spcPct val="100000"/>
         </a:lnSpc>
@@ -4864,7 +4989,7 @@
           <a:spcPts val="0"/>
         </a:spcAft>
       </a:defPPr>
-      <a:lvl1pPr lvl="0" marR="0" rtl="0" algn="l">
+      <a:lvl1pPr marR="0" lvl="0" algn="l" rtl="0">
         <a:lnSpc>
           <a:spcPct val="100000"/>
         </a:lnSpc>
@@ -4878,7 +5003,7 @@
           <a:srgbClr val="000000"/>
         </a:buClr>
         <a:buFont typeface="Arial"/>
-        <a:defRPr b="0" i="0" sz="1400" u="none" cap="none" strike="noStrike">
+        <a:defRPr sz="1400" b="0" i="0" u="none" strike="noStrike" cap="none">
           <a:solidFill>
             <a:srgbClr val="000000"/>
           </a:solidFill>
@@ -4888,7 +5013,7 @@
           <a:sym typeface="Arial"/>
         </a:defRPr>
       </a:lvl1pPr>
-      <a:lvl2pPr lvl="1" marR="0" rtl="0" algn="l">
+      <a:lvl2pPr marR="0" lvl="1" algn="l" rtl="0">
         <a:lnSpc>
           <a:spcPct val="100000"/>
         </a:lnSpc>
@@ -4902,7 +5027,7 @@
           <a:srgbClr val="000000"/>
         </a:buClr>
         <a:buFont typeface="Arial"/>
-        <a:defRPr b="0" i="0" sz="1400" u="none" cap="none" strike="noStrike">
+        <a:defRPr sz="1400" b="0" i="0" u="none" strike="noStrike" cap="none">
           <a:solidFill>
             <a:srgbClr val="000000"/>
           </a:solidFill>
@@ -4912,7 +5037,7 @@
           <a:sym typeface="Arial"/>
         </a:defRPr>
       </a:lvl2pPr>
-      <a:lvl3pPr lvl="2" marR="0" rtl="0" algn="l">
+      <a:lvl3pPr marR="0" lvl="2" algn="l" rtl="0">
         <a:lnSpc>
           <a:spcPct val="100000"/>
         </a:lnSpc>
@@ -4926,7 +5051,7 @@
           <a:srgbClr val="000000"/>
         </a:buClr>
         <a:buFont typeface="Arial"/>
-        <a:defRPr b="0" i="0" sz="1400" u="none" cap="none" strike="noStrike">
+        <a:defRPr sz="1400" b="0" i="0" u="none" strike="noStrike" cap="none">
           <a:solidFill>
             <a:srgbClr val="000000"/>
           </a:solidFill>
@@ -4936,7 +5061,7 @@
           <a:sym typeface="Arial"/>
         </a:defRPr>
       </a:lvl3pPr>
-      <a:lvl4pPr lvl="3" marR="0" rtl="0" algn="l">
+      <a:lvl4pPr marR="0" lvl="3" algn="l" rtl="0">
         <a:lnSpc>
           <a:spcPct val="100000"/>
         </a:lnSpc>
@@ -4950,7 +5075,7 @@
           <a:srgbClr val="000000"/>
         </a:buClr>
         <a:buFont typeface="Arial"/>
-        <a:defRPr b="0" i="0" sz="1400" u="none" cap="none" strike="noStrike">
+        <a:defRPr sz="1400" b="0" i="0" u="none" strike="noStrike" cap="none">
           <a:solidFill>
             <a:srgbClr val="000000"/>
           </a:solidFill>
@@ -4960,7 +5085,7 @@
           <a:sym typeface="Arial"/>
         </a:defRPr>
       </a:lvl4pPr>
-      <a:lvl5pPr lvl="4" marR="0" rtl="0" algn="l">
+      <a:lvl5pPr marR="0" lvl="4" algn="l" rtl="0">
         <a:lnSpc>
           <a:spcPct val="100000"/>
         </a:lnSpc>
@@ -4974,7 +5099,7 @@
           <a:srgbClr val="000000"/>
         </a:buClr>
         <a:buFont typeface="Arial"/>
-        <a:defRPr b="0" i="0" sz="1400" u="none" cap="none" strike="noStrike">
+        <a:defRPr sz="1400" b="0" i="0" u="none" strike="noStrike" cap="none">
           <a:solidFill>
             <a:srgbClr val="000000"/>
           </a:solidFill>
@@ -4984,7 +5109,7 @@
           <a:sym typeface="Arial"/>
         </a:defRPr>
       </a:lvl5pPr>
-      <a:lvl6pPr lvl="5" marR="0" rtl="0" algn="l">
+      <a:lvl6pPr marR="0" lvl="5" algn="l" rtl="0">
         <a:lnSpc>
           <a:spcPct val="100000"/>
         </a:lnSpc>
@@ -4998,7 +5123,7 @@
           <a:srgbClr val="000000"/>
         </a:buClr>
         <a:buFont typeface="Arial"/>
-        <a:defRPr b="0" i="0" sz="1400" u="none" cap="none" strike="noStrike">
+        <a:defRPr sz="1400" b="0" i="0" u="none" strike="noStrike" cap="none">
           <a:solidFill>
             <a:srgbClr val="000000"/>
           </a:solidFill>
@@ -5008,7 +5133,7 @@
           <a:sym typeface="Arial"/>
         </a:defRPr>
       </a:lvl6pPr>
-      <a:lvl7pPr lvl="6" marR="0" rtl="0" algn="l">
+      <a:lvl7pPr marR="0" lvl="6" algn="l" rtl="0">
         <a:lnSpc>
           <a:spcPct val="100000"/>
         </a:lnSpc>
@@ -5022,7 +5147,7 @@
           <a:srgbClr val="000000"/>
         </a:buClr>
         <a:buFont typeface="Arial"/>
-        <a:defRPr b="0" i="0" sz="1400" u="none" cap="none" strike="noStrike">
+        <a:defRPr sz="1400" b="0" i="0" u="none" strike="noStrike" cap="none">
           <a:solidFill>
             <a:srgbClr val="000000"/>
           </a:solidFill>
@@ -5032,7 +5157,7 @@
           <a:sym typeface="Arial"/>
         </a:defRPr>
       </a:lvl7pPr>
-      <a:lvl8pPr lvl="7" marR="0" rtl="0" algn="l">
+      <a:lvl8pPr marR="0" lvl="7" algn="l" rtl="0">
         <a:lnSpc>
           <a:spcPct val="100000"/>
         </a:lnSpc>
@@ -5046,7 +5171,7 @@
           <a:srgbClr val="000000"/>
         </a:buClr>
         <a:buFont typeface="Arial"/>
-        <a:defRPr b="0" i="0" sz="1400" u="none" cap="none" strike="noStrike">
+        <a:defRPr sz="1400" b="0" i="0" u="none" strike="noStrike" cap="none">
           <a:solidFill>
             <a:srgbClr val="000000"/>
           </a:solidFill>
@@ -5056,7 +5181,7 @@
           <a:sym typeface="Arial"/>
         </a:defRPr>
       </a:lvl8pPr>
-      <a:lvl9pPr lvl="8" marR="0" rtl="0" algn="l">
+      <a:lvl9pPr marR="0" lvl="8" algn="l" rtl="0">
         <a:lnSpc>
           <a:spcPct val="100000"/>
         </a:lnSpc>
@@ -5070,7 +5195,7 @@
           <a:srgbClr val="000000"/>
         </a:buClr>
         <a:buFont typeface="Arial"/>
-        <a:defRPr b="0" i="0" sz="1400" u="none" cap="none" strike="noStrike">
+        <a:defRPr sz="1400" b="0" i="0" u="none" strike="noStrike" cap="none">
           <a:solidFill>
             <a:srgbClr val="000000"/>
           </a:solidFill>
@@ -5082,7 +5207,7 @@
       </a:lvl9pPr>
     </p:titleStyle>
     <p:bodyStyle>
-      <a:defPPr lvl="0" marR="0" rtl="0" algn="l">
+      <a:defPPr marR="0" lvl="0" algn="l" rtl="0">
         <a:lnSpc>
           <a:spcPct val="100000"/>
         </a:lnSpc>
@@ -5093,7 +5218,7 @@
           <a:spcPts val="0"/>
         </a:spcAft>
       </a:defPPr>
-      <a:lvl1pPr lvl="0" marR="0" rtl="0" algn="l">
+      <a:lvl1pPr marR="0" lvl="0" algn="l" rtl="0">
         <a:lnSpc>
           <a:spcPct val="100000"/>
         </a:lnSpc>
@@ -5107,7 +5232,7 @@
           <a:srgbClr val="000000"/>
         </a:buClr>
         <a:buFont typeface="Arial"/>
-        <a:defRPr b="0" i="0" sz="1400" u="none" cap="none" strike="noStrike">
+        <a:defRPr sz="1400" b="0" i="0" u="none" strike="noStrike" cap="none">
           <a:solidFill>
             <a:srgbClr val="000000"/>
           </a:solidFill>
@@ -5117,7 +5242,7 @@
           <a:sym typeface="Arial"/>
         </a:defRPr>
       </a:lvl1pPr>
-      <a:lvl2pPr lvl="1" marR="0" rtl="0" algn="l">
+      <a:lvl2pPr marR="0" lvl="1" algn="l" rtl="0">
         <a:lnSpc>
           <a:spcPct val="100000"/>
         </a:lnSpc>
@@ -5131,7 +5256,7 @@
           <a:srgbClr val="000000"/>
         </a:buClr>
         <a:buFont typeface="Arial"/>
-        <a:defRPr b="0" i="0" sz="1400" u="none" cap="none" strike="noStrike">
+        <a:defRPr sz="1400" b="0" i="0" u="none" strike="noStrike" cap="none">
           <a:solidFill>
             <a:srgbClr val="000000"/>
           </a:solidFill>
@@ -5141,7 +5266,7 @@
           <a:sym typeface="Arial"/>
         </a:defRPr>
       </a:lvl2pPr>
-      <a:lvl3pPr lvl="2" marR="0" rtl="0" algn="l">
+      <a:lvl3pPr marR="0" lvl="2" algn="l" rtl="0">
         <a:lnSpc>
           <a:spcPct val="100000"/>
         </a:lnSpc>
@@ -5155,7 +5280,7 @@
           <a:srgbClr val="000000"/>
         </a:buClr>
         <a:buFont typeface="Arial"/>
-        <a:defRPr b="0" i="0" sz="1400" u="none" cap="none" strike="noStrike">
+        <a:defRPr sz="1400" b="0" i="0" u="none" strike="noStrike" cap="none">
           <a:solidFill>
             <a:srgbClr val="000000"/>
           </a:solidFill>
@@ -5165,7 +5290,7 @@
           <a:sym typeface="Arial"/>
         </a:defRPr>
       </a:lvl3pPr>
-      <a:lvl4pPr lvl="3" marR="0" rtl="0" algn="l">
+      <a:lvl4pPr marR="0" lvl="3" algn="l" rtl="0">
         <a:lnSpc>
           <a:spcPct val="100000"/>
         </a:lnSpc>
@@ -5179,7 +5304,7 @@
           <a:srgbClr val="000000"/>
         </a:buClr>
         <a:buFont typeface="Arial"/>
-        <a:defRPr b="0" i="0" sz="1400" u="none" cap="none" strike="noStrike">
+        <a:defRPr sz="1400" b="0" i="0" u="none" strike="noStrike" cap="none">
           <a:solidFill>
             <a:srgbClr val="000000"/>
           </a:solidFill>
@@ -5189,7 +5314,7 @@
           <a:sym typeface="Arial"/>
         </a:defRPr>
       </a:lvl4pPr>
-      <a:lvl5pPr lvl="4" marR="0" rtl="0" algn="l">
+      <a:lvl5pPr marR="0" lvl="4" algn="l" rtl="0">
         <a:lnSpc>
           <a:spcPct val="100000"/>
         </a:lnSpc>
@@ -5203,7 +5328,7 @@
           <a:srgbClr val="000000"/>
         </a:buClr>
         <a:buFont typeface="Arial"/>
-        <a:defRPr b="0" i="0" sz="1400" u="none" cap="none" strike="noStrike">
+        <a:defRPr sz="1400" b="0" i="0" u="none" strike="noStrike" cap="none">
           <a:solidFill>
             <a:srgbClr val="000000"/>
           </a:solidFill>
@@ -5213,7 +5338,7 @@
           <a:sym typeface="Arial"/>
         </a:defRPr>
       </a:lvl5pPr>
-      <a:lvl6pPr lvl="5" marR="0" rtl="0" algn="l">
+      <a:lvl6pPr marR="0" lvl="5" algn="l" rtl="0">
         <a:lnSpc>
           <a:spcPct val="100000"/>
         </a:lnSpc>
@@ -5227,7 +5352,7 @@
           <a:srgbClr val="000000"/>
         </a:buClr>
         <a:buFont typeface="Arial"/>
-        <a:defRPr b="0" i="0" sz="1400" u="none" cap="none" strike="noStrike">
+        <a:defRPr sz="1400" b="0" i="0" u="none" strike="noStrike" cap="none">
           <a:solidFill>
             <a:srgbClr val="000000"/>
           </a:solidFill>
@@ -5237,7 +5362,7 @@
           <a:sym typeface="Arial"/>
         </a:defRPr>
       </a:lvl6pPr>
-      <a:lvl7pPr lvl="6" marR="0" rtl="0" algn="l">
+      <a:lvl7pPr marR="0" lvl="6" algn="l" rtl="0">
         <a:lnSpc>
           <a:spcPct val="100000"/>
         </a:lnSpc>
@@ -5251,7 +5376,7 @@
           <a:srgbClr val="000000"/>
         </a:buClr>
         <a:buFont typeface="Arial"/>
-        <a:defRPr b="0" i="0" sz="1400" u="none" cap="none" strike="noStrike">
+        <a:defRPr sz="1400" b="0" i="0" u="none" strike="noStrike" cap="none">
           <a:solidFill>
             <a:srgbClr val="000000"/>
           </a:solidFill>
@@ -5261,7 +5386,7 @@
           <a:sym typeface="Arial"/>
         </a:defRPr>
       </a:lvl7pPr>
-      <a:lvl8pPr lvl="7" marR="0" rtl="0" algn="l">
+      <a:lvl8pPr marR="0" lvl="7" algn="l" rtl="0">
         <a:lnSpc>
           <a:spcPct val="100000"/>
         </a:lnSpc>
@@ -5275,7 +5400,7 @@
           <a:srgbClr val="000000"/>
         </a:buClr>
         <a:buFont typeface="Arial"/>
-        <a:defRPr b="0" i="0" sz="1400" u="none" cap="none" strike="noStrike">
+        <a:defRPr sz="1400" b="0" i="0" u="none" strike="noStrike" cap="none">
           <a:solidFill>
             <a:srgbClr val="000000"/>
           </a:solidFill>
@@ -5285,7 +5410,7 @@
           <a:sym typeface="Arial"/>
         </a:defRPr>
       </a:lvl8pPr>
-      <a:lvl9pPr lvl="8" marR="0" rtl="0" algn="l">
+      <a:lvl9pPr marR="0" lvl="8" algn="l" rtl="0">
         <a:lnSpc>
           <a:spcPct val="100000"/>
         </a:lnSpc>
@@ -5299,7 +5424,7 @@
           <a:srgbClr val="000000"/>
         </a:buClr>
         <a:buFont typeface="Arial"/>
-        <a:defRPr b="0" i="0" sz="1400" u="none" cap="none" strike="noStrike">
+        <a:defRPr sz="1400" b="0" i="0" u="none" strike="noStrike" cap="none">
           <a:solidFill>
             <a:srgbClr val="000000"/>
           </a:solidFill>
@@ -5311,7 +5436,7 @@
       </a:lvl9pPr>
     </p:bodyStyle>
     <p:otherStyle>
-      <a:defPPr lvl="0" marR="0" rtl="0" algn="l">
+      <a:defPPr marR="0" lvl="0" algn="l" rtl="0">
         <a:lnSpc>
           <a:spcPct val="100000"/>
         </a:lnSpc>
@@ -5322,7 +5447,7 @@
           <a:spcPts val="0"/>
         </a:spcAft>
       </a:defPPr>
-      <a:lvl1pPr lvl="0" marR="0" rtl="0" algn="l">
+      <a:lvl1pPr marR="0" lvl="0" algn="l" rtl="0">
         <a:lnSpc>
           <a:spcPct val="100000"/>
         </a:lnSpc>
@@ -5336,7 +5461,7 @@
           <a:srgbClr val="000000"/>
         </a:buClr>
         <a:buFont typeface="Arial"/>
-        <a:defRPr b="0" i="0" sz="1400" u="none" cap="none" strike="noStrike">
+        <a:defRPr sz="1400" b="0" i="0" u="none" strike="noStrike" cap="none">
           <a:solidFill>
             <a:srgbClr val="000000"/>
           </a:solidFill>
@@ -5346,7 +5471,7 @@
           <a:sym typeface="Arial"/>
         </a:defRPr>
       </a:lvl1pPr>
-      <a:lvl2pPr lvl="1" marR="0" rtl="0" algn="l">
+      <a:lvl2pPr marR="0" lvl="1" algn="l" rtl="0">
         <a:lnSpc>
           <a:spcPct val="100000"/>
         </a:lnSpc>
@@ -5360,7 +5485,7 @@
           <a:srgbClr val="000000"/>
         </a:buClr>
         <a:buFont typeface="Arial"/>
-        <a:defRPr b="0" i="0" sz="1400" u="none" cap="none" strike="noStrike">
+        <a:defRPr sz="1400" b="0" i="0" u="none" strike="noStrike" cap="none">
           <a:solidFill>
             <a:srgbClr val="000000"/>
           </a:solidFill>
@@ -5370,7 +5495,7 @@
           <a:sym typeface="Arial"/>
         </a:defRPr>
       </a:lvl2pPr>
-      <a:lvl3pPr lvl="2" marR="0" rtl="0" algn="l">
+      <a:lvl3pPr marR="0" lvl="2" algn="l" rtl="0">
         <a:lnSpc>
           <a:spcPct val="100000"/>
         </a:lnSpc>
@@ -5384,7 +5509,7 @@
           <a:srgbClr val="000000"/>
         </a:buClr>
         <a:buFont typeface="Arial"/>
-        <a:defRPr b="0" i="0" sz="1400" u="none" cap="none" strike="noStrike">
+        <a:defRPr sz="1400" b="0" i="0" u="none" strike="noStrike" cap="none">
           <a:solidFill>
             <a:srgbClr val="000000"/>
           </a:solidFill>
@@ -5394,7 +5519,7 @@
           <a:sym typeface="Arial"/>
         </a:defRPr>
       </a:lvl3pPr>
-      <a:lvl4pPr lvl="3" marR="0" rtl="0" algn="l">
+      <a:lvl4pPr marR="0" lvl="3" algn="l" rtl="0">
         <a:lnSpc>
           <a:spcPct val="100000"/>
         </a:lnSpc>
@@ -5408,7 +5533,7 @@
           <a:srgbClr val="000000"/>
         </a:buClr>
         <a:buFont typeface="Arial"/>
-        <a:defRPr b="0" i="0" sz="1400" u="none" cap="none" strike="noStrike">
+        <a:defRPr sz="1400" b="0" i="0" u="none" strike="noStrike" cap="none">
           <a:solidFill>
             <a:srgbClr val="000000"/>
           </a:solidFill>
@@ -5418,7 +5543,7 @@
           <a:sym typeface="Arial"/>
         </a:defRPr>
       </a:lvl4pPr>
-      <a:lvl5pPr lvl="4" marR="0" rtl="0" algn="l">
+      <a:lvl5pPr marR="0" lvl="4" algn="l" rtl="0">
         <a:lnSpc>
           <a:spcPct val="100000"/>
         </a:lnSpc>
@@ -5432,7 +5557,7 @@
           <a:srgbClr val="000000"/>
         </a:buClr>
         <a:buFont typeface="Arial"/>
-        <a:defRPr b="0" i="0" sz="1400" u="none" cap="none" strike="noStrike">
+        <a:defRPr sz="1400" b="0" i="0" u="none" strike="noStrike" cap="none">
           <a:solidFill>
             <a:srgbClr val="000000"/>
           </a:solidFill>
@@ -5442,7 +5567,7 @@
           <a:sym typeface="Arial"/>
         </a:defRPr>
       </a:lvl5pPr>
-      <a:lvl6pPr lvl="5" marR="0" rtl="0" algn="l">
+      <a:lvl6pPr marR="0" lvl="5" algn="l" rtl="0">
         <a:lnSpc>
           <a:spcPct val="100000"/>
         </a:lnSpc>
@@ -5456,7 +5581,7 @@
           <a:srgbClr val="000000"/>
         </a:buClr>
         <a:buFont typeface="Arial"/>
-        <a:defRPr b="0" i="0" sz="1400" u="none" cap="none" strike="noStrike">
+        <a:defRPr sz="1400" b="0" i="0" u="none" strike="noStrike" cap="none">
           <a:solidFill>
             <a:srgbClr val="000000"/>
           </a:solidFill>
@@ -5466,7 +5591,7 @@
           <a:sym typeface="Arial"/>
         </a:defRPr>
       </a:lvl6pPr>
-      <a:lvl7pPr lvl="6" marR="0" rtl="0" algn="l">
+      <a:lvl7pPr marR="0" lvl="6" algn="l" rtl="0">
         <a:lnSpc>
           <a:spcPct val="100000"/>
         </a:lnSpc>
@@ -5480,7 +5605,7 @@
           <a:srgbClr val="000000"/>
         </a:buClr>
         <a:buFont typeface="Arial"/>
-        <a:defRPr b="0" i="0" sz="1400" u="none" cap="none" strike="noStrike">
+        <a:defRPr sz="1400" b="0" i="0" u="none" strike="noStrike" cap="none">
           <a:solidFill>
             <a:srgbClr val="000000"/>
           </a:solidFill>
@@ -5490,7 +5615,7 @@
           <a:sym typeface="Arial"/>
         </a:defRPr>
       </a:lvl7pPr>
-      <a:lvl8pPr lvl="7" marR="0" rtl="0" algn="l">
+      <a:lvl8pPr marR="0" lvl="7" algn="l" rtl="0">
         <a:lnSpc>
           <a:spcPct val="100000"/>
         </a:lnSpc>
@@ -5504,7 +5629,7 @@
           <a:srgbClr val="000000"/>
         </a:buClr>
         <a:buFont typeface="Arial"/>
-        <a:defRPr b="0" i="0" sz="1400" u="none" cap="none" strike="noStrike">
+        <a:defRPr sz="1400" b="0" i="0" u="none" strike="noStrike" cap="none">
           <a:solidFill>
             <a:srgbClr val="000000"/>
           </a:solidFill>
@@ -5514,7 +5639,7 @@
           <a:sym typeface="Arial"/>
         </a:defRPr>
       </a:lvl8pPr>
-      <a:lvl9pPr lvl="8" marR="0" rtl="0" algn="l">
+      <a:lvl9pPr marR="0" lvl="8" algn="l" rtl="0">
         <a:lnSpc>
           <a:spcPct val="100000"/>
         </a:lnSpc>
@@ -5528,7 +5653,7 @@
           <a:srgbClr val="000000"/>
         </a:buClr>
         <a:buFont typeface="Arial"/>
-        <a:defRPr b="0" i="0" sz="1400" u="none" cap="none" strike="noStrike">
+        <a:defRPr sz="1400" b="0" i="0" u="none" strike="noStrike" cap="none">
           <a:solidFill>
             <a:srgbClr val="000000"/>
           </a:solidFill>
@@ -5544,11 +5669,11 @@
 </file>
 
 <file path=ppt/slides/slide1.xml><?xml version="1.0" encoding="utf-8"?>
-<p:sld xmlns:a="http://schemas.openxmlformats.org/drawingml/2006/main" xmlns:r="http://schemas.openxmlformats.org/officeDocument/2006/relationships" xmlns:mc="http://schemas.openxmlformats.org/markup-compatibility/2006" xmlns:mv="urn:schemas-microsoft-com:mac:vml" xmlns:p="http://schemas.openxmlformats.org/presentationml/2006/main" xmlns:c="http://schemas.openxmlformats.org/drawingml/2006/chart" xmlns:dgm="http://schemas.openxmlformats.org/drawingml/2006/diagram" xmlns:o="urn:schemas-microsoft-com:office:office" xmlns:v="urn:schemas-microsoft-com:vml" xmlns:pvml="urn:schemas-microsoft-com:office:powerpoint" xmlns:com="http://schemas.openxmlformats.org/drawingml/2006/compatibility" xmlns:p14="http://schemas.microsoft.com/office/powerpoint/2010/main" xmlns:p15="http://schemas.microsoft.com/office/powerpoint/2012/main" xmlns:ahyp="http://schemas.microsoft.com/office/drawing/2018/hyperlinkcolor">
+<p:sld xmlns:a="http://schemas.openxmlformats.org/drawingml/2006/main" xmlns:r="http://schemas.openxmlformats.org/officeDocument/2006/relationships" xmlns:p="http://schemas.openxmlformats.org/presentationml/2006/main">
   <p:cSld>
     <p:spTree>
       <p:nvGrpSpPr>
-        <p:cNvPr id="53" name="Shape 53"/>
+        <p:cNvPr id="1" name="Shape 53"/>
         <p:cNvGrpSpPr/>
         <p:nvPr/>
       </p:nvGrpSpPr>
@@ -5582,12 +5707,12 @@
           </a:ln>
         </p:spPr>
         <p:txBody>
-          <a:bodyPr anchorCtr="0" anchor="ctr" bIns="45700" lIns="91425" spcFirstLastPara="1" rIns="91425" wrap="square" tIns="45700">
+          <a:bodyPr spcFirstLastPara="1" wrap="square" lIns="91425" tIns="45700" rIns="91425" bIns="45700" anchor="ctr" anchorCtr="0">
             <a:noAutofit/>
           </a:bodyPr>
           <a:lstStyle/>
           <a:p>
-            <a:pPr indent="0" lvl="0" marL="0" rtl="0" algn="l">
+            <a:pPr marL="0" lvl="0" indent="0" algn="l" rtl="0">
               <a:spcBef>
                 <a:spcPts val="0"/>
               </a:spcBef>
@@ -5596,9 +5721,6 @@
               </a:spcAft>
               <a:buNone/>
             </a:pPr>
-            <a:r>
-              <a:t/>
-            </a:r>
             <a:endParaRPr/>
           </a:p>
         </p:txBody>
@@ -5629,9 +5751,13 @@
               <a:ext cx="1601327" cy="1555582"/>
             </a:xfrm>
             <a:custGeom>
-              <a:rect b="b" l="l" r="r" t="t"/>
+              <a:avLst/>
+              <a:gdLst/>
+              <a:ahLst/>
+              <a:cxnLst/>
+              <a:rect l="l" t="t" r="r" b="b"/>
               <a:pathLst>
-                <a:path extrusionOk="0" h="240" w="246">
+                <a:path w="246" h="240" extrusionOk="0">
                   <a:moveTo>
                     <a:pt x="246" y="29"/>
                   </a:moveTo>
@@ -5662,23 +5788,23 @@
             <a:solidFill>
               <a:srgbClr val="EF441D"/>
             </a:solidFill>
-            <a:ln cap="flat" cmpd="sng" w="9525">
+            <a:ln w="9525" cap="flat" cmpd="sng">
               <a:solidFill>
                 <a:srgbClr val="FFFFFF"/>
               </a:solidFill>
               <a:prstDash val="solid"/>
               <a:miter lim="8000"/>
-              <a:headEnd len="sm" w="sm" type="none"/>
-              <a:tailEnd len="sm" w="sm" type="none"/>
+              <a:headEnd type="none" w="sm" len="sm"/>
+              <a:tailEnd type="none" w="sm" len="sm"/>
             </a:ln>
           </p:spPr>
           <p:txBody>
-            <a:bodyPr anchorCtr="0" anchor="t" bIns="45700" lIns="91425" spcFirstLastPara="1" rIns="91425" wrap="square" tIns="45700">
+            <a:bodyPr spcFirstLastPara="1" wrap="square" lIns="91425" tIns="45700" rIns="91425" bIns="45700" anchor="t" anchorCtr="0">
               <a:noAutofit/>
             </a:bodyPr>
             <a:lstStyle/>
             <a:p>
-              <a:pPr indent="0" lvl="0" marL="0" rtl="0" algn="l">
+              <a:pPr marL="0" lvl="0" indent="0" algn="l" rtl="0">
                 <a:spcBef>
                   <a:spcPts val="0"/>
                 </a:spcBef>
@@ -5687,9 +5813,6 @@
                 </a:spcAft>
                 <a:buNone/>
               </a:pPr>
-              <a:r>
-                <a:t/>
-              </a:r>
               <a:endParaRPr/>
             </a:p>
           </p:txBody>
@@ -5706,9 +5829,13 @@
               <a:ext cx="1541190" cy="1320966"/>
             </a:xfrm>
             <a:custGeom>
-              <a:rect b="b" l="l" r="r" t="t"/>
+              <a:avLst/>
+              <a:gdLst/>
+              <a:ahLst/>
+              <a:cxnLst/>
+              <a:rect l="l" t="t" r="r" b="b"/>
               <a:pathLst>
-                <a:path extrusionOk="0" h="213" w="248">
+                <a:path w="248" h="213" extrusionOk="0">
                   <a:moveTo>
                     <a:pt x="142" y="213"/>
                   </a:moveTo>
@@ -5744,23 +5871,23 @@
             <a:solidFill>
               <a:srgbClr val="102842"/>
             </a:solidFill>
-            <a:ln cap="flat" cmpd="sng" w="12700">
+            <a:ln w="12700" cap="flat" cmpd="sng">
               <a:solidFill>
                 <a:srgbClr val="FFFFFF"/>
               </a:solidFill>
               <a:prstDash val="solid"/>
               <a:miter lim="8000"/>
-              <a:headEnd len="sm" w="sm" type="none"/>
-              <a:tailEnd len="sm" w="sm" type="none"/>
+              <a:headEnd type="none" w="sm" len="sm"/>
+              <a:tailEnd type="none" w="sm" len="sm"/>
             </a:ln>
           </p:spPr>
           <p:txBody>
-            <a:bodyPr anchorCtr="0" anchor="t" bIns="45700" lIns="91425" spcFirstLastPara="1" rIns="91425" wrap="square" tIns="45700">
+            <a:bodyPr spcFirstLastPara="1" wrap="square" lIns="91425" tIns="45700" rIns="91425" bIns="45700" anchor="t" anchorCtr="0">
               <a:noAutofit/>
             </a:bodyPr>
             <a:lstStyle/>
             <a:p>
-              <a:pPr indent="0" lvl="0" marL="0" rtl="0" algn="l">
+              <a:pPr marL="0" lvl="0" indent="0" algn="l" rtl="0">
                 <a:spcBef>
                   <a:spcPts val="0"/>
                 </a:spcBef>
@@ -5769,9 +5896,6 @@
                 </a:spcAft>
                 <a:buNone/>
               </a:pPr>
-              <a:r>
-                <a:t/>
-              </a:r>
               <a:endParaRPr/>
             </a:p>
           </p:txBody>
@@ -5796,12 +5920,12 @@
             </a:ln>
           </p:spPr>
           <p:txBody>
-            <a:bodyPr anchorCtr="0" anchor="ctr" bIns="91425" lIns="91425" spcFirstLastPara="1" rIns="91425" wrap="square" tIns="91425">
+            <a:bodyPr spcFirstLastPara="1" wrap="square" lIns="91425" tIns="91425" rIns="91425" bIns="91425" anchor="ctr" anchorCtr="0">
               <a:noAutofit/>
             </a:bodyPr>
             <a:lstStyle/>
             <a:p>
-              <a:pPr indent="0" lvl="0" marL="0" rtl="0" algn="ctr">
+              <a:pPr marL="0" lvl="0" indent="0" algn="ctr" rtl="0">
                 <a:spcBef>
                   <a:spcPts val="0"/>
                 </a:spcBef>
@@ -5861,9 +5985,13 @@
               <a:ext cx="2119401" cy="640096"/>
             </a:xfrm>
             <a:custGeom>
-              <a:rect b="b" l="l" r="r" t="t"/>
+              <a:avLst/>
+              <a:gdLst/>
+              <a:ahLst/>
+              <a:cxnLst/>
+              <a:rect l="l" t="t" r="r" b="b"/>
               <a:pathLst>
-                <a:path extrusionOk="0" h="99" w="326">
+                <a:path w="326" h="99" extrusionOk="0">
                   <a:moveTo>
                     <a:pt x="119" y="67"/>
                   </a:moveTo>
@@ -5904,23 +6032,23 @@
             <a:solidFill>
               <a:srgbClr val="EF441D"/>
             </a:solidFill>
-            <a:ln cap="flat" cmpd="sng" w="9525">
+            <a:ln w="9525" cap="flat" cmpd="sng">
               <a:solidFill>
                 <a:srgbClr val="FFFFFF"/>
               </a:solidFill>
               <a:prstDash val="solid"/>
               <a:miter lim="8000"/>
-              <a:headEnd len="sm" w="sm" type="none"/>
-              <a:tailEnd len="sm" w="sm" type="none"/>
+              <a:headEnd type="none" w="sm" len="sm"/>
+              <a:tailEnd type="none" w="sm" len="sm"/>
             </a:ln>
           </p:spPr>
           <p:txBody>
-            <a:bodyPr anchorCtr="0" anchor="t" bIns="45700" lIns="91425" spcFirstLastPara="1" rIns="91425" wrap="square" tIns="45700">
+            <a:bodyPr spcFirstLastPara="1" wrap="square" lIns="91425" tIns="45700" rIns="91425" bIns="45700" anchor="t" anchorCtr="0">
               <a:noAutofit/>
             </a:bodyPr>
             <a:lstStyle/>
             <a:p>
-              <a:pPr indent="0" lvl="0" marL="0" rtl="0" algn="l">
+              <a:pPr marL="0" lvl="0" indent="0" algn="l" rtl="0">
                 <a:spcBef>
                   <a:spcPts val="0"/>
                 </a:spcBef>
@@ -5929,9 +6057,6 @@
                 </a:spcAft>
                 <a:buNone/>
               </a:pPr>
-              <a:r>
-                <a:t/>
-              </a:r>
               <a:endParaRPr/>
             </a:p>
           </p:txBody>
@@ -5948,9 +6073,13 @@
               <a:ext cx="1815979" cy="987157"/>
             </a:xfrm>
             <a:custGeom>
-              <a:rect b="b" l="l" r="r" t="t"/>
+              <a:avLst/>
+              <a:gdLst/>
+              <a:ahLst/>
+              <a:cxnLst/>
+              <a:rect l="l" t="t" r="r" b="b"/>
               <a:pathLst>
-                <a:path extrusionOk="0" h="159" w="292">
+                <a:path w="292" h="159" extrusionOk="0">
                   <a:moveTo>
                     <a:pt x="182" y="1"/>
                   </a:moveTo>
@@ -5991,23 +6120,23 @@
             <a:solidFill>
               <a:srgbClr val="102842"/>
             </a:solidFill>
-            <a:ln cap="flat" cmpd="sng" w="12700">
+            <a:ln w="12700" cap="flat" cmpd="sng">
               <a:solidFill>
                 <a:srgbClr val="FFFFFF"/>
               </a:solidFill>
               <a:prstDash val="solid"/>
               <a:miter lim="8000"/>
-              <a:headEnd len="sm" w="sm" type="none"/>
-              <a:tailEnd len="sm" w="sm" type="none"/>
+              <a:headEnd type="none" w="sm" len="sm"/>
+              <a:tailEnd type="none" w="sm" len="sm"/>
             </a:ln>
           </p:spPr>
           <p:txBody>
-            <a:bodyPr anchorCtr="0" anchor="t" bIns="45700" lIns="91425" spcFirstLastPara="1" rIns="91425" wrap="square" tIns="45700">
+            <a:bodyPr spcFirstLastPara="1" wrap="square" lIns="91425" tIns="45700" rIns="91425" bIns="45700" anchor="t" anchorCtr="0">
               <a:noAutofit/>
             </a:bodyPr>
             <a:lstStyle/>
             <a:p>
-              <a:pPr indent="0" lvl="0" marL="0" rtl="0" algn="l">
+              <a:pPr marL="0" lvl="0" indent="0" algn="l" rtl="0">
                 <a:spcBef>
                   <a:spcPts val="0"/>
                 </a:spcBef>
@@ -6016,9 +6145,6 @@
                 </a:spcAft>
                 <a:buNone/>
               </a:pPr>
-              <a:r>
-                <a:t/>
-              </a:r>
               <a:endParaRPr/>
             </a:p>
           </p:txBody>
@@ -6043,12 +6169,12 @@
             </a:ln>
           </p:spPr>
           <p:txBody>
-            <a:bodyPr anchorCtr="0" anchor="ctr" bIns="91425" lIns="91425" spcFirstLastPara="1" rIns="91425" wrap="square" tIns="91425">
+            <a:bodyPr spcFirstLastPara="1" wrap="square" lIns="91425" tIns="91425" rIns="91425" bIns="91425" anchor="ctr" anchorCtr="0">
               <a:noAutofit/>
             </a:bodyPr>
             <a:lstStyle/>
             <a:p>
-              <a:pPr indent="0" lvl="0" marL="0" rtl="0" algn="ctr">
+              <a:pPr marL="0" lvl="0" indent="0" algn="ctr" rtl="0">
                 <a:spcBef>
                   <a:spcPts val="0"/>
                 </a:spcBef>
@@ -6108,9 +6234,13 @@
               <a:ext cx="1943480" cy="1113468"/>
             </a:xfrm>
             <a:custGeom>
-              <a:rect b="b" l="l" r="r" t="t"/>
+              <a:avLst/>
+              <a:gdLst/>
+              <a:ahLst/>
+              <a:cxnLst/>
+              <a:rect l="l" t="t" r="r" b="b"/>
               <a:pathLst>
-                <a:path extrusionOk="0" h="172" w="299">
+                <a:path w="299" h="172" extrusionOk="0">
                   <a:moveTo>
                     <a:pt x="45" y="32"/>
                   </a:moveTo>
@@ -6151,23 +6281,23 @@
             <a:solidFill>
               <a:srgbClr val="EF441D"/>
             </a:solidFill>
-            <a:ln cap="flat" cmpd="sng" w="9525">
+            <a:ln w="9525" cap="flat" cmpd="sng">
               <a:solidFill>
                 <a:srgbClr val="FFFFFF"/>
               </a:solidFill>
               <a:prstDash val="solid"/>
               <a:miter lim="8000"/>
-              <a:headEnd len="sm" w="sm" type="none"/>
-              <a:tailEnd len="sm" w="sm" type="none"/>
+              <a:headEnd type="none" w="sm" len="sm"/>
+              <a:tailEnd type="none" w="sm" len="sm"/>
             </a:ln>
           </p:spPr>
           <p:txBody>
-            <a:bodyPr anchorCtr="0" anchor="t" bIns="45700" lIns="91425" spcFirstLastPara="1" rIns="91425" wrap="square" tIns="45700">
+            <a:bodyPr spcFirstLastPara="1" wrap="square" lIns="91425" tIns="45700" rIns="91425" bIns="45700" anchor="t" anchorCtr="0">
               <a:noAutofit/>
             </a:bodyPr>
             <a:lstStyle/>
             <a:p>
-              <a:pPr indent="0" lvl="0" marL="0" rtl="0" algn="l">
+              <a:pPr marL="0" lvl="0" indent="0" algn="l" rtl="0">
                 <a:spcBef>
                   <a:spcPts val="0"/>
                 </a:spcBef>
@@ -6176,9 +6306,6 @@
                 </a:spcAft>
                 <a:buNone/>
               </a:pPr>
-              <a:r>
-                <a:t/>
-              </a:r>
               <a:endParaRPr/>
             </a:p>
           </p:txBody>
@@ -6195,9 +6322,13 @@
               <a:ext cx="1606237" cy="1343790"/>
             </a:xfrm>
             <a:custGeom>
-              <a:rect b="b" l="l" r="r" t="t"/>
+              <a:avLst/>
+              <a:gdLst/>
+              <a:ahLst/>
+              <a:cxnLst/>
+              <a:rect l="l" t="t" r="r" b="b"/>
               <a:pathLst>
-                <a:path extrusionOk="0" h="217" w="258">
+                <a:path w="258" h="217" extrusionOk="0">
                   <a:moveTo>
                     <a:pt x="132" y="200"/>
                   </a:moveTo>
@@ -6238,23 +6369,23 @@
             <a:solidFill>
               <a:srgbClr val="102842"/>
             </a:solidFill>
-            <a:ln cap="flat" cmpd="sng" w="12700">
+            <a:ln w="12700" cap="flat" cmpd="sng">
               <a:solidFill>
                 <a:srgbClr val="FFFFFF"/>
               </a:solidFill>
               <a:prstDash val="solid"/>
               <a:miter lim="8000"/>
-              <a:headEnd len="sm" w="sm" type="none"/>
-              <a:tailEnd len="sm" w="sm" type="none"/>
+              <a:headEnd type="none" w="sm" len="sm"/>
+              <a:tailEnd type="none" w="sm" len="sm"/>
             </a:ln>
           </p:spPr>
           <p:txBody>
-            <a:bodyPr anchorCtr="0" anchor="t" bIns="45700" lIns="91425" spcFirstLastPara="1" rIns="91425" wrap="square" tIns="45700">
+            <a:bodyPr spcFirstLastPara="1" wrap="square" lIns="91425" tIns="45700" rIns="91425" bIns="45700" anchor="t" anchorCtr="0">
               <a:noAutofit/>
             </a:bodyPr>
             <a:lstStyle/>
             <a:p>
-              <a:pPr indent="0" lvl="0" marL="0" rtl="0" algn="l">
+              <a:pPr marL="0" lvl="0" indent="0" algn="l" rtl="0">
                 <a:spcBef>
                   <a:spcPts val="0"/>
                 </a:spcBef>
@@ -6263,9 +6394,6 @@
                 </a:spcAft>
                 <a:buNone/>
               </a:pPr>
-              <a:r>
-                <a:t/>
-              </a:r>
               <a:endParaRPr/>
             </a:p>
           </p:txBody>
@@ -6290,12 +6418,12 @@
             </a:ln>
           </p:spPr>
           <p:txBody>
-            <a:bodyPr anchorCtr="0" anchor="ctr" bIns="91425" lIns="91425" spcFirstLastPara="1" rIns="91425" wrap="square" tIns="91425">
+            <a:bodyPr spcFirstLastPara="1" wrap="square" lIns="91425" tIns="91425" rIns="91425" bIns="91425" anchor="ctr" anchorCtr="0">
               <a:noAutofit/>
             </a:bodyPr>
             <a:lstStyle/>
             <a:p>
-              <a:pPr indent="0" lvl="0" marL="0" rtl="0" algn="ctr">
+              <a:pPr marL="0" lvl="0" indent="0" algn="ctr" rtl="0">
                 <a:spcBef>
                   <a:spcPts val="0"/>
                 </a:spcBef>
@@ -6355,9 +6483,13 @@
               <a:ext cx="698156" cy="2118270"/>
             </a:xfrm>
             <a:custGeom>
-              <a:rect b="b" l="l" r="r" t="t"/>
+              <a:avLst/>
+              <a:gdLst/>
+              <a:ahLst/>
+              <a:cxnLst/>
+              <a:rect l="l" t="t" r="r" b="b"/>
               <a:pathLst>
-                <a:path extrusionOk="0" h="328" w="107">
+                <a:path w="107" h="328" extrusionOk="0">
                   <a:moveTo>
                     <a:pt x="52" y="26"/>
                   </a:moveTo>
@@ -6398,23 +6530,23 @@
             <a:solidFill>
               <a:srgbClr val="EF441D"/>
             </a:solidFill>
-            <a:ln cap="flat" cmpd="sng" w="9525">
+            <a:ln w="9525" cap="flat" cmpd="sng">
               <a:solidFill>
                 <a:srgbClr val="FFFFFF"/>
               </a:solidFill>
               <a:prstDash val="solid"/>
               <a:miter lim="8000"/>
-              <a:headEnd len="sm" w="sm" type="none"/>
-              <a:tailEnd len="sm" w="sm" type="none"/>
+              <a:headEnd type="none" w="sm" len="sm"/>
+              <a:tailEnd type="none" w="sm" len="sm"/>
             </a:ln>
           </p:spPr>
           <p:txBody>
-            <a:bodyPr anchorCtr="0" anchor="t" bIns="45700" lIns="91425" spcFirstLastPara="1" rIns="91425" wrap="square" tIns="45700">
+            <a:bodyPr spcFirstLastPara="1" wrap="square" lIns="91425" tIns="45700" rIns="91425" bIns="45700" anchor="t" anchorCtr="0">
               <a:noAutofit/>
             </a:bodyPr>
             <a:lstStyle/>
             <a:p>
-              <a:pPr indent="0" lvl="0" marL="0" rtl="0" algn="l">
+              <a:pPr marL="0" lvl="0" indent="0" algn="l" rtl="0">
                 <a:spcBef>
                   <a:spcPts val="0"/>
                 </a:spcBef>
@@ -6423,9 +6555,6 @@
                 </a:spcAft>
                 <a:buNone/>
               </a:pPr>
-              <a:r>
-                <a:t/>
-              </a:r>
               <a:endParaRPr/>
             </a:p>
           </p:txBody>
@@ -6442,9 +6571,13 @@
               <a:ext cx="1148261" cy="1791718"/>
             </a:xfrm>
             <a:custGeom>
-              <a:rect b="b" l="l" r="r" t="t"/>
+              <a:avLst/>
+              <a:gdLst/>
+              <a:ahLst/>
+              <a:cxnLst/>
+              <a:rect l="l" t="t" r="r" b="b"/>
               <a:pathLst>
-                <a:path extrusionOk="0" h="289" w="184">
+                <a:path w="184" h="289" extrusionOk="0">
                   <a:moveTo>
                     <a:pt x="161" y="0"/>
                   </a:moveTo>
@@ -6480,23 +6613,23 @@
             <a:solidFill>
               <a:srgbClr val="102842"/>
             </a:solidFill>
-            <a:ln cap="flat" cmpd="sng" w="12700">
+            <a:ln w="12700" cap="flat" cmpd="sng">
               <a:solidFill>
                 <a:srgbClr val="FFFFFF"/>
               </a:solidFill>
               <a:prstDash val="solid"/>
               <a:miter lim="8000"/>
-              <a:headEnd len="sm" w="sm" type="none"/>
-              <a:tailEnd len="sm" w="sm" type="none"/>
+              <a:headEnd type="none" w="sm" len="sm"/>
+              <a:tailEnd type="none" w="sm" len="sm"/>
             </a:ln>
           </p:spPr>
           <p:txBody>
-            <a:bodyPr anchorCtr="0" anchor="t" bIns="45700" lIns="91425" spcFirstLastPara="1" rIns="91425" wrap="square" tIns="45700">
+            <a:bodyPr spcFirstLastPara="1" wrap="square" lIns="91425" tIns="45700" rIns="91425" bIns="45700" anchor="t" anchorCtr="0">
               <a:noAutofit/>
             </a:bodyPr>
             <a:lstStyle/>
             <a:p>
-              <a:pPr indent="0" lvl="0" marL="0" rtl="0" algn="l">
+              <a:pPr marL="0" lvl="0" indent="0" algn="l" rtl="0">
                 <a:spcBef>
                   <a:spcPts val="0"/>
                 </a:spcBef>
@@ -6505,9 +6638,6 @@
                 </a:spcAft>
                 <a:buNone/>
               </a:pPr>
-              <a:r>
-                <a:t/>
-              </a:r>
               <a:endParaRPr/>
             </a:p>
           </p:txBody>
@@ -6532,12 +6662,12 @@
             </a:ln>
           </p:spPr>
           <p:txBody>
-            <a:bodyPr anchorCtr="0" anchor="ctr" bIns="91425" lIns="91425" spcFirstLastPara="1" rIns="91425" wrap="square" tIns="91425">
+            <a:bodyPr spcFirstLastPara="1" wrap="square" lIns="91425" tIns="91425" rIns="91425" bIns="91425" anchor="ctr" anchorCtr="0">
               <a:noAutofit/>
             </a:bodyPr>
             <a:lstStyle/>
             <a:p>
-              <a:pPr indent="0" lvl="0" marL="0" rtl="0" algn="ctr">
+              <a:pPr marL="0" lvl="0" indent="0" algn="ctr" rtl="0">
                 <a:spcBef>
                   <a:spcPts val="0"/>
                 </a:spcBef>
@@ -6591,12 +6721,12 @@
           </a:ln>
         </p:spPr>
         <p:txBody>
-          <a:bodyPr anchorCtr="0" anchor="t" bIns="91425" lIns="91425" spcFirstLastPara="1" rIns="91425" wrap="square" tIns="91425">
+          <a:bodyPr spcFirstLastPara="1" wrap="square" lIns="91425" tIns="91425" rIns="91425" bIns="91425" anchor="t" anchorCtr="0">
             <a:noAutofit/>
           </a:bodyPr>
           <a:lstStyle/>
           <a:p>
-            <a:pPr indent="0" lvl="0" marL="0" rtl="0" algn="l">
+            <a:pPr marL="0" lvl="0" indent="0" algn="l" rtl="0">
               <a:spcBef>
                 <a:spcPts val="0"/>
               </a:spcBef>
@@ -6633,12 +6763,12 @@
           </a:ln>
         </p:spPr>
         <p:txBody>
-          <a:bodyPr anchorCtr="0" anchor="t" bIns="91425" lIns="91425" spcFirstLastPara="1" rIns="91425" wrap="square" tIns="91425">
+          <a:bodyPr spcFirstLastPara="1" wrap="square" lIns="91425" tIns="91425" rIns="91425" bIns="91425" anchor="t" anchorCtr="0">
             <a:noAutofit/>
           </a:bodyPr>
           <a:lstStyle/>
           <a:p>
-            <a:pPr indent="0" lvl="0" marL="0" rtl="0" algn="l">
+            <a:pPr marL="0" lvl="0" indent="0" algn="l" rtl="0">
               <a:spcBef>
                 <a:spcPts val="0"/>
               </a:spcBef>
@@ -6675,12 +6805,12 @@
           </a:ln>
         </p:spPr>
         <p:txBody>
-          <a:bodyPr anchorCtr="0" anchor="t" bIns="91425" lIns="91425" spcFirstLastPara="1" rIns="91425" wrap="square" tIns="91425">
+          <a:bodyPr spcFirstLastPara="1" wrap="square" lIns="91425" tIns="91425" rIns="91425" bIns="91425" anchor="t" anchorCtr="0">
             <a:noAutofit/>
           </a:bodyPr>
           <a:lstStyle/>
           <a:p>
-            <a:pPr indent="0" lvl="0" marL="0" rtl="0" algn="ctr">
+            <a:pPr marL="0" lvl="0" indent="0" algn="ctr" rtl="0">
               <a:spcBef>
                 <a:spcPts val="0"/>
               </a:spcBef>
@@ -6717,12 +6847,12 @@
           </a:ln>
         </p:spPr>
         <p:txBody>
-          <a:bodyPr anchorCtr="0" anchor="t" bIns="91425" lIns="91425" spcFirstLastPara="1" rIns="91425" wrap="square" tIns="91425">
+          <a:bodyPr spcFirstLastPara="1" wrap="square" lIns="91425" tIns="91425" rIns="91425" bIns="91425" anchor="t" anchorCtr="0">
             <a:noAutofit/>
           </a:bodyPr>
           <a:lstStyle/>
           <a:p>
-            <a:pPr indent="0" lvl="0" marL="0" rtl="0" algn="ctr">
+            <a:pPr marL="0" lvl="0" indent="0" algn="ctr" rtl="0">
               <a:spcBef>
                 <a:spcPts val="0"/>
               </a:spcBef>
@@ -6747,8 +6877,8 @@
         </p:nvSpPr>
         <p:spPr>
           <a:xfrm>
-            <a:off x="112200" y="112850"/>
-            <a:ext cx="3243000" cy="896400"/>
+            <a:off x="112199" y="112850"/>
+            <a:ext cx="3638425" cy="896400"/>
           </a:xfrm>
           <a:prstGeom prst="rect">
             <a:avLst/>
@@ -6759,12 +6889,12 @@
           </a:ln>
         </p:spPr>
         <p:txBody>
-          <a:bodyPr anchorCtr="0" anchor="t" bIns="91425" lIns="91425" spcFirstLastPara="1" rIns="91425" wrap="square" tIns="91425">
+          <a:bodyPr spcFirstLastPara="1" wrap="square" lIns="91425" tIns="91425" rIns="91425" bIns="91425" anchor="t" anchorCtr="0">
             <a:noAutofit/>
           </a:bodyPr>
           <a:lstStyle/>
           <a:p>
-            <a:pPr indent="0" lvl="0" marL="0" rtl="0" algn="l">
+            <a:pPr marL="0" lvl="0" indent="0" algn="l" rtl="0">
               <a:spcBef>
                 <a:spcPts val="0"/>
               </a:spcBef>
@@ -6774,13 +6904,13 @@
               <a:buNone/>
             </a:pPr>
             <a:r>
-              <a:rPr b="1" lang="pt-BR" sz="2900"/>
+              <a:rPr lang="pt-BR" sz="2900" b="1" dirty="0"/>
               <a:t>DETALHAMENTO </a:t>
             </a:r>
-            <a:endParaRPr b="1" sz="2900"/>
+            <a:endParaRPr sz="2900" b="1" dirty="0"/>
           </a:p>
           <a:p>
-            <a:pPr indent="0" lvl="0" marL="0" rtl="0" algn="l">
+            <a:pPr marL="0" lvl="0" indent="0" algn="l" rtl="0">
               <a:spcBef>
                 <a:spcPts val="0"/>
               </a:spcBef>
@@ -6790,10 +6920,10 @@
               <a:buNone/>
             </a:pPr>
             <a:r>
-              <a:rPr b="1" lang="pt-BR" sz="2900"/>
+              <a:rPr lang="pt-BR" sz="2900" b="1" dirty="0"/>
               <a:t>DISCORD</a:t>
             </a:r>
-            <a:endParaRPr b="1" sz="2900"/>
+            <a:endParaRPr sz="2900" b="1" dirty="0"/>
           </a:p>
         </p:txBody>
       </p:sp>
@@ -6851,9 +6981,13 @@
               <a:ext cx="1061085" cy="1941128"/>
             </a:xfrm>
             <a:custGeom>
-              <a:rect b="b" l="l" r="r" t="t"/>
+              <a:avLst/>
+              <a:gdLst/>
+              <a:ahLst/>
+              <a:cxnLst/>
+              <a:rect l="l" t="t" r="r" b="b"/>
               <a:pathLst>
-                <a:path extrusionOk="0" h="300" w="163">
+                <a:path w="163" h="300" extrusionOk="0">
                   <a:moveTo>
                     <a:pt x="32" y="39"/>
                   </a:moveTo>
@@ -6894,23 +7028,23 @@
             <a:solidFill>
               <a:srgbClr val="EF441D"/>
             </a:solidFill>
-            <a:ln cap="flat" cmpd="sng" w="9525">
+            <a:ln w="9525" cap="flat" cmpd="sng">
               <a:solidFill>
                 <a:srgbClr val="FFFFFF"/>
               </a:solidFill>
               <a:prstDash val="solid"/>
               <a:miter lim="8000"/>
-              <a:headEnd len="sm" w="sm" type="none"/>
-              <a:tailEnd len="sm" w="sm" type="none"/>
+              <a:headEnd type="none" w="sm" len="sm"/>
+              <a:tailEnd type="none" w="sm" len="sm"/>
             </a:ln>
           </p:spPr>
           <p:txBody>
-            <a:bodyPr anchorCtr="0" anchor="t" bIns="45700" lIns="91425" spcFirstLastPara="1" rIns="91425" wrap="square" tIns="45700">
+            <a:bodyPr spcFirstLastPara="1" wrap="square" lIns="91425" tIns="45700" rIns="91425" bIns="45700" anchor="t" anchorCtr="0">
               <a:noAutofit/>
             </a:bodyPr>
             <a:lstStyle/>
             <a:p>
-              <a:pPr indent="0" lvl="0" marL="0" rtl="0" algn="l">
+              <a:pPr marL="0" lvl="0" indent="0" algn="l" rtl="0">
                 <a:spcBef>
                   <a:spcPts val="0"/>
                 </a:spcBef>
@@ -6919,9 +7053,6 @@
                 </a:spcAft>
                 <a:buNone/>
               </a:pPr>
-              <a:r>
-                <a:t/>
-              </a:r>
               <a:endParaRPr/>
             </a:p>
           </p:txBody>
@@ -6938,9 +7069,13 @@
               <a:ext cx="1138968" cy="1690435"/>
             </a:xfrm>
             <a:custGeom>
-              <a:rect b="b" l="l" r="r" t="t"/>
+              <a:avLst/>
+              <a:gdLst/>
+              <a:ahLst/>
+              <a:cxnLst/>
+              <a:rect l="l" t="t" r="r" b="b"/>
               <a:pathLst>
-                <a:path extrusionOk="0" h="273" w="183">
+                <a:path w="183" h="273" extrusionOk="0">
                   <a:moveTo>
                     <a:pt x="156" y="108"/>
                   </a:moveTo>
@@ -6981,23 +7116,23 @@
             <a:solidFill>
               <a:srgbClr val="102842"/>
             </a:solidFill>
-            <a:ln cap="flat" cmpd="sng" w="12700">
+            <a:ln w="12700" cap="flat" cmpd="sng">
               <a:solidFill>
                 <a:srgbClr val="FFFFFF"/>
               </a:solidFill>
               <a:prstDash val="solid"/>
               <a:miter lim="8000"/>
-              <a:headEnd len="sm" w="sm" type="none"/>
-              <a:tailEnd len="sm" w="sm" type="none"/>
+              <a:headEnd type="none" w="sm" len="sm"/>
+              <a:tailEnd type="none" w="sm" len="sm"/>
             </a:ln>
           </p:spPr>
           <p:txBody>
-            <a:bodyPr anchorCtr="0" anchor="t" bIns="45700" lIns="91425" spcFirstLastPara="1" rIns="91425" wrap="square" tIns="45700">
+            <a:bodyPr spcFirstLastPara="1" wrap="square" lIns="91425" tIns="45700" rIns="91425" bIns="45700" anchor="t" anchorCtr="0">
               <a:noAutofit/>
             </a:bodyPr>
             <a:lstStyle/>
             <a:p>
-              <a:pPr indent="0" lvl="0" marL="0" rtl="0" algn="l">
+              <a:pPr marL="0" lvl="0" indent="0" algn="l" rtl="0">
                 <a:spcBef>
                   <a:spcPts val="0"/>
                 </a:spcBef>
@@ -7006,9 +7141,6 @@
                 </a:spcAft>
                 <a:buNone/>
               </a:pPr>
-              <a:r>
-                <a:t/>
-              </a:r>
               <a:endParaRPr/>
             </a:p>
           </p:txBody>
@@ -7033,12 +7165,12 @@
             </a:ln>
           </p:spPr>
           <p:txBody>
-            <a:bodyPr anchorCtr="0" anchor="ctr" bIns="91425" lIns="91425" spcFirstLastPara="1" rIns="91425" wrap="square" tIns="91425">
+            <a:bodyPr spcFirstLastPara="1" wrap="square" lIns="91425" tIns="91425" rIns="91425" bIns="91425" anchor="ctr" anchorCtr="0">
               <a:noAutofit/>
             </a:bodyPr>
             <a:lstStyle/>
             <a:p>
-              <a:pPr indent="0" lvl="0" marL="0" rtl="0" algn="ctr">
+              <a:pPr marL="0" lvl="0" indent="0" algn="ctr" rtl="0">
                 <a:spcBef>
                   <a:spcPts val="0"/>
                 </a:spcBef>
@@ -7075,7 +7207,7 @@
               </a:endParaRPr>
             </a:p>
             <a:p>
-              <a:pPr indent="0" lvl="0" marL="0" rtl="0" algn="ctr">
+              <a:pPr marL="0" lvl="0" indent="0" algn="ctr" rtl="0">
                 <a:spcBef>
                   <a:spcPts val="0"/>
                 </a:spcBef>
@@ -7084,9 +7216,6 @@
                 </a:spcAft>
                 <a:buNone/>
               </a:pPr>
-              <a:r>
-                <a:t/>
-              </a:r>
               <a:endParaRPr sz="1000">
                 <a:solidFill>
                   <a:srgbClr val="FFFFFF"/>
@@ -7120,12 +7249,12 @@
           </a:ln>
         </p:spPr>
         <p:txBody>
-          <a:bodyPr anchorCtr="0" anchor="t" bIns="91425" lIns="91425" spcFirstLastPara="1" rIns="91425" wrap="square" tIns="91425">
+          <a:bodyPr spcFirstLastPara="1" wrap="square" lIns="91425" tIns="91425" rIns="91425" bIns="91425" anchor="t" anchorCtr="0">
             <a:noAutofit/>
           </a:bodyPr>
           <a:lstStyle/>
           <a:p>
-            <a:pPr indent="0" lvl="0" marL="0" rtl="0" algn="ctr">
+            <a:pPr marL="0" lvl="0" indent="0" algn="ctr" rtl="0">
               <a:spcBef>
                 <a:spcPts val="0"/>
               </a:spcBef>
@@ -7151,7 +7280,7 @@
           <p:nvPr/>
         </p:nvCxnSpPr>
         <p:spPr>
-          <a:xfrm flipH="1" rot="10800000">
+          <a:xfrm rot="10800000" flipH="1">
             <a:off x="3909850" y="837225"/>
             <a:ext cx="487500" cy="426300"/>
           </a:xfrm>
@@ -7159,14 +7288,14 @@
             <a:avLst/>
           </a:prstGeom>
           <a:noFill/>
-          <a:ln cap="flat" cmpd="sng" w="19050">
+          <a:ln w="19050" cap="flat" cmpd="sng">
             <a:solidFill>
               <a:srgbClr val="EF441D"/>
             </a:solidFill>
             <a:prstDash val="solid"/>
             <a:round/>
-            <a:headEnd len="med" w="med" type="none"/>
-            <a:tailEnd len="med" w="med" type="triangle"/>
+            <a:headEnd type="none" w="med" len="med"/>
+            <a:tailEnd type="triangle" w="med" len="med"/>
           </a:ln>
         </p:spPr>
       </p:cxnSp>
@@ -7187,14 +7316,14 @@
             <a:avLst/>
           </a:prstGeom>
           <a:noFill/>
-          <a:ln cap="flat" cmpd="sng" w="19050">
+          <a:ln w="19050" cap="flat" cmpd="sng">
             <a:solidFill>
               <a:srgbClr val="EF441D"/>
             </a:solidFill>
             <a:prstDash val="solid"/>
             <a:round/>
-            <a:headEnd len="med" w="med" type="none"/>
-            <a:tailEnd len="med" w="med" type="triangle"/>
+            <a:headEnd type="none" w="med" len="med"/>
+            <a:tailEnd type="triangle" w="med" len="med"/>
           </a:ln>
         </p:spPr>
       </p:cxnSp>
@@ -7213,14 +7342,14 @@
             <a:avLst/>
           </a:prstGeom>
           <a:noFill/>
-          <a:ln cap="flat" cmpd="sng" w="19050">
+          <a:ln w="19050" cap="flat" cmpd="sng">
             <a:solidFill>
               <a:srgbClr val="EF441D"/>
             </a:solidFill>
             <a:prstDash val="solid"/>
             <a:round/>
-            <a:headEnd len="med" w="med" type="none"/>
-            <a:tailEnd len="med" w="med" type="triangle"/>
+            <a:headEnd type="none" w="med" len="med"/>
+            <a:tailEnd type="triangle" w="med" len="med"/>
           </a:ln>
         </p:spPr>
       </p:cxnSp>
@@ -7241,14 +7370,14 @@
             <a:avLst/>
           </a:prstGeom>
           <a:noFill/>
-          <a:ln cap="flat" cmpd="sng" w="19050">
+          <a:ln w="19050" cap="flat" cmpd="sng">
             <a:solidFill>
               <a:srgbClr val="EF441D"/>
             </a:solidFill>
             <a:prstDash val="solid"/>
             <a:round/>
-            <a:headEnd len="med" w="med" type="none"/>
-            <a:tailEnd len="med" w="med" type="triangle"/>
+            <a:headEnd type="none" w="med" len="med"/>
+            <a:tailEnd type="triangle" w="med" len="med"/>
           </a:ln>
         </p:spPr>
       </p:cxnSp>
@@ -7267,17 +7396,97 @@
             <a:avLst/>
           </a:prstGeom>
           <a:noFill/>
-          <a:ln cap="flat" cmpd="sng" w="19050">
+          <a:ln w="19050" cap="flat" cmpd="sng">
             <a:solidFill>
               <a:srgbClr val="EF441D"/>
             </a:solidFill>
             <a:prstDash val="solid"/>
             <a:round/>
-            <a:headEnd len="med" w="med" type="none"/>
-            <a:tailEnd len="med" w="med" type="triangle"/>
+            <a:headEnd type="none" w="med" len="med"/>
+            <a:tailEnd type="triangle" w="med" len="med"/>
           </a:ln>
         </p:spPr>
       </p:cxnSp>
+      <p:sp>
+        <p:nvSpPr>
+          <p:cNvPr id="2" name="CaixaDeTexto 1">
+            <a:extLst>
+              <a:ext uri="{FF2B5EF4-FFF2-40B4-BE49-F238E27FC236}">
+                <a16:creationId xmlns:a16="http://schemas.microsoft.com/office/drawing/2014/main" id="{161D2A40-CE7F-4D2D-A2BA-E17F8C53EF5F}"/>
+              </a:ext>
+            </a:extLst>
+          </p:cNvPr>
+          <p:cNvSpPr txBox="1"/>
+          <p:nvPr/>
+        </p:nvSpPr>
+        <p:spPr>
+          <a:xfrm>
+            <a:off x="-1312201" y="1014786"/>
+            <a:ext cx="2175282" cy="1169551"/>
+          </a:xfrm>
+          <a:prstGeom prst="rect">
+            <a:avLst/>
+          </a:prstGeom>
+          <a:noFill/>
+        </p:spPr>
+        <p:txBody>
+          <a:bodyPr wrap="square" rtlCol="0">
+            <a:spAutoFit/>
+          </a:bodyPr>
+          <a:lstStyle/>
+          <a:p>
+            <a:r>
+              <a:rPr lang="en-US" dirty="0"/>
+              <a:t>5w 2h</a:t>
+            </a:r>
+          </a:p>
+          <a:p>
+            <a:r>
+              <a:rPr lang="en-US" dirty="0" err="1"/>
+              <a:t>Sustentação</a:t>
+            </a:r>
+            <a:r>
+              <a:rPr lang="en-US" dirty="0"/>
+              <a:t> </a:t>
+            </a:r>
+          </a:p>
+          <a:p>
+            <a:r>
+              <a:rPr lang="en-US" dirty="0"/>
+              <a:t>Marketing</a:t>
+            </a:r>
+          </a:p>
+          <a:p>
+            <a:r>
+              <a:rPr lang="en-US" dirty="0"/>
+              <a:t>-Dados </a:t>
+            </a:r>
+            <a:r>
+              <a:rPr lang="en-US" dirty="0" err="1"/>
+              <a:t>relevantes</a:t>
+            </a:r>
+            <a:r>
+              <a:rPr lang="en-US" dirty="0"/>
+              <a:t> </a:t>
+            </a:r>
+          </a:p>
+          <a:p>
+            <a:r>
+              <a:rPr lang="en-US" dirty="0"/>
+              <a:t>-</a:t>
+            </a:r>
+            <a:r>
+              <a:rPr lang="en-US" dirty="0" err="1"/>
+              <a:t>Comparações</a:t>
+            </a:r>
+            <a:r>
+              <a:rPr lang="en-US" dirty="0"/>
+              <a:t> </a:t>
+            </a:r>
+            <a:endParaRPr lang="pt-BR" dirty="0"/>
+          </a:p>
+        </p:txBody>
+      </p:sp>
     </p:spTree>
   </p:cSld>
   <p:clrMapOvr>
@@ -7287,11 +7496,11 @@
 </file>
 
 <file path=ppt/slides/slide2.xml><?xml version="1.0" encoding="utf-8"?>
-<p:sld xmlns:a="http://schemas.openxmlformats.org/drawingml/2006/main" xmlns:r="http://schemas.openxmlformats.org/officeDocument/2006/relationships" xmlns:mc="http://schemas.openxmlformats.org/markup-compatibility/2006" xmlns:mv="urn:schemas-microsoft-com:mac:vml" xmlns:p="http://schemas.openxmlformats.org/presentationml/2006/main" xmlns:c="http://schemas.openxmlformats.org/drawingml/2006/chart" xmlns:dgm="http://schemas.openxmlformats.org/drawingml/2006/diagram" xmlns:o="urn:schemas-microsoft-com:office:office" xmlns:v="urn:schemas-microsoft-com:vml" xmlns:pvml="urn:schemas-microsoft-com:office:powerpoint" xmlns:com="http://schemas.openxmlformats.org/drawingml/2006/compatibility" xmlns:p14="http://schemas.microsoft.com/office/powerpoint/2010/main" xmlns:p15="http://schemas.microsoft.com/office/powerpoint/2012/main" xmlns:ahyp="http://schemas.microsoft.com/office/drawing/2018/hyperlinkcolor">
+<p:sld xmlns:a="http://schemas.openxmlformats.org/drawingml/2006/main" xmlns:r="http://schemas.openxmlformats.org/officeDocument/2006/relationships" xmlns:p="http://schemas.openxmlformats.org/presentationml/2006/main">
   <p:cSld>
     <p:spTree>
       <p:nvGrpSpPr>
-        <p:cNvPr id="90" name="Shape 90"/>
+        <p:cNvPr id="1" name="Shape 90"/>
         <p:cNvGrpSpPr/>
         <p:nvPr/>
       </p:nvGrpSpPr>
@@ -7325,12 +7534,12 @@
           </a:ln>
         </p:spPr>
         <p:txBody>
-          <a:bodyPr anchorCtr="0" anchor="ctr" bIns="91425" lIns="91425" spcFirstLastPara="1" rIns="91425" wrap="square" tIns="91425">
+          <a:bodyPr spcFirstLastPara="1" wrap="square" lIns="91425" tIns="91425" rIns="91425" bIns="91425" anchor="ctr" anchorCtr="0">
             <a:noAutofit/>
           </a:bodyPr>
           <a:lstStyle/>
           <a:p>
-            <a:pPr indent="0" lvl="0" marL="0" rtl="0" algn="l">
+            <a:pPr marL="0" lvl="0" indent="0" algn="l" rtl="0">
               <a:spcBef>
                 <a:spcPts val="0"/>
               </a:spcBef>
@@ -7339,9 +7548,6 @@
               </a:spcAft>
               <a:buNone/>
             </a:pPr>
-            <a:r>
-              <a:t/>
-            </a:r>
             <a:endParaRPr/>
           </a:p>
         </p:txBody>
@@ -7368,12 +7574,12 @@
           </a:ln>
         </p:spPr>
         <p:txBody>
-          <a:bodyPr anchorCtr="0" anchor="ctr" bIns="91425" lIns="91425" spcFirstLastPara="1" rIns="91425" wrap="square" tIns="91425">
+          <a:bodyPr spcFirstLastPara="1" wrap="square" lIns="91425" tIns="91425" rIns="91425" bIns="91425" anchor="ctr" anchorCtr="0">
             <a:noAutofit/>
           </a:bodyPr>
           <a:lstStyle/>
           <a:p>
-            <a:pPr indent="0" lvl="0" marL="0" rtl="0" algn="l">
+            <a:pPr marL="0" lvl="0" indent="0" algn="l" rtl="0">
               <a:spcBef>
                 <a:spcPts val="0"/>
               </a:spcBef>
@@ -7382,9 +7588,6 @@
               </a:spcAft>
               <a:buNone/>
             </a:pPr>
-            <a:r>
-              <a:t/>
-            </a:r>
             <a:endParaRPr/>
           </a:p>
         </p:txBody>
@@ -7411,12 +7614,12 @@
           </a:ln>
         </p:spPr>
         <p:txBody>
-          <a:bodyPr anchorCtr="0" anchor="ctr" bIns="91425" lIns="91425" spcFirstLastPara="1" rIns="91425" wrap="square" tIns="91425">
+          <a:bodyPr spcFirstLastPara="1" wrap="square" lIns="91425" tIns="91425" rIns="91425" bIns="91425" anchor="ctr" anchorCtr="0">
             <a:noAutofit/>
           </a:bodyPr>
           <a:lstStyle/>
           <a:p>
-            <a:pPr indent="0" lvl="0" marL="0" rtl="0" algn="l">
+            <a:pPr marL="0" lvl="0" indent="0" algn="l" rtl="0">
               <a:spcBef>
                 <a:spcPts val="0"/>
               </a:spcBef>
@@ -7425,9 +7628,6 @@
               </a:spcAft>
               <a:buNone/>
             </a:pPr>
-            <a:r>
-              <a:t/>
-            </a:r>
             <a:endParaRPr/>
           </a:p>
         </p:txBody>
@@ -7454,12 +7654,12 @@
           </a:ln>
         </p:spPr>
         <p:txBody>
-          <a:bodyPr anchorCtr="0" anchor="ctr" bIns="91425" lIns="91425" spcFirstLastPara="1" rIns="91425" wrap="square" tIns="91425">
+          <a:bodyPr spcFirstLastPara="1" wrap="square" lIns="91425" tIns="91425" rIns="91425" bIns="91425" anchor="ctr" anchorCtr="0">
             <a:noAutofit/>
           </a:bodyPr>
           <a:lstStyle/>
           <a:p>
-            <a:pPr indent="0" lvl="0" marL="0" rtl="0" algn="l">
+            <a:pPr marL="0" lvl="0" indent="0" algn="l" rtl="0">
               <a:spcBef>
                 <a:spcPts val="0"/>
               </a:spcBef>
@@ -7468,9 +7668,6 @@
               </a:spcAft>
               <a:buNone/>
             </a:pPr>
-            <a:r>
-              <a:t/>
-            </a:r>
             <a:endParaRPr/>
           </a:p>
         </p:txBody>
@@ -7497,12 +7694,12 @@
           </a:ln>
         </p:spPr>
         <p:txBody>
-          <a:bodyPr anchorCtr="0" anchor="ctr" bIns="91425" lIns="91425" spcFirstLastPara="1" rIns="91425" wrap="square" tIns="91425">
+          <a:bodyPr spcFirstLastPara="1" wrap="square" lIns="91425" tIns="91425" rIns="91425" bIns="91425" anchor="ctr" anchorCtr="0">
             <a:noAutofit/>
           </a:bodyPr>
           <a:lstStyle/>
           <a:p>
-            <a:pPr indent="0" lvl="0" marL="0" rtl="0" algn="l">
+            <a:pPr marL="0" lvl="0" indent="0" algn="l" rtl="0">
               <a:spcBef>
                 <a:spcPts val="0"/>
               </a:spcBef>
@@ -7511,9 +7708,6 @@
               </a:spcAft>
               <a:buNone/>
             </a:pPr>
-            <a:r>
-              <a:t/>
-            </a:r>
             <a:endParaRPr/>
           </a:p>
         </p:txBody>
@@ -7540,12 +7734,12 @@
           </a:ln>
         </p:spPr>
         <p:txBody>
-          <a:bodyPr anchorCtr="0" anchor="ctr" bIns="91425" lIns="91425" spcFirstLastPara="1" rIns="91425" wrap="square" tIns="91425">
+          <a:bodyPr spcFirstLastPara="1" wrap="square" lIns="91425" tIns="91425" rIns="91425" bIns="91425" anchor="ctr" anchorCtr="0">
             <a:noAutofit/>
           </a:bodyPr>
           <a:lstStyle/>
           <a:p>
-            <a:pPr indent="0" lvl="0" marL="0" rtl="0" algn="l">
+            <a:pPr marL="0" lvl="0" indent="0" algn="l" rtl="0">
               <a:spcBef>
                 <a:spcPts val="0"/>
               </a:spcBef>
@@ -7554,9 +7748,6 @@
               </a:spcAft>
               <a:buNone/>
             </a:pPr>
-            <a:r>
-              <a:t/>
-            </a:r>
             <a:endParaRPr/>
           </a:p>
         </p:txBody>
@@ -7583,12 +7774,12 @@
           </a:ln>
         </p:spPr>
         <p:txBody>
-          <a:bodyPr anchorCtr="0" anchor="ctr" bIns="91425" lIns="91425" spcFirstLastPara="1" rIns="91425" wrap="square" tIns="91425">
+          <a:bodyPr spcFirstLastPara="1" wrap="square" lIns="91425" tIns="91425" rIns="91425" bIns="91425" anchor="ctr" anchorCtr="0">
             <a:noAutofit/>
           </a:bodyPr>
           <a:lstStyle/>
           <a:p>
-            <a:pPr indent="0" lvl="0" marL="0" rtl="0" algn="l">
+            <a:pPr marL="0" lvl="0" indent="0" algn="l" rtl="0">
               <a:spcBef>
                 <a:spcPts val="0"/>
               </a:spcBef>
@@ -7597,9 +7788,6 @@
               </a:spcAft>
               <a:buNone/>
             </a:pPr>
-            <a:r>
-              <a:t/>
-            </a:r>
             <a:endParaRPr/>
           </a:p>
         </p:txBody>
@@ -7642,7 +7830,7 @@
           <p:nvPr/>
         </p:nvCxnSpPr>
         <p:spPr>
-          <a:xfrm flipH="1" rot="10800000">
+          <a:xfrm rot="10800000" flipH="1">
             <a:off x="2846420" y="920742"/>
             <a:ext cx="738600" cy="877500"/>
           </a:xfrm>
@@ -7650,14 +7838,14 @@
             <a:avLst/>
           </a:prstGeom>
           <a:noFill/>
-          <a:ln cap="flat" cmpd="sng" w="19050">
+          <a:ln w="19050" cap="flat" cmpd="sng">
             <a:solidFill>
               <a:srgbClr val="EF441D"/>
             </a:solidFill>
             <a:prstDash val="solid"/>
             <a:round/>
-            <a:headEnd len="med" w="med" type="none"/>
-            <a:tailEnd len="med" w="med" type="triangle"/>
+            <a:headEnd type="none" w="med" len="med"/>
+            <a:tailEnd type="triangle" w="med" len="med"/>
           </a:ln>
         </p:spPr>
       </p:cxnSp>
@@ -7670,7 +7858,7 @@
           <p:nvPr/>
         </p:nvCxnSpPr>
         <p:spPr>
-          <a:xfrm flipH="1" rot="10800000">
+          <a:xfrm rot="10800000" flipH="1">
             <a:off x="3081551" y="1792134"/>
             <a:ext cx="1152600" cy="359400"/>
           </a:xfrm>
@@ -7678,14 +7866,14 @@
             <a:avLst/>
           </a:prstGeom>
           <a:noFill/>
-          <a:ln cap="flat" cmpd="sng" w="19050">
+          <a:ln w="19050" cap="flat" cmpd="sng">
             <a:solidFill>
               <a:srgbClr val="EF441D"/>
             </a:solidFill>
             <a:prstDash val="solid"/>
             <a:round/>
-            <a:headEnd len="med" w="med" type="none"/>
-            <a:tailEnd len="med" w="med" type="triangle"/>
+            <a:headEnd type="none" w="med" len="med"/>
+            <a:tailEnd type="triangle" w="med" len="med"/>
           </a:ln>
         </p:spPr>
       </p:cxnSp>
@@ -7706,14 +7894,14 @@
             <a:avLst/>
           </a:prstGeom>
           <a:noFill/>
-          <a:ln cap="flat" cmpd="sng" w="19050">
+          <a:ln w="19050" cap="flat" cmpd="sng">
             <a:solidFill>
               <a:srgbClr val="EF441D"/>
             </a:solidFill>
             <a:prstDash val="solid"/>
             <a:round/>
-            <a:headEnd len="med" w="med" type="none"/>
-            <a:tailEnd len="med" w="med" type="triangle"/>
+            <a:headEnd type="none" w="med" len="med"/>
+            <a:tailEnd type="triangle" w="med" len="med"/>
           </a:ln>
         </p:spPr>
       </p:cxnSp>
@@ -7735,14 +7923,14 @@
             <a:avLst/>
           </a:prstGeom>
           <a:noFill/>
-          <a:ln cap="flat" cmpd="sng" w="19050">
+          <a:ln w="19050" cap="flat" cmpd="sng">
             <a:solidFill>
               <a:srgbClr val="EF441D"/>
             </a:solidFill>
             <a:prstDash val="solid"/>
             <a:round/>
-            <a:headEnd len="med" w="med" type="none"/>
-            <a:tailEnd len="med" w="med" type="triangle"/>
+            <a:headEnd type="none" w="med" len="med"/>
+            <a:tailEnd type="triangle" w="med" len="med"/>
           </a:ln>
         </p:spPr>
       </p:cxnSp>
@@ -7766,12 +7954,12 @@
           </a:ln>
         </p:spPr>
         <p:txBody>
-          <a:bodyPr anchorCtr="0" anchor="t" bIns="91425" lIns="91425" spcFirstLastPara="1" rIns="91425" wrap="square" tIns="91425">
+          <a:bodyPr spcFirstLastPara="1" wrap="square" lIns="91425" tIns="91425" rIns="91425" bIns="91425" anchor="t" anchorCtr="0">
             <a:noAutofit/>
           </a:bodyPr>
           <a:lstStyle/>
           <a:p>
-            <a:pPr indent="0" lvl="0" marL="0" rtl="0" algn="ctr">
+            <a:pPr marL="0" lvl="0" indent="0" algn="ctr" rtl="0">
               <a:spcBef>
                 <a:spcPts val="0"/>
               </a:spcBef>
@@ -7781,14 +7969,14 @@
               <a:buNone/>
             </a:pPr>
             <a:r>
-              <a:rPr b="1" lang="pt-BR" sz="2100">
+              <a:rPr lang="pt-BR" sz="2100" b="1">
                 <a:solidFill>
                   <a:srgbClr val="FFFFFF"/>
                 </a:solidFill>
               </a:rPr>
               <a:t>INSERÇÃO DE BOTS</a:t>
             </a:r>
-            <a:endParaRPr b="1" sz="2100">
+            <a:endParaRPr sz="2100" b="1">
               <a:solidFill>
                 <a:srgbClr val="FFFFFF"/>
               </a:solidFill>
@@ -7816,12 +8004,12 @@
           </a:ln>
         </p:spPr>
         <p:txBody>
-          <a:bodyPr anchorCtr="0" anchor="t" bIns="91425" lIns="91425" spcFirstLastPara="1" rIns="91425" wrap="square" tIns="91425">
+          <a:bodyPr spcFirstLastPara="1" wrap="square" lIns="91425" tIns="91425" rIns="91425" bIns="91425" anchor="t" anchorCtr="0">
             <a:noAutofit/>
           </a:bodyPr>
           <a:lstStyle/>
           <a:p>
-            <a:pPr indent="0" lvl="0" marL="0" rtl="0" algn="ctr">
+            <a:pPr marL="0" lvl="0" indent="0" algn="ctr" rtl="0">
               <a:spcBef>
                 <a:spcPts val="0"/>
               </a:spcBef>
@@ -7831,14 +8019,14 @@
               <a:buNone/>
             </a:pPr>
             <a:r>
-              <a:rPr b="1" lang="pt-BR" sz="1300">
+              <a:rPr lang="pt-BR" sz="1300" b="1">
                 <a:solidFill>
                   <a:srgbClr val="FFFFFF"/>
                 </a:solidFill>
               </a:rPr>
               <a:t>Ticket Tool</a:t>
             </a:r>
-            <a:endParaRPr b="1" sz="1300">
+            <a:endParaRPr sz="1300" b="1">
               <a:solidFill>
                 <a:srgbClr val="FFFFFF"/>
               </a:solidFill>
@@ -7854,7 +8042,7 @@
         </p:nvSpPr>
         <p:spPr>
           <a:xfrm>
-            <a:off x="4678900" y="138925"/>
+            <a:off x="4476879" y="138925"/>
             <a:ext cx="2716500" cy="608700"/>
           </a:xfrm>
           <a:prstGeom prst="rect">
@@ -7866,12 +8054,12 @@
           </a:ln>
         </p:spPr>
         <p:txBody>
-          <a:bodyPr anchorCtr="0" anchor="t" bIns="91425" lIns="91425" spcFirstLastPara="1" rIns="91425" wrap="square" tIns="91425">
+          <a:bodyPr spcFirstLastPara="1" wrap="square" lIns="91425" tIns="91425" rIns="91425" bIns="91425" anchor="t" anchorCtr="0">
             <a:noAutofit/>
           </a:bodyPr>
           <a:lstStyle/>
           <a:p>
-            <a:pPr indent="0" lvl="0" marL="0" rtl="0" algn="l">
+            <a:pPr marL="0" lvl="0" indent="0" algn="l" rtl="0">
               <a:spcBef>
                 <a:spcPts val="0"/>
               </a:spcBef>
@@ -7881,10 +8069,10 @@
               <a:buNone/>
             </a:pPr>
             <a:r>
-              <a:rPr lang="pt-BR"/>
+              <a:rPr lang="pt-BR" dirty="0"/>
               <a:t>Os são criados usando painéis com reações para manter seu canal sempre limpo.</a:t>
             </a:r>
-            <a:endParaRPr/>
+            <a:endParaRPr dirty="0"/>
           </a:p>
         </p:txBody>
       </p:sp>
@@ -7896,7 +8084,7 @@
         </p:nvSpPr>
         <p:spPr>
           <a:xfrm>
-            <a:off x="5141750" y="1271850"/>
+            <a:off x="5141750" y="1335647"/>
             <a:ext cx="2174100" cy="608700"/>
           </a:xfrm>
           <a:prstGeom prst="rect">
@@ -7908,12 +8096,12 @@
           </a:ln>
         </p:spPr>
         <p:txBody>
-          <a:bodyPr anchorCtr="0" anchor="t" bIns="91425" lIns="91425" spcFirstLastPara="1" rIns="91425" wrap="square" tIns="91425">
+          <a:bodyPr spcFirstLastPara="1" wrap="square" lIns="91425" tIns="91425" rIns="91425" bIns="91425" anchor="t" anchorCtr="0">
             <a:noAutofit/>
           </a:bodyPr>
           <a:lstStyle/>
           <a:p>
-            <a:pPr indent="0" lvl="0" marL="0" rtl="0" algn="l">
+            <a:pPr marL="0" lvl="0" indent="0" algn="l" rtl="0">
               <a:spcBef>
                 <a:spcPts val="0"/>
               </a:spcBef>
@@ -7923,10 +8111,10 @@
               <a:buNone/>
             </a:pPr>
             <a:r>
-              <a:rPr lang="pt-BR"/>
+              <a:rPr lang="pt-BR" dirty="0"/>
               <a:t>Tudo é controlado com reações ou comandos.</a:t>
             </a:r>
-            <a:endParaRPr/>
+            <a:endParaRPr dirty="0"/>
           </a:p>
         </p:txBody>
       </p:sp>
@@ -7950,12 +8138,12 @@
           </a:ln>
         </p:spPr>
         <p:txBody>
-          <a:bodyPr anchorCtr="0" anchor="t" bIns="91425" lIns="91425" spcFirstLastPara="1" rIns="91425" wrap="square" tIns="91425">
+          <a:bodyPr spcFirstLastPara="1" wrap="square" lIns="91425" tIns="91425" rIns="91425" bIns="91425" anchor="t" anchorCtr="0">
             <a:noAutofit/>
           </a:bodyPr>
           <a:lstStyle/>
           <a:p>
-            <a:pPr indent="0" lvl="0" marL="0" rtl="0" algn="l">
+            <a:pPr marL="0" lvl="0" indent="0" algn="l" rtl="0">
               <a:spcBef>
                 <a:spcPts val="0"/>
               </a:spcBef>
@@ -7980,8 +8168,8 @@
         </p:nvSpPr>
         <p:spPr>
           <a:xfrm>
-            <a:off x="4678900" y="3896100"/>
-            <a:ext cx="2422800" cy="608700"/>
+            <a:off x="4392779" y="3900694"/>
+            <a:ext cx="2711900" cy="608700"/>
           </a:xfrm>
           <a:prstGeom prst="rect">
             <a:avLst/>
@@ -7992,12 +8180,12 @@
           </a:ln>
         </p:spPr>
         <p:txBody>
-          <a:bodyPr anchorCtr="0" anchor="t" bIns="91425" lIns="91425" spcFirstLastPara="1" rIns="91425" wrap="square" tIns="91425">
+          <a:bodyPr spcFirstLastPara="1" wrap="square" lIns="91425" tIns="91425" rIns="91425" bIns="91425" anchor="t" anchorCtr="0">
             <a:noAutofit/>
           </a:bodyPr>
           <a:lstStyle/>
           <a:p>
-            <a:pPr indent="0" lvl="0" marL="0" rtl="0" algn="l">
+            <a:pPr marL="0" lvl="0" indent="0" algn="l" rtl="0">
               <a:spcBef>
                 <a:spcPts val="0"/>
               </a:spcBef>
@@ -8007,10 +8195,10 @@
               <a:buNone/>
             </a:pPr>
             <a:r>
-              <a:rPr lang="pt-BR"/>
+              <a:rPr lang="pt-BR" dirty="0"/>
               <a:t>Os tickets podem ser fechados e reabertos para permitir suporte contínuo.</a:t>
             </a:r>
-            <a:endParaRPr/>
+            <a:endParaRPr dirty="0"/>
           </a:p>
         </p:txBody>
       </p:sp>
@@ -8226,7 +8414,7 @@
         </p:blipFill>
         <p:spPr>
           <a:xfrm>
-            <a:off x="4364175" y="1439742"/>
+            <a:off x="4374808" y="1461008"/>
             <a:ext cx="441900" cy="393900"/>
           </a:xfrm>
           <a:prstGeom prst="ellipse">
@@ -8238,6 +8426,78 @@
           </a:ln>
         </p:spPr>
       </p:pic>
+      <p:sp>
+        <p:nvSpPr>
+          <p:cNvPr id="2" name="CaixaDeTexto 1">
+            <a:extLst>
+              <a:ext uri="{FF2B5EF4-FFF2-40B4-BE49-F238E27FC236}">
+                <a16:creationId xmlns:a16="http://schemas.microsoft.com/office/drawing/2014/main" id="{43E90E9B-69DD-41DD-80F2-45596231C4A4}"/>
+              </a:ext>
+            </a:extLst>
+          </p:cNvPr>
+          <p:cNvSpPr txBox="1"/>
+          <p:nvPr/>
+        </p:nvSpPr>
+        <p:spPr>
+          <a:xfrm>
+            <a:off x="-1127462" y="215786"/>
+            <a:ext cx="1314459" cy="954107"/>
+          </a:xfrm>
+          <a:prstGeom prst="rect">
+            <a:avLst/>
+          </a:prstGeom>
+          <a:noFill/>
+        </p:spPr>
+        <p:txBody>
+          <a:bodyPr wrap="square" rtlCol="0">
+            <a:spAutoFit/>
+          </a:bodyPr>
+          <a:lstStyle/>
+          <a:p>
+            <a:r>
+              <a:rPr lang="en-US" dirty="0" err="1"/>
+              <a:t>Título</a:t>
+            </a:r>
+            <a:r>
+              <a:rPr lang="en-US" dirty="0"/>
+              <a:t>:</a:t>
+            </a:r>
+          </a:p>
+          <a:p>
+            <a:r>
+              <a:rPr lang="en-US" dirty="0"/>
+              <a:t>-</a:t>
+            </a:r>
+            <a:r>
+              <a:rPr lang="en-US" dirty="0" err="1"/>
+              <a:t>Vantagens</a:t>
+            </a:r>
+            <a:endParaRPr lang="en-US" dirty="0"/>
+          </a:p>
+          <a:p>
+            <a:r>
+              <a:rPr lang="en-US" dirty="0"/>
+              <a:t>-</a:t>
+            </a:r>
+            <a:r>
+              <a:rPr lang="en-US" dirty="0" err="1"/>
+              <a:t>Benefícios</a:t>
+            </a:r>
+            <a:endParaRPr lang="en-US" dirty="0"/>
+          </a:p>
+          <a:p>
+            <a:r>
+              <a:rPr lang="en-US" dirty="0"/>
+              <a:t>-</a:t>
+            </a:r>
+            <a:r>
+              <a:rPr lang="en-US" dirty="0" err="1"/>
+              <a:t>Ganhos</a:t>
+            </a:r>
+            <a:endParaRPr lang="en-US" dirty="0"/>
+          </a:p>
+        </p:txBody>
+      </p:sp>
     </p:spTree>
   </p:cSld>
   <p:clrMapOvr>
@@ -8247,7 +8507,7 @@
 </file>
 
 <file path=ppt/theme/theme1.xml><?xml version="1.0" encoding="utf-8"?>
-<a:theme xmlns:a="http://schemas.openxmlformats.org/drawingml/2006/main" xmlns:r="http://schemas.openxmlformats.org/officeDocument/2006/relationships" name="Simple Light">
+<a:theme xmlns:a="http://schemas.openxmlformats.org/drawingml/2006/main" name="Simple Light">
   <a:themeElements>
     <a:clrScheme name="Simple Light">
       <a:dk1>
@@ -8522,11 +8782,13 @@
       </a:bgFillStyleLst>
     </a:fmtScheme>
   </a:themeElements>
+  <a:objectDefaults/>
+  <a:extraClrSchemeLst/>
 </a:theme>
 </file>
 
 <file path=ppt/theme/theme2.xml><?xml version="1.0" encoding="utf-8"?>
-<a:theme xmlns:a="http://schemas.openxmlformats.org/drawingml/2006/main" xmlns:r="http://schemas.openxmlformats.org/officeDocument/2006/relationships">
+<a:theme xmlns:a="http://schemas.openxmlformats.org/drawingml/2006/main">
   <a:themeElements>
     <a:clrScheme name="Default">
       <a:dk1>
@@ -8801,5 +9063,7 @@
       </a:bgFillStyleLst>
     </a:fmtScheme>
   </a:themeElements>
+  <a:objectDefaults/>
+  <a:extraClrSchemeLst/>
 </a:theme>
 </file>
</xml_diff>